<commit_message>
Adicionando slide com inicio da parte pratica
</commit_message>
<xml_diff>
--- a/Slides.pptx
+++ b/Slides.pptx
@@ -5,7 +5,7 @@
     <p:sldMasterId id="2147483648" r:id="rId1"/>
   </p:sldMasterIdLst>
   <p:notesMasterIdLst>
-    <p:notesMasterId r:id="rId8"/>
+    <p:notesMasterId r:id="rId9"/>
   </p:notesMasterIdLst>
   <p:sldIdLst>
     <p:sldId id="256" r:id="rId2"/>
@@ -14,6 +14,7 @@
     <p:sldId id="422" r:id="rId5"/>
     <p:sldId id="424" r:id="rId6"/>
     <p:sldId id="425" r:id="rId7"/>
+    <p:sldId id="426" r:id="rId8"/>
   </p:sldIdLst>
   <p:sldSz cx="10693400" cy="7569200"/>
   <p:notesSz cx="6858000" cy="9144000"/>
@@ -4243,6 +4244,222 @@
 </p:sld>
 </file>
 
+<file path=ppt/slides/slide7.xml><?xml version="1.0" encoding="utf-8"?>
+<p:sld xmlns:a="http://schemas.openxmlformats.org/drawingml/2006/main" xmlns:r="http://schemas.openxmlformats.org/officeDocument/2006/relationships" xmlns:p="http://schemas.openxmlformats.org/presentationml/2006/main">
+  <p:cSld>
+    <p:spTree>
+      <p:nvGrpSpPr>
+        <p:cNvPr id="1" name=""/>
+        <p:cNvGrpSpPr/>
+        <p:nvPr/>
+      </p:nvGrpSpPr>
+      <p:grpSpPr>
+        <a:xfrm>
+          <a:off x="0" y="0"/>
+          <a:ext cx="0" cy="0"/>
+          <a:chOff x="0" y="0"/>
+          <a:chExt cx="0" cy="0"/>
+        </a:xfrm>
+      </p:grpSpPr>
+      <p:sp>
+        <p:nvSpPr>
+          <p:cNvPr id="2" name="CaixaDeTexto 35"/>
+          <p:cNvSpPr txBox="1"/>
+          <p:nvPr/>
+        </p:nvSpPr>
+        <p:spPr>
+          <a:xfrm>
+            <a:off x="464350" y="1448928"/>
+            <a:ext cx="1687499" cy="315471"/>
+          </a:xfrm>
+          <a:prstGeom prst="rect">
+            <a:avLst/>
+          </a:prstGeom>
+          <a:solidFill>
+            <a:srgbClr val="0AB4BA"/>
+          </a:solidFill>
+        </p:spPr>
+        <p:txBody>
+          <a:bodyPr wrap="square" rtlCol="0" anchor="ctr">
+            <a:spAutoFit/>
+          </a:bodyPr>
+          <a:lstStyle>
+            <a:defPPr>
+              <a:defRPr lang="pt-BR"/>
+            </a:defPPr>
+            <a:lvl1pPr marL="0" algn="l" defTabSz="914400" rtl="0" eaLnBrk="1" latinLnBrk="0" hangingPunct="1">
+              <a:defRPr sz="1800" kern="1200">
+                <a:solidFill>
+                  <a:schemeClr val="tx1"/>
+                </a:solidFill>
+                <a:latin typeface="+mn-lt"/>
+                <a:ea typeface="+mn-ea"/>
+                <a:cs typeface="+mn-cs"/>
+              </a:defRPr>
+            </a:lvl1pPr>
+            <a:lvl2pPr marL="457200" algn="l" defTabSz="914400" rtl="0" eaLnBrk="1" latinLnBrk="0" hangingPunct="1">
+              <a:defRPr sz="1800" kern="1200">
+                <a:solidFill>
+                  <a:schemeClr val="tx1"/>
+                </a:solidFill>
+                <a:latin typeface="+mn-lt"/>
+                <a:ea typeface="+mn-ea"/>
+                <a:cs typeface="+mn-cs"/>
+              </a:defRPr>
+            </a:lvl2pPr>
+            <a:lvl3pPr marL="914400" algn="l" defTabSz="914400" rtl="0" eaLnBrk="1" latinLnBrk="0" hangingPunct="1">
+              <a:defRPr sz="1800" kern="1200">
+                <a:solidFill>
+                  <a:schemeClr val="tx1"/>
+                </a:solidFill>
+                <a:latin typeface="+mn-lt"/>
+                <a:ea typeface="+mn-ea"/>
+                <a:cs typeface="+mn-cs"/>
+              </a:defRPr>
+            </a:lvl3pPr>
+            <a:lvl4pPr marL="1371600" algn="l" defTabSz="914400" rtl="0" eaLnBrk="1" latinLnBrk="0" hangingPunct="1">
+              <a:defRPr sz="1800" kern="1200">
+                <a:solidFill>
+                  <a:schemeClr val="tx1"/>
+                </a:solidFill>
+                <a:latin typeface="+mn-lt"/>
+                <a:ea typeface="+mn-ea"/>
+                <a:cs typeface="+mn-cs"/>
+              </a:defRPr>
+            </a:lvl4pPr>
+            <a:lvl5pPr marL="1828800" algn="l" defTabSz="914400" rtl="0" eaLnBrk="1" latinLnBrk="0" hangingPunct="1">
+              <a:defRPr sz="1800" kern="1200">
+                <a:solidFill>
+                  <a:schemeClr val="tx1"/>
+                </a:solidFill>
+                <a:latin typeface="+mn-lt"/>
+                <a:ea typeface="+mn-ea"/>
+                <a:cs typeface="+mn-cs"/>
+              </a:defRPr>
+            </a:lvl5pPr>
+            <a:lvl6pPr marL="2286000" algn="l" defTabSz="914400" rtl="0" eaLnBrk="1" latinLnBrk="0" hangingPunct="1">
+              <a:defRPr sz="1800" kern="1200">
+                <a:solidFill>
+                  <a:schemeClr val="tx1"/>
+                </a:solidFill>
+                <a:latin typeface="+mn-lt"/>
+                <a:ea typeface="+mn-ea"/>
+                <a:cs typeface="+mn-cs"/>
+              </a:defRPr>
+            </a:lvl6pPr>
+            <a:lvl7pPr marL="2743200" algn="l" defTabSz="914400" rtl="0" eaLnBrk="1" latinLnBrk="0" hangingPunct="1">
+              <a:defRPr sz="1800" kern="1200">
+                <a:solidFill>
+                  <a:schemeClr val="tx1"/>
+                </a:solidFill>
+                <a:latin typeface="+mn-lt"/>
+                <a:ea typeface="+mn-ea"/>
+                <a:cs typeface="+mn-cs"/>
+              </a:defRPr>
+            </a:lvl7pPr>
+            <a:lvl8pPr marL="3200400" algn="l" defTabSz="914400" rtl="0" eaLnBrk="1" latinLnBrk="0" hangingPunct="1">
+              <a:defRPr sz="1800" kern="1200">
+                <a:solidFill>
+                  <a:schemeClr val="tx1"/>
+                </a:solidFill>
+                <a:latin typeface="+mn-lt"/>
+                <a:ea typeface="+mn-ea"/>
+                <a:cs typeface="+mn-cs"/>
+              </a:defRPr>
+            </a:lvl8pPr>
+            <a:lvl9pPr marL="3657600" algn="l" defTabSz="914400" rtl="0" eaLnBrk="1" latinLnBrk="0" hangingPunct="1">
+              <a:defRPr sz="1800" kern="1200">
+                <a:solidFill>
+                  <a:schemeClr val="tx1"/>
+                </a:solidFill>
+                <a:latin typeface="+mn-lt"/>
+                <a:ea typeface="+mn-ea"/>
+                <a:cs typeface="+mn-cs"/>
+              </a:defRPr>
+            </a:lvl9pPr>
+          </a:lstStyle>
+          <a:p>
+            <a:pPr algn="ctr"/>
+            <a:r>
+              <a:rPr lang="pt-BR" sz="1450" b="1" kern="0" spc="27" dirty="0">
+                <a:solidFill>
+                  <a:schemeClr val="bg1"/>
+                </a:solidFill>
+                <a:latin typeface="Calibri" panose="020F0502020204030204" pitchFamily="34" charset="0"/>
+                <a:cs typeface="Gotham-Light"/>
+              </a:rPr>
+              <a:t>Prática</a:t>
+            </a:r>
+          </a:p>
+        </p:txBody>
+      </p:sp>
+      <p:sp>
+        <p:nvSpPr>
+          <p:cNvPr id="3" name="Retângulo 2"/>
+          <p:cNvSpPr/>
+          <p:nvPr/>
+        </p:nvSpPr>
+        <p:spPr>
+          <a:xfrm>
+            <a:off x="464350" y="1871146"/>
+            <a:ext cx="2146742" cy="369332"/>
+          </a:xfrm>
+          <a:prstGeom prst="rect">
+            <a:avLst/>
+          </a:prstGeom>
+        </p:spPr>
+        <p:txBody>
+          <a:bodyPr wrap="none">
+            <a:spAutoFit/>
+          </a:bodyPr>
+          <a:lstStyle/>
+          <a:p>
+            <a:r>
+              <a:rPr lang="pt-BR" dirty="0"/>
+              <a:t>https://git-scm.com/</a:t>
+            </a:r>
+            <a:endParaRPr lang="pt-BR" dirty="0"/>
+          </a:p>
+        </p:txBody>
+      </p:sp>
+      <p:pic>
+        <p:nvPicPr>
+          <p:cNvPr id="6" name="Imagem 5"/>
+          <p:cNvPicPr>
+            <a:picLocks noChangeAspect="1"/>
+          </p:cNvPicPr>
+          <p:nvPr/>
+        </p:nvPicPr>
+        <p:blipFill>
+          <a:blip r:embed="rId2"/>
+          <a:stretch>
+            <a:fillRect/>
+          </a:stretch>
+        </p:blipFill>
+        <p:spPr>
+          <a:xfrm>
+            <a:off x="2611092" y="2347225"/>
+            <a:ext cx="7493000" cy="3845965"/>
+          </a:xfrm>
+          <a:prstGeom prst="rect">
+            <a:avLst/>
+          </a:prstGeom>
+        </p:spPr>
+      </p:pic>
+    </p:spTree>
+    <p:extLst>
+      <p:ext uri="{BB962C8B-B14F-4D97-AF65-F5344CB8AC3E}">
+        <p14:creationId xmlns:p14="http://schemas.microsoft.com/office/powerpoint/2010/main" val="2026954738"/>
+      </p:ext>
+    </p:extLst>
+  </p:cSld>
+  <p:clrMapOvr>
+    <a:masterClrMapping/>
+  </p:clrMapOvr>
+  <p:transition spd="med"/>
+</p:sld>
+</file>
+
 <file path=ppt/theme/theme1.xml><?xml version="1.0" encoding="utf-8"?>
 <a:theme xmlns:a="http://schemas.openxmlformats.org/drawingml/2006/main" name="Default">
   <a:themeElements>

</xml_diff>

<commit_message>
Adicionando slides sobre: inicializar um repositorio e rastrear arquivos
</commit_message>
<xml_diff>
--- a/Slides.pptx
+++ b/Slides.pptx
@@ -5,7 +5,7 @@
     <p:sldMasterId id="2147483648" r:id="rId1"/>
   </p:sldMasterIdLst>
   <p:notesMasterIdLst>
-    <p:notesMasterId r:id="rId9"/>
+    <p:notesMasterId r:id="rId19"/>
   </p:notesMasterIdLst>
   <p:sldIdLst>
     <p:sldId id="256" r:id="rId2"/>
@@ -15,6 +15,16 @@
     <p:sldId id="424" r:id="rId6"/>
     <p:sldId id="425" r:id="rId7"/>
     <p:sldId id="426" r:id="rId8"/>
+    <p:sldId id="427" r:id="rId9"/>
+    <p:sldId id="428" r:id="rId10"/>
+    <p:sldId id="429" r:id="rId11"/>
+    <p:sldId id="430" r:id="rId12"/>
+    <p:sldId id="431" r:id="rId13"/>
+    <p:sldId id="432" r:id="rId14"/>
+    <p:sldId id="433" r:id="rId15"/>
+    <p:sldId id="434" r:id="rId16"/>
+    <p:sldId id="435" r:id="rId17"/>
+    <p:sldId id="436" r:id="rId18"/>
   </p:sldIdLst>
   <p:sldSz cx="10693400" cy="7569200"/>
   <p:notesSz cx="6858000" cy="9144000"/>
@@ -1214,6 +1224,3417 @@
 </p:sld>
 </file>
 
+<file path=ppt/slides/slide10.xml><?xml version="1.0" encoding="utf-8"?>
+<p:sld xmlns:a="http://schemas.openxmlformats.org/drawingml/2006/main" xmlns:r="http://schemas.openxmlformats.org/officeDocument/2006/relationships" xmlns:p="http://schemas.openxmlformats.org/presentationml/2006/main">
+  <p:cSld>
+    <p:spTree>
+      <p:nvGrpSpPr>
+        <p:cNvPr id="1" name=""/>
+        <p:cNvGrpSpPr/>
+        <p:nvPr/>
+      </p:nvGrpSpPr>
+      <p:grpSpPr>
+        <a:xfrm>
+          <a:off x="0" y="0"/>
+          <a:ext cx="0" cy="0"/>
+          <a:chOff x="0" y="0"/>
+          <a:chExt cx="0" cy="0"/>
+        </a:xfrm>
+      </p:grpSpPr>
+      <p:sp>
+        <p:nvSpPr>
+          <p:cNvPr id="2" name="CaixaDeTexto 35"/>
+          <p:cNvSpPr txBox="1"/>
+          <p:nvPr/>
+        </p:nvSpPr>
+        <p:spPr>
+          <a:xfrm>
+            <a:off x="278611" y="1380065"/>
+            <a:ext cx="4036213" cy="315471"/>
+          </a:xfrm>
+          <a:prstGeom prst="rect">
+            <a:avLst/>
+          </a:prstGeom>
+          <a:solidFill>
+            <a:srgbClr val="0AB4BA"/>
+          </a:solidFill>
+        </p:spPr>
+        <p:txBody>
+          <a:bodyPr wrap="square" rtlCol="0" anchor="ctr">
+            <a:spAutoFit/>
+          </a:bodyPr>
+          <a:lstStyle>
+            <a:defPPr>
+              <a:defRPr lang="pt-BR"/>
+            </a:defPPr>
+            <a:lvl1pPr marL="0" algn="l" defTabSz="914400" rtl="0" eaLnBrk="1" latinLnBrk="0" hangingPunct="1">
+              <a:defRPr sz="1800" kern="1200">
+                <a:solidFill>
+                  <a:schemeClr val="tx1"/>
+                </a:solidFill>
+                <a:latin typeface="+mn-lt"/>
+                <a:ea typeface="+mn-ea"/>
+                <a:cs typeface="+mn-cs"/>
+              </a:defRPr>
+            </a:lvl1pPr>
+            <a:lvl2pPr marL="457200" algn="l" defTabSz="914400" rtl="0" eaLnBrk="1" latinLnBrk="0" hangingPunct="1">
+              <a:defRPr sz="1800" kern="1200">
+                <a:solidFill>
+                  <a:schemeClr val="tx1"/>
+                </a:solidFill>
+                <a:latin typeface="+mn-lt"/>
+                <a:ea typeface="+mn-ea"/>
+                <a:cs typeface="+mn-cs"/>
+              </a:defRPr>
+            </a:lvl2pPr>
+            <a:lvl3pPr marL="914400" algn="l" defTabSz="914400" rtl="0" eaLnBrk="1" latinLnBrk="0" hangingPunct="1">
+              <a:defRPr sz="1800" kern="1200">
+                <a:solidFill>
+                  <a:schemeClr val="tx1"/>
+                </a:solidFill>
+                <a:latin typeface="+mn-lt"/>
+                <a:ea typeface="+mn-ea"/>
+                <a:cs typeface="+mn-cs"/>
+              </a:defRPr>
+            </a:lvl3pPr>
+            <a:lvl4pPr marL="1371600" algn="l" defTabSz="914400" rtl="0" eaLnBrk="1" latinLnBrk="0" hangingPunct="1">
+              <a:defRPr sz="1800" kern="1200">
+                <a:solidFill>
+                  <a:schemeClr val="tx1"/>
+                </a:solidFill>
+                <a:latin typeface="+mn-lt"/>
+                <a:ea typeface="+mn-ea"/>
+                <a:cs typeface="+mn-cs"/>
+              </a:defRPr>
+            </a:lvl4pPr>
+            <a:lvl5pPr marL="1828800" algn="l" defTabSz="914400" rtl="0" eaLnBrk="1" latinLnBrk="0" hangingPunct="1">
+              <a:defRPr sz="1800" kern="1200">
+                <a:solidFill>
+                  <a:schemeClr val="tx1"/>
+                </a:solidFill>
+                <a:latin typeface="+mn-lt"/>
+                <a:ea typeface="+mn-ea"/>
+                <a:cs typeface="+mn-cs"/>
+              </a:defRPr>
+            </a:lvl5pPr>
+            <a:lvl6pPr marL="2286000" algn="l" defTabSz="914400" rtl="0" eaLnBrk="1" latinLnBrk="0" hangingPunct="1">
+              <a:defRPr sz="1800" kern="1200">
+                <a:solidFill>
+                  <a:schemeClr val="tx1"/>
+                </a:solidFill>
+                <a:latin typeface="+mn-lt"/>
+                <a:ea typeface="+mn-ea"/>
+                <a:cs typeface="+mn-cs"/>
+              </a:defRPr>
+            </a:lvl6pPr>
+            <a:lvl7pPr marL="2743200" algn="l" defTabSz="914400" rtl="0" eaLnBrk="1" latinLnBrk="0" hangingPunct="1">
+              <a:defRPr sz="1800" kern="1200">
+                <a:solidFill>
+                  <a:schemeClr val="tx1"/>
+                </a:solidFill>
+                <a:latin typeface="+mn-lt"/>
+                <a:ea typeface="+mn-ea"/>
+                <a:cs typeface="+mn-cs"/>
+              </a:defRPr>
+            </a:lvl7pPr>
+            <a:lvl8pPr marL="3200400" algn="l" defTabSz="914400" rtl="0" eaLnBrk="1" latinLnBrk="0" hangingPunct="1">
+              <a:defRPr sz="1800" kern="1200">
+                <a:solidFill>
+                  <a:schemeClr val="tx1"/>
+                </a:solidFill>
+                <a:latin typeface="+mn-lt"/>
+                <a:ea typeface="+mn-ea"/>
+                <a:cs typeface="+mn-cs"/>
+              </a:defRPr>
+            </a:lvl8pPr>
+            <a:lvl9pPr marL="3657600" algn="l" defTabSz="914400" rtl="0" eaLnBrk="1" latinLnBrk="0" hangingPunct="1">
+              <a:defRPr sz="1800" kern="1200">
+                <a:solidFill>
+                  <a:schemeClr val="tx1"/>
+                </a:solidFill>
+                <a:latin typeface="+mn-lt"/>
+                <a:ea typeface="+mn-ea"/>
+                <a:cs typeface="+mn-cs"/>
+              </a:defRPr>
+            </a:lvl9pPr>
+          </a:lstStyle>
+          <a:p>
+            <a:pPr algn="ctr"/>
+            <a:r>
+              <a:rPr lang="pt-BR" sz="1450" b="1" kern="0" spc="27" dirty="0">
+                <a:solidFill>
+                  <a:schemeClr val="bg1"/>
+                </a:solidFill>
+                <a:latin typeface="Calibri" panose="020F0502020204030204" pitchFamily="34" charset="0"/>
+                <a:cs typeface="Gotham-Light"/>
+              </a:rPr>
+              <a:t>Rápida explicação</a:t>
+            </a:r>
+          </a:p>
+        </p:txBody>
+      </p:sp>
+      <p:sp>
+        <p:nvSpPr>
+          <p:cNvPr id="3" name="Subtítulo 5"/>
+          <p:cNvSpPr txBox="1">
+            <a:spLocks/>
+          </p:cNvSpPr>
+          <p:nvPr/>
+        </p:nvSpPr>
+        <p:spPr bwMode="auto">
+          <a:xfrm>
+            <a:off x="626406" y="2423543"/>
+            <a:ext cx="6634104" cy="1248461"/>
+          </a:xfrm>
+          <a:prstGeom prst="rect">
+            <a:avLst/>
+          </a:prstGeom>
+          <a:noFill/>
+          <a:ln>
+            <a:noFill/>
+          </a:ln>
+          <a:extLst>
+            <a:ext uri="{909E8E84-426E-40DD-AFC4-6F175D3DCCD1}">
+              <a14:hiddenFill xmlns:a14="http://schemas.microsoft.com/office/drawing/2010/main">
+                <a:solidFill>
+                  <a:srgbClr val="FFFFFF"/>
+                </a:solidFill>
+              </a14:hiddenFill>
+            </a:ext>
+            <a:ext uri="{91240B29-F687-4F45-9708-019B960494DF}">
+              <a14:hiddenLine xmlns:a14="http://schemas.microsoft.com/office/drawing/2010/main" w="9525">
+                <a:solidFill>
+                  <a:srgbClr val="000000"/>
+                </a:solidFill>
+                <a:miter lim="800000"/>
+                <a:headEnd/>
+                <a:tailEnd/>
+              </a14:hiddenLine>
+            </a:ext>
+          </a:extLst>
+        </p:spPr>
+        <p:txBody>
+          <a:bodyPr wrap="square" anchor="t" anchorCtr="0">
+            <a:noAutofit/>
+          </a:bodyPr>
+          <a:lstStyle>
+            <a:defPPr>
+              <a:defRPr lang="pt-BR"/>
+            </a:defPPr>
+            <a:lvl1pPr marL="0" algn="l" defTabSz="914400" rtl="0" eaLnBrk="1" latinLnBrk="0" hangingPunct="1">
+              <a:defRPr sz="1800" kern="1200">
+                <a:solidFill>
+                  <a:schemeClr val="tx1"/>
+                </a:solidFill>
+                <a:latin typeface="+mn-lt"/>
+                <a:ea typeface="+mn-ea"/>
+                <a:cs typeface="+mn-cs"/>
+              </a:defRPr>
+            </a:lvl1pPr>
+            <a:lvl2pPr marL="457200" algn="l" defTabSz="914400" rtl="0" eaLnBrk="1" latinLnBrk="0" hangingPunct="1">
+              <a:defRPr sz="1800" kern="1200">
+                <a:solidFill>
+                  <a:schemeClr val="tx1"/>
+                </a:solidFill>
+                <a:latin typeface="+mn-lt"/>
+                <a:ea typeface="+mn-ea"/>
+                <a:cs typeface="+mn-cs"/>
+              </a:defRPr>
+            </a:lvl2pPr>
+            <a:lvl3pPr marL="914400" algn="l" defTabSz="914400" rtl="0" eaLnBrk="1" latinLnBrk="0" hangingPunct="1">
+              <a:defRPr sz="1800" kern="1200">
+                <a:solidFill>
+                  <a:schemeClr val="tx1"/>
+                </a:solidFill>
+                <a:latin typeface="+mn-lt"/>
+                <a:ea typeface="+mn-ea"/>
+                <a:cs typeface="+mn-cs"/>
+              </a:defRPr>
+            </a:lvl3pPr>
+            <a:lvl4pPr marL="1371600" algn="l" defTabSz="914400" rtl="0" eaLnBrk="1" latinLnBrk="0" hangingPunct="1">
+              <a:defRPr sz="1800" kern="1200">
+                <a:solidFill>
+                  <a:schemeClr val="tx1"/>
+                </a:solidFill>
+                <a:latin typeface="+mn-lt"/>
+                <a:ea typeface="+mn-ea"/>
+                <a:cs typeface="+mn-cs"/>
+              </a:defRPr>
+            </a:lvl4pPr>
+            <a:lvl5pPr marL="1828800" algn="l" defTabSz="914400" rtl="0" eaLnBrk="1" latinLnBrk="0" hangingPunct="1">
+              <a:defRPr sz="1800" kern="1200">
+                <a:solidFill>
+                  <a:schemeClr val="tx1"/>
+                </a:solidFill>
+                <a:latin typeface="+mn-lt"/>
+                <a:ea typeface="+mn-ea"/>
+                <a:cs typeface="+mn-cs"/>
+              </a:defRPr>
+            </a:lvl5pPr>
+            <a:lvl6pPr marL="2286000" algn="l" defTabSz="914400" rtl="0" eaLnBrk="1" latinLnBrk="0" hangingPunct="1">
+              <a:defRPr sz="1800" kern="1200">
+                <a:solidFill>
+                  <a:schemeClr val="tx1"/>
+                </a:solidFill>
+                <a:latin typeface="+mn-lt"/>
+                <a:ea typeface="+mn-ea"/>
+                <a:cs typeface="+mn-cs"/>
+              </a:defRPr>
+            </a:lvl6pPr>
+            <a:lvl7pPr marL="2743200" algn="l" defTabSz="914400" rtl="0" eaLnBrk="1" latinLnBrk="0" hangingPunct="1">
+              <a:defRPr sz="1800" kern="1200">
+                <a:solidFill>
+                  <a:schemeClr val="tx1"/>
+                </a:solidFill>
+                <a:latin typeface="+mn-lt"/>
+                <a:ea typeface="+mn-ea"/>
+                <a:cs typeface="+mn-cs"/>
+              </a:defRPr>
+            </a:lvl7pPr>
+            <a:lvl8pPr marL="3200400" algn="l" defTabSz="914400" rtl="0" eaLnBrk="1" latinLnBrk="0" hangingPunct="1">
+              <a:defRPr sz="1800" kern="1200">
+                <a:solidFill>
+                  <a:schemeClr val="tx1"/>
+                </a:solidFill>
+                <a:latin typeface="+mn-lt"/>
+                <a:ea typeface="+mn-ea"/>
+                <a:cs typeface="+mn-cs"/>
+              </a:defRPr>
+            </a:lvl8pPr>
+            <a:lvl9pPr marL="3657600" algn="l" defTabSz="914400" rtl="0" eaLnBrk="1" latinLnBrk="0" hangingPunct="1">
+              <a:defRPr sz="1800" kern="1200">
+                <a:solidFill>
+                  <a:schemeClr val="tx1"/>
+                </a:solidFill>
+                <a:latin typeface="+mn-lt"/>
+                <a:ea typeface="+mn-ea"/>
+                <a:cs typeface="+mn-cs"/>
+              </a:defRPr>
+            </a:lvl9pPr>
+          </a:lstStyle>
+          <a:p>
+            <a:pPr marL="258890" indent="-258890" defTabSz="414223">
+              <a:lnSpc>
+                <a:spcPct val="80000"/>
+              </a:lnSpc>
+              <a:spcAft>
+                <a:spcPts val="725"/>
+              </a:spcAft>
+              <a:buClr>
+                <a:srgbClr val="C05200"/>
+              </a:buClr>
+              <a:buFont typeface="Arial" panose="020B0604020202020204" pitchFamily="34" charset="0"/>
+              <a:buChar char="•"/>
+              <a:defRPr/>
+            </a:pPr>
+            <a:r>
+              <a:rPr lang="pt-BR" sz="1631" dirty="0">
+                <a:solidFill>
+                  <a:srgbClr val="000000">
+                    <a:lumMod val="65000"/>
+                    <a:lumOff val="35000"/>
+                  </a:srgbClr>
+                </a:solidFill>
+                <a:latin typeface="Calibri" panose="020F0502020204030204" pitchFamily="34" charset="0"/>
+                <a:ea typeface="Open Sans" panose="020B0606030504020204" pitchFamily="34" charset="0"/>
+                <a:cs typeface="Open Sans" panose="020B0606030504020204" pitchFamily="34" charset="0"/>
+                <a:sym typeface="Calibri"/>
+              </a:rPr>
+              <a:t>Todas as informações do nosso repositório estarão presentes na pasta .</a:t>
+            </a:r>
+            <a:r>
+              <a:rPr lang="pt-BR" sz="1631" dirty="0" err="1">
+                <a:solidFill>
+                  <a:srgbClr val="000000">
+                    <a:lumMod val="65000"/>
+                    <a:lumOff val="35000"/>
+                  </a:srgbClr>
+                </a:solidFill>
+                <a:latin typeface="Calibri" panose="020F0502020204030204" pitchFamily="34" charset="0"/>
+                <a:ea typeface="Open Sans" panose="020B0606030504020204" pitchFamily="34" charset="0"/>
+                <a:cs typeface="Open Sans" panose="020B0606030504020204" pitchFamily="34" charset="0"/>
+                <a:sym typeface="Calibri"/>
+              </a:rPr>
+              <a:t>git</a:t>
+            </a:r>
+            <a:r>
+              <a:rPr lang="pt-BR" sz="1631" dirty="0">
+                <a:solidFill>
+                  <a:srgbClr val="000000">
+                    <a:lumMod val="65000"/>
+                    <a:lumOff val="35000"/>
+                  </a:srgbClr>
+                </a:solidFill>
+                <a:latin typeface="Calibri" panose="020F0502020204030204" pitchFamily="34" charset="0"/>
+                <a:ea typeface="Open Sans" panose="020B0606030504020204" pitchFamily="34" charset="0"/>
+                <a:cs typeface="Open Sans" panose="020B0606030504020204" pitchFamily="34" charset="0"/>
+                <a:sym typeface="Calibri"/>
+              </a:rPr>
+              <a:t>;</a:t>
+            </a:r>
+          </a:p>
+          <a:p>
+            <a:pPr marL="258890" indent="-258890" defTabSz="414223">
+              <a:lnSpc>
+                <a:spcPct val="80000"/>
+              </a:lnSpc>
+              <a:spcAft>
+                <a:spcPts val="725"/>
+              </a:spcAft>
+              <a:buClr>
+                <a:srgbClr val="C05200"/>
+              </a:buClr>
+              <a:buFont typeface="Arial" panose="020B0604020202020204" pitchFamily="34" charset="0"/>
+              <a:buChar char="•"/>
+              <a:defRPr/>
+            </a:pPr>
+            <a:r>
+              <a:rPr lang="pt-BR" sz="1631" dirty="0">
+                <a:solidFill>
+                  <a:srgbClr val="000000">
+                    <a:lumMod val="65000"/>
+                    <a:lumOff val="35000"/>
+                  </a:srgbClr>
+                </a:solidFill>
+                <a:latin typeface="Calibri" panose="020F0502020204030204" pitchFamily="34" charset="0"/>
+                <a:ea typeface="Open Sans" panose="020B0606030504020204" pitchFamily="34" charset="0"/>
+                <a:cs typeface="Open Sans" panose="020B0606030504020204" pitchFamily="34" charset="0"/>
+              </a:rPr>
+              <a:t>“</a:t>
+            </a:r>
+            <a:r>
+              <a:rPr lang="pt-BR" sz="1631" dirty="0" err="1">
+                <a:solidFill>
+                  <a:srgbClr val="000000">
+                    <a:lumMod val="65000"/>
+                    <a:lumOff val="35000"/>
+                  </a:srgbClr>
+                </a:solidFill>
+                <a:latin typeface="Calibri" panose="020F0502020204030204" pitchFamily="34" charset="0"/>
+                <a:ea typeface="Open Sans" panose="020B0606030504020204" pitchFamily="34" charset="0"/>
+                <a:cs typeface="Open Sans" panose="020B0606030504020204" pitchFamily="34" charset="0"/>
+              </a:rPr>
+              <a:t>git</a:t>
+            </a:r>
+            <a:r>
+              <a:rPr lang="pt-BR" sz="1631" dirty="0">
+                <a:solidFill>
+                  <a:srgbClr val="000000">
+                    <a:lumMod val="65000"/>
+                    <a:lumOff val="35000"/>
+                  </a:srgbClr>
+                </a:solidFill>
+                <a:latin typeface="Calibri" panose="020F0502020204030204" pitchFamily="34" charset="0"/>
+                <a:ea typeface="Open Sans" panose="020B0606030504020204" pitchFamily="34" charset="0"/>
+                <a:cs typeface="Open Sans" panose="020B0606030504020204" pitchFamily="34" charset="0"/>
+              </a:rPr>
+              <a:t> </a:t>
+            </a:r>
+            <a:r>
+              <a:rPr lang="pt-BR" sz="1631" dirty="0" err="1">
+                <a:solidFill>
+                  <a:srgbClr val="000000">
+                    <a:lumMod val="65000"/>
+                    <a:lumOff val="35000"/>
+                  </a:srgbClr>
+                </a:solidFill>
+                <a:latin typeface="Calibri" panose="020F0502020204030204" pitchFamily="34" charset="0"/>
+                <a:ea typeface="Open Sans" panose="020B0606030504020204" pitchFamily="34" charset="0"/>
+                <a:cs typeface="Open Sans" panose="020B0606030504020204" pitchFamily="34" charset="0"/>
+              </a:rPr>
+              <a:t>init</a:t>
+            </a:r>
+            <a:r>
+              <a:rPr lang="pt-BR" sz="1631" dirty="0">
+                <a:solidFill>
+                  <a:srgbClr val="000000">
+                    <a:lumMod val="65000"/>
+                    <a:lumOff val="35000"/>
+                  </a:srgbClr>
+                </a:solidFill>
+                <a:latin typeface="Calibri" panose="020F0502020204030204" pitchFamily="34" charset="0"/>
+                <a:ea typeface="Open Sans" panose="020B0606030504020204" pitchFamily="34" charset="0"/>
+                <a:cs typeface="Open Sans" panose="020B0606030504020204" pitchFamily="34" charset="0"/>
+              </a:rPr>
+              <a:t>” é o comando responsável  por criar um repositório completo</a:t>
+            </a:r>
+            <a:r>
+              <a:rPr lang="pt-BR" sz="1631" dirty="0">
+                <a:solidFill>
+                  <a:srgbClr val="000000">
+                    <a:lumMod val="65000"/>
+                    <a:lumOff val="35000"/>
+                  </a:srgbClr>
+                </a:solidFill>
+                <a:latin typeface="Calibri" panose="020F0502020204030204" pitchFamily="34" charset="0"/>
+                <a:ea typeface="Open Sans" panose="020B0606030504020204" pitchFamily="34" charset="0"/>
+                <a:cs typeface="Open Sans" panose="020B0606030504020204" pitchFamily="34" charset="0"/>
+                <a:sym typeface="Calibri"/>
+              </a:rPr>
+              <a:t>;</a:t>
+            </a:r>
+          </a:p>
+        </p:txBody>
+      </p:sp>
+      <p:pic>
+        <p:nvPicPr>
+          <p:cNvPr id="5" name="Imagem 4"/>
+          <p:cNvPicPr>
+            <a:picLocks noChangeAspect="1"/>
+          </p:cNvPicPr>
+          <p:nvPr/>
+        </p:nvPicPr>
+        <p:blipFill>
+          <a:blip r:embed="rId2"/>
+          <a:stretch>
+            <a:fillRect/>
+          </a:stretch>
+        </p:blipFill>
+        <p:spPr>
+          <a:xfrm>
+            <a:off x="2300286" y="3521749"/>
+            <a:ext cx="6072189" cy="3413939"/>
+          </a:xfrm>
+          <a:prstGeom prst="rect">
+            <a:avLst/>
+          </a:prstGeom>
+        </p:spPr>
+      </p:pic>
+    </p:spTree>
+    <p:extLst>
+      <p:ext uri="{BB962C8B-B14F-4D97-AF65-F5344CB8AC3E}">
+        <p14:creationId xmlns:p14="http://schemas.microsoft.com/office/powerpoint/2010/main" val="1965531323"/>
+      </p:ext>
+    </p:extLst>
+  </p:cSld>
+  <p:clrMapOvr>
+    <a:masterClrMapping/>
+  </p:clrMapOvr>
+  <p:transition spd="med"/>
+</p:sld>
+</file>
+
+<file path=ppt/slides/slide11.xml><?xml version="1.0" encoding="utf-8"?>
+<p:sld xmlns:a="http://schemas.openxmlformats.org/drawingml/2006/main" xmlns:r="http://schemas.openxmlformats.org/officeDocument/2006/relationships" xmlns:p="http://schemas.openxmlformats.org/presentationml/2006/main">
+  <p:cSld>
+    <p:spTree>
+      <p:nvGrpSpPr>
+        <p:cNvPr id="1" name=""/>
+        <p:cNvGrpSpPr/>
+        <p:nvPr/>
+      </p:nvGrpSpPr>
+      <p:grpSpPr>
+        <a:xfrm>
+          <a:off x="0" y="0"/>
+          <a:ext cx="0" cy="0"/>
+          <a:chOff x="0" y="0"/>
+          <a:chExt cx="0" cy="0"/>
+        </a:xfrm>
+      </p:grpSpPr>
+      <p:sp>
+        <p:nvSpPr>
+          <p:cNvPr id="2" name="CaixaDeTexto 35"/>
+          <p:cNvSpPr txBox="1"/>
+          <p:nvPr/>
+        </p:nvSpPr>
+        <p:spPr>
+          <a:xfrm>
+            <a:off x="250036" y="2646126"/>
+            <a:ext cx="4036213" cy="315471"/>
+          </a:xfrm>
+          <a:prstGeom prst="rect">
+            <a:avLst/>
+          </a:prstGeom>
+          <a:solidFill>
+            <a:srgbClr val="0AB4BA"/>
+          </a:solidFill>
+        </p:spPr>
+        <p:txBody>
+          <a:bodyPr wrap="square" rtlCol="0" anchor="ctr">
+            <a:spAutoFit/>
+          </a:bodyPr>
+          <a:lstStyle>
+            <a:defPPr>
+              <a:defRPr lang="pt-BR"/>
+            </a:defPPr>
+            <a:lvl1pPr marL="0" algn="l" defTabSz="914400" rtl="0" eaLnBrk="1" latinLnBrk="0" hangingPunct="1">
+              <a:defRPr sz="1800" kern="1200">
+                <a:solidFill>
+                  <a:schemeClr val="tx1"/>
+                </a:solidFill>
+                <a:latin typeface="+mn-lt"/>
+                <a:ea typeface="+mn-ea"/>
+                <a:cs typeface="+mn-cs"/>
+              </a:defRPr>
+            </a:lvl1pPr>
+            <a:lvl2pPr marL="457200" algn="l" defTabSz="914400" rtl="0" eaLnBrk="1" latinLnBrk="0" hangingPunct="1">
+              <a:defRPr sz="1800" kern="1200">
+                <a:solidFill>
+                  <a:schemeClr val="tx1"/>
+                </a:solidFill>
+                <a:latin typeface="+mn-lt"/>
+                <a:ea typeface="+mn-ea"/>
+                <a:cs typeface="+mn-cs"/>
+              </a:defRPr>
+            </a:lvl2pPr>
+            <a:lvl3pPr marL="914400" algn="l" defTabSz="914400" rtl="0" eaLnBrk="1" latinLnBrk="0" hangingPunct="1">
+              <a:defRPr sz="1800" kern="1200">
+                <a:solidFill>
+                  <a:schemeClr val="tx1"/>
+                </a:solidFill>
+                <a:latin typeface="+mn-lt"/>
+                <a:ea typeface="+mn-ea"/>
+                <a:cs typeface="+mn-cs"/>
+              </a:defRPr>
+            </a:lvl3pPr>
+            <a:lvl4pPr marL="1371600" algn="l" defTabSz="914400" rtl="0" eaLnBrk="1" latinLnBrk="0" hangingPunct="1">
+              <a:defRPr sz="1800" kern="1200">
+                <a:solidFill>
+                  <a:schemeClr val="tx1"/>
+                </a:solidFill>
+                <a:latin typeface="+mn-lt"/>
+                <a:ea typeface="+mn-ea"/>
+                <a:cs typeface="+mn-cs"/>
+              </a:defRPr>
+            </a:lvl4pPr>
+            <a:lvl5pPr marL="1828800" algn="l" defTabSz="914400" rtl="0" eaLnBrk="1" latinLnBrk="0" hangingPunct="1">
+              <a:defRPr sz="1800" kern="1200">
+                <a:solidFill>
+                  <a:schemeClr val="tx1"/>
+                </a:solidFill>
+                <a:latin typeface="+mn-lt"/>
+                <a:ea typeface="+mn-ea"/>
+                <a:cs typeface="+mn-cs"/>
+              </a:defRPr>
+            </a:lvl5pPr>
+            <a:lvl6pPr marL="2286000" algn="l" defTabSz="914400" rtl="0" eaLnBrk="1" latinLnBrk="0" hangingPunct="1">
+              <a:defRPr sz="1800" kern="1200">
+                <a:solidFill>
+                  <a:schemeClr val="tx1"/>
+                </a:solidFill>
+                <a:latin typeface="+mn-lt"/>
+                <a:ea typeface="+mn-ea"/>
+                <a:cs typeface="+mn-cs"/>
+              </a:defRPr>
+            </a:lvl6pPr>
+            <a:lvl7pPr marL="2743200" algn="l" defTabSz="914400" rtl="0" eaLnBrk="1" latinLnBrk="0" hangingPunct="1">
+              <a:defRPr sz="1800" kern="1200">
+                <a:solidFill>
+                  <a:schemeClr val="tx1"/>
+                </a:solidFill>
+                <a:latin typeface="+mn-lt"/>
+                <a:ea typeface="+mn-ea"/>
+                <a:cs typeface="+mn-cs"/>
+              </a:defRPr>
+            </a:lvl7pPr>
+            <a:lvl8pPr marL="3200400" algn="l" defTabSz="914400" rtl="0" eaLnBrk="1" latinLnBrk="0" hangingPunct="1">
+              <a:defRPr sz="1800" kern="1200">
+                <a:solidFill>
+                  <a:schemeClr val="tx1"/>
+                </a:solidFill>
+                <a:latin typeface="+mn-lt"/>
+                <a:ea typeface="+mn-ea"/>
+                <a:cs typeface="+mn-cs"/>
+              </a:defRPr>
+            </a:lvl8pPr>
+            <a:lvl9pPr marL="3657600" algn="l" defTabSz="914400" rtl="0" eaLnBrk="1" latinLnBrk="0" hangingPunct="1">
+              <a:defRPr sz="1800" kern="1200">
+                <a:solidFill>
+                  <a:schemeClr val="tx1"/>
+                </a:solidFill>
+                <a:latin typeface="+mn-lt"/>
+                <a:ea typeface="+mn-ea"/>
+                <a:cs typeface="+mn-cs"/>
+              </a:defRPr>
+            </a:lvl9pPr>
+          </a:lstStyle>
+          <a:p>
+            <a:pPr algn="ctr"/>
+            <a:r>
+              <a:rPr lang="pt-BR" sz="1450" b="1" kern="0" spc="27" dirty="0">
+                <a:solidFill>
+                  <a:schemeClr val="bg1"/>
+                </a:solidFill>
+                <a:latin typeface="Calibri" panose="020F0502020204030204" pitchFamily="34" charset="0"/>
+                <a:cs typeface="Gotham-Light"/>
+              </a:rPr>
+              <a:t>Execute o comando “</a:t>
+            </a:r>
+            <a:r>
+              <a:rPr lang="pt-BR" sz="1450" b="1" kern="0" spc="27" dirty="0" err="1">
+                <a:solidFill>
+                  <a:schemeClr val="bg1"/>
+                </a:solidFill>
+                <a:latin typeface="Calibri" panose="020F0502020204030204" pitchFamily="34" charset="0"/>
+                <a:cs typeface="Gotham-Light"/>
+              </a:rPr>
+              <a:t>git</a:t>
+            </a:r>
+            <a:r>
+              <a:rPr lang="pt-BR" sz="1450" b="1" kern="0" spc="27" dirty="0">
+                <a:solidFill>
+                  <a:schemeClr val="bg1"/>
+                </a:solidFill>
+                <a:latin typeface="Calibri" panose="020F0502020204030204" pitchFamily="34" charset="0"/>
+                <a:cs typeface="Gotham-Light"/>
+              </a:rPr>
+              <a:t> status”</a:t>
+            </a:r>
+          </a:p>
+        </p:txBody>
+      </p:sp>
+      <p:sp>
+        <p:nvSpPr>
+          <p:cNvPr id="4" name="Subtítulo 5"/>
+          <p:cNvSpPr txBox="1">
+            <a:spLocks/>
+          </p:cNvSpPr>
+          <p:nvPr/>
+        </p:nvSpPr>
+        <p:spPr bwMode="auto">
+          <a:xfrm>
+            <a:off x="1655106" y="5395343"/>
+            <a:ext cx="6634104" cy="1248461"/>
+          </a:xfrm>
+          <a:prstGeom prst="rect">
+            <a:avLst/>
+          </a:prstGeom>
+          <a:noFill/>
+          <a:ln>
+            <a:noFill/>
+          </a:ln>
+          <a:extLst>
+            <a:ext uri="{909E8E84-426E-40DD-AFC4-6F175D3DCCD1}">
+              <a14:hiddenFill xmlns:a14="http://schemas.microsoft.com/office/drawing/2010/main">
+                <a:solidFill>
+                  <a:srgbClr val="FFFFFF"/>
+                </a:solidFill>
+              </a14:hiddenFill>
+            </a:ext>
+            <a:ext uri="{91240B29-F687-4F45-9708-019B960494DF}">
+              <a14:hiddenLine xmlns:a14="http://schemas.microsoft.com/office/drawing/2010/main" w="9525">
+                <a:solidFill>
+                  <a:srgbClr val="000000"/>
+                </a:solidFill>
+                <a:miter lim="800000"/>
+                <a:headEnd/>
+                <a:tailEnd/>
+              </a14:hiddenLine>
+            </a:ext>
+          </a:extLst>
+        </p:spPr>
+        <p:txBody>
+          <a:bodyPr wrap="square" anchor="t" anchorCtr="0">
+            <a:noAutofit/>
+          </a:bodyPr>
+          <a:lstStyle>
+            <a:defPPr>
+              <a:defRPr lang="pt-BR"/>
+            </a:defPPr>
+            <a:lvl1pPr marL="0" algn="l" defTabSz="914400" rtl="0" eaLnBrk="1" latinLnBrk="0" hangingPunct="1">
+              <a:defRPr sz="1800" kern="1200">
+                <a:solidFill>
+                  <a:schemeClr val="tx1"/>
+                </a:solidFill>
+                <a:latin typeface="+mn-lt"/>
+                <a:ea typeface="+mn-ea"/>
+                <a:cs typeface="+mn-cs"/>
+              </a:defRPr>
+            </a:lvl1pPr>
+            <a:lvl2pPr marL="457200" algn="l" defTabSz="914400" rtl="0" eaLnBrk="1" latinLnBrk="0" hangingPunct="1">
+              <a:defRPr sz="1800" kern="1200">
+                <a:solidFill>
+                  <a:schemeClr val="tx1"/>
+                </a:solidFill>
+                <a:latin typeface="+mn-lt"/>
+                <a:ea typeface="+mn-ea"/>
+                <a:cs typeface="+mn-cs"/>
+              </a:defRPr>
+            </a:lvl2pPr>
+            <a:lvl3pPr marL="914400" algn="l" defTabSz="914400" rtl="0" eaLnBrk="1" latinLnBrk="0" hangingPunct="1">
+              <a:defRPr sz="1800" kern="1200">
+                <a:solidFill>
+                  <a:schemeClr val="tx1"/>
+                </a:solidFill>
+                <a:latin typeface="+mn-lt"/>
+                <a:ea typeface="+mn-ea"/>
+                <a:cs typeface="+mn-cs"/>
+              </a:defRPr>
+            </a:lvl3pPr>
+            <a:lvl4pPr marL="1371600" algn="l" defTabSz="914400" rtl="0" eaLnBrk="1" latinLnBrk="0" hangingPunct="1">
+              <a:defRPr sz="1800" kern="1200">
+                <a:solidFill>
+                  <a:schemeClr val="tx1"/>
+                </a:solidFill>
+                <a:latin typeface="+mn-lt"/>
+                <a:ea typeface="+mn-ea"/>
+                <a:cs typeface="+mn-cs"/>
+              </a:defRPr>
+            </a:lvl4pPr>
+            <a:lvl5pPr marL="1828800" algn="l" defTabSz="914400" rtl="0" eaLnBrk="1" latinLnBrk="0" hangingPunct="1">
+              <a:defRPr sz="1800" kern="1200">
+                <a:solidFill>
+                  <a:schemeClr val="tx1"/>
+                </a:solidFill>
+                <a:latin typeface="+mn-lt"/>
+                <a:ea typeface="+mn-ea"/>
+                <a:cs typeface="+mn-cs"/>
+              </a:defRPr>
+            </a:lvl5pPr>
+            <a:lvl6pPr marL="2286000" algn="l" defTabSz="914400" rtl="0" eaLnBrk="1" latinLnBrk="0" hangingPunct="1">
+              <a:defRPr sz="1800" kern="1200">
+                <a:solidFill>
+                  <a:schemeClr val="tx1"/>
+                </a:solidFill>
+                <a:latin typeface="+mn-lt"/>
+                <a:ea typeface="+mn-ea"/>
+                <a:cs typeface="+mn-cs"/>
+              </a:defRPr>
+            </a:lvl6pPr>
+            <a:lvl7pPr marL="2743200" algn="l" defTabSz="914400" rtl="0" eaLnBrk="1" latinLnBrk="0" hangingPunct="1">
+              <a:defRPr sz="1800" kern="1200">
+                <a:solidFill>
+                  <a:schemeClr val="tx1"/>
+                </a:solidFill>
+                <a:latin typeface="+mn-lt"/>
+                <a:ea typeface="+mn-ea"/>
+                <a:cs typeface="+mn-cs"/>
+              </a:defRPr>
+            </a:lvl7pPr>
+            <a:lvl8pPr marL="3200400" algn="l" defTabSz="914400" rtl="0" eaLnBrk="1" latinLnBrk="0" hangingPunct="1">
+              <a:defRPr sz="1800" kern="1200">
+                <a:solidFill>
+                  <a:schemeClr val="tx1"/>
+                </a:solidFill>
+                <a:latin typeface="+mn-lt"/>
+                <a:ea typeface="+mn-ea"/>
+                <a:cs typeface="+mn-cs"/>
+              </a:defRPr>
+            </a:lvl8pPr>
+            <a:lvl9pPr marL="3657600" algn="l" defTabSz="914400" rtl="0" eaLnBrk="1" latinLnBrk="0" hangingPunct="1">
+              <a:defRPr sz="1800" kern="1200">
+                <a:solidFill>
+                  <a:schemeClr val="tx1"/>
+                </a:solidFill>
+                <a:latin typeface="+mn-lt"/>
+                <a:ea typeface="+mn-ea"/>
+                <a:cs typeface="+mn-cs"/>
+              </a:defRPr>
+            </a:lvl9pPr>
+          </a:lstStyle>
+          <a:p>
+            <a:pPr marL="258890" indent="-258890" defTabSz="414223">
+              <a:lnSpc>
+                <a:spcPct val="80000"/>
+              </a:lnSpc>
+              <a:spcAft>
+                <a:spcPts val="725"/>
+              </a:spcAft>
+              <a:buClr>
+                <a:srgbClr val="C05200"/>
+              </a:buClr>
+              <a:buFont typeface="Arial" panose="020B0604020202020204" pitchFamily="34" charset="0"/>
+              <a:buChar char="•"/>
+              <a:defRPr/>
+            </a:pPr>
+            <a:r>
+              <a:rPr lang="pt-BR" sz="1631" dirty="0">
+                <a:solidFill>
+                  <a:srgbClr val="000000">
+                    <a:lumMod val="65000"/>
+                    <a:lumOff val="35000"/>
+                  </a:srgbClr>
+                </a:solidFill>
+                <a:latin typeface="Calibri" panose="020F0502020204030204" pitchFamily="34" charset="0"/>
+                <a:ea typeface="Open Sans" panose="020B0606030504020204" pitchFamily="34" charset="0"/>
+                <a:cs typeface="Open Sans" panose="020B0606030504020204" pitchFamily="34" charset="0"/>
+                <a:sym typeface="Calibri"/>
+              </a:rPr>
+              <a:t>O comando “</a:t>
+            </a:r>
+            <a:r>
+              <a:rPr lang="pt-BR" sz="1631" dirty="0" err="1">
+                <a:solidFill>
+                  <a:srgbClr val="000000">
+                    <a:lumMod val="65000"/>
+                    <a:lumOff val="35000"/>
+                  </a:srgbClr>
+                </a:solidFill>
+                <a:latin typeface="Calibri" panose="020F0502020204030204" pitchFamily="34" charset="0"/>
+                <a:ea typeface="Open Sans" panose="020B0606030504020204" pitchFamily="34" charset="0"/>
+                <a:cs typeface="Open Sans" panose="020B0606030504020204" pitchFamily="34" charset="0"/>
+                <a:sym typeface="Calibri"/>
+              </a:rPr>
+              <a:t>git</a:t>
+            </a:r>
+            <a:r>
+              <a:rPr lang="pt-BR" sz="1631" dirty="0">
+                <a:solidFill>
+                  <a:srgbClr val="000000">
+                    <a:lumMod val="65000"/>
+                    <a:lumOff val="35000"/>
+                  </a:srgbClr>
+                </a:solidFill>
+                <a:latin typeface="Calibri" panose="020F0502020204030204" pitchFamily="34" charset="0"/>
+                <a:ea typeface="Open Sans" panose="020B0606030504020204" pitchFamily="34" charset="0"/>
+                <a:cs typeface="Open Sans" panose="020B0606030504020204" pitchFamily="34" charset="0"/>
+                <a:sym typeface="Calibri"/>
+              </a:rPr>
+              <a:t> status” mostra o estado atual do nosso repositório;</a:t>
+            </a:r>
+          </a:p>
+          <a:p>
+            <a:pPr marL="258890" indent="-258890" defTabSz="414223">
+              <a:lnSpc>
+                <a:spcPct val="80000"/>
+              </a:lnSpc>
+              <a:spcAft>
+                <a:spcPts val="725"/>
+              </a:spcAft>
+              <a:buClr>
+                <a:srgbClr val="C05200"/>
+              </a:buClr>
+              <a:buFont typeface="Arial" panose="020B0604020202020204" pitchFamily="34" charset="0"/>
+              <a:buChar char="•"/>
+              <a:defRPr/>
+            </a:pPr>
+            <a:r>
+              <a:rPr lang="pt-BR" sz="1631" dirty="0">
+                <a:solidFill>
+                  <a:srgbClr val="000000">
+                    <a:lumMod val="65000"/>
+                    <a:lumOff val="35000"/>
+                  </a:srgbClr>
+                </a:solidFill>
+                <a:latin typeface="Calibri" panose="020F0502020204030204" pitchFamily="34" charset="0"/>
+                <a:ea typeface="Open Sans" panose="020B0606030504020204" pitchFamily="34" charset="0"/>
+                <a:cs typeface="Open Sans" panose="020B0606030504020204" pitchFamily="34" charset="0"/>
+              </a:rPr>
+              <a:t>A mensagem indica que nosso arquivo ainda não está sendo rastreado pelo </a:t>
+            </a:r>
+            <a:r>
+              <a:rPr lang="pt-BR" sz="1631" dirty="0" err="1">
+                <a:solidFill>
+                  <a:srgbClr val="000000">
+                    <a:lumMod val="65000"/>
+                    <a:lumOff val="35000"/>
+                  </a:srgbClr>
+                </a:solidFill>
+                <a:latin typeface="Calibri" panose="020F0502020204030204" pitchFamily="34" charset="0"/>
+                <a:ea typeface="Open Sans" panose="020B0606030504020204" pitchFamily="34" charset="0"/>
+                <a:cs typeface="Open Sans" panose="020B0606030504020204" pitchFamily="34" charset="0"/>
+              </a:rPr>
+              <a:t>git</a:t>
+            </a:r>
+            <a:r>
+              <a:rPr lang="pt-BR" sz="1631" dirty="0">
+                <a:solidFill>
+                  <a:srgbClr val="000000">
+                    <a:lumMod val="65000"/>
+                    <a:lumOff val="35000"/>
+                  </a:srgbClr>
+                </a:solidFill>
+                <a:latin typeface="Calibri" panose="020F0502020204030204" pitchFamily="34" charset="0"/>
+                <a:ea typeface="Open Sans" panose="020B0606030504020204" pitchFamily="34" charset="0"/>
+                <a:cs typeface="Open Sans" panose="020B0606030504020204" pitchFamily="34" charset="0"/>
+              </a:rPr>
+              <a:t>;</a:t>
+            </a:r>
+          </a:p>
+          <a:p>
+            <a:pPr marL="258890" indent="-258890" defTabSz="414223">
+              <a:lnSpc>
+                <a:spcPct val="80000"/>
+              </a:lnSpc>
+              <a:spcAft>
+                <a:spcPts val="725"/>
+              </a:spcAft>
+              <a:buClr>
+                <a:srgbClr val="C05200"/>
+              </a:buClr>
+              <a:buFont typeface="Arial" panose="020B0604020202020204" pitchFamily="34" charset="0"/>
+              <a:buChar char="•"/>
+              <a:defRPr/>
+            </a:pPr>
+            <a:endParaRPr lang="pt-BR" sz="1631" dirty="0">
+              <a:solidFill>
+                <a:srgbClr val="000000">
+                  <a:lumMod val="65000"/>
+                  <a:lumOff val="35000"/>
+                </a:srgbClr>
+              </a:solidFill>
+              <a:latin typeface="Calibri" panose="020F0502020204030204" pitchFamily="34" charset="0"/>
+              <a:ea typeface="Open Sans" panose="020B0606030504020204" pitchFamily="34" charset="0"/>
+              <a:cs typeface="Open Sans" panose="020B0606030504020204" pitchFamily="34" charset="0"/>
+              <a:sym typeface="Calibri"/>
+            </a:endParaRPr>
+          </a:p>
+          <a:p>
+            <a:pPr marL="258890" indent="-258890" defTabSz="414223">
+              <a:lnSpc>
+                <a:spcPct val="80000"/>
+              </a:lnSpc>
+              <a:spcAft>
+                <a:spcPts val="725"/>
+              </a:spcAft>
+              <a:buClr>
+                <a:srgbClr val="C05200"/>
+              </a:buClr>
+              <a:buFont typeface="Arial" panose="020B0604020202020204" pitchFamily="34" charset="0"/>
+              <a:buChar char="•"/>
+              <a:defRPr/>
+            </a:pPr>
+            <a:endParaRPr lang="pt-BR" sz="1631" dirty="0">
+              <a:solidFill>
+                <a:srgbClr val="000000">
+                  <a:lumMod val="65000"/>
+                  <a:lumOff val="35000"/>
+                </a:srgbClr>
+              </a:solidFill>
+              <a:latin typeface="Calibri" panose="020F0502020204030204" pitchFamily="34" charset="0"/>
+              <a:ea typeface="Open Sans" panose="020B0606030504020204" pitchFamily="34" charset="0"/>
+              <a:cs typeface="Open Sans" panose="020B0606030504020204" pitchFamily="34" charset="0"/>
+              <a:sym typeface="Calibri"/>
+            </a:endParaRPr>
+          </a:p>
+        </p:txBody>
+      </p:sp>
+      <p:pic>
+        <p:nvPicPr>
+          <p:cNvPr id="5" name="Imagem 4"/>
+          <p:cNvPicPr>
+            <a:picLocks noChangeAspect="1"/>
+          </p:cNvPicPr>
+          <p:nvPr/>
+        </p:nvPicPr>
+        <p:blipFill>
+          <a:blip r:embed="rId2"/>
+          <a:stretch>
+            <a:fillRect/>
+          </a:stretch>
+        </p:blipFill>
+        <p:spPr>
+          <a:xfrm>
+            <a:off x="4764524" y="1664374"/>
+            <a:ext cx="5171637" cy="2907626"/>
+          </a:xfrm>
+          <a:prstGeom prst="rect">
+            <a:avLst/>
+          </a:prstGeom>
+        </p:spPr>
+      </p:pic>
+    </p:spTree>
+    <p:extLst>
+      <p:ext uri="{BB962C8B-B14F-4D97-AF65-F5344CB8AC3E}">
+        <p14:creationId xmlns:p14="http://schemas.microsoft.com/office/powerpoint/2010/main" val="1269739693"/>
+      </p:ext>
+    </p:extLst>
+  </p:cSld>
+  <p:clrMapOvr>
+    <a:masterClrMapping/>
+  </p:clrMapOvr>
+  <p:transition spd="med"/>
+</p:sld>
+</file>
+
+<file path=ppt/slides/slide12.xml><?xml version="1.0" encoding="utf-8"?>
+<p:sld xmlns:a="http://schemas.openxmlformats.org/drawingml/2006/main" xmlns:r="http://schemas.openxmlformats.org/officeDocument/2006/relationships" xmlns:p="http://schemas.openxmlformats.org/presentationml/2006/main">
+  <p:cSld>
+    <p:spTree>
+      <p:nvGrpSpPr>
+        <p:cNvPr id="1" name=""/>
+        <p:cNvGrpSpPr/>
+        <p:nvPr/>
+      </p:nvGrpSpPr>
+      <p:grpSpPr>
+        <a:xfrm>
+          <a:off x="0" y="0"/>
+          <a:ext cx="0" cy="0"/>
+          <a:chOff x="0" y="0"/>
+          <a:chExt cx="0" cy="0"/>
+        </a:xfrm>
+      </p:grpSpPr>
+      <p:sp>
+        <p:nvSpPr>
+          <p:cNvPr id="2" name="CaixaDeTexto 35"/>
+          <p:cNvSpPr txBox="1"/>
+          <p:nvPr/>
+        </p:nvSpPr>
+        <p:spPr>
+          <a:xfrm>
+            <a:off x="2035974" y="1731726"/>
+            <a:ext cx="6450801" cy="315471"/>
+          </a:xfrm>
+          <a:prstGeom prst="rect">
+            <a:avLst/>
+          </a:prstGeom>
+          <a:solidFill>
+            <a:srgbClr val="0AB4BA"/>
+          </a:solidFill>
+        </p:spPr>
+        <p:txBody>
+          <a:bodyPr wrap="square" rtlCol="0" anchor="ctr">
+            <a:spAutoFit/>
+          </a:bodyPr>
+          <a:lstStyle>
+            <a:defPPr>
+              <a:defRPr lang="pt-BR"/>
+            </a:defPPr>
+            <a:lvl1pPr marL="0" algn="l" defTabSz="914400" rtl="0" eaLnBrk="1" latinLnBrk="0" hangingPunct="1">
+              <a:defRPr sz="1800" kern="1200">
+                <a:solidFill>
+                  <a:schemeClr val="tx1"/>
+                </a:solidFill>
+                <a:latin typeface="+mn-lt"/>
+                <a:ea typeface="+mn-ea"/>
+                <a:cs typeface="+mn-cs"/>
+              </a:defRPr>
+            </a:lvl1pPr>
+            <a:lvl2pPr marL="457200" algn="l" defTabSz="914400" rtl="0" eaLnBrk="1" latinLnBrk="0" hangingPunct="1">
+              <a:defRPr sz="1800" kern="1200">
+                <a:solidFill>
+                  <a:schemeClr val="tx1"/>
+                </a:solidFill>
+                <a:latin typeface="+mn-lt"/>
+                <a:ea typeface="+mn-ea"/>
+                <a:cs typeface="+mn-cs"/>
+              </a:defRPr>
+            </a:lvl2pPr>
+            <a:lvl3pPr marL="914400" algn="l" defTabSz="914400" rtl="0" eaLnBrk="1" latinLnBrk="0" hangingPunct="1">
+              <a:defRPr sz="1800" kern="1200">
+                <a:solidFill>
+                  <a:schemeClr val="tx1"/>
+                </a:solidFill>
+                <a:latin typeface="+mn-lt"/>
+                <a:ea typeface="+mn-ea"/>
+                <a:cs typeface="+mn-cs"/>
+              </a:defRPr>
+            </a:lvl3pPr>
+            <a:lvl4pPr marL="1371600" algn="l" defTabSz="914400" rtl="0" eaLnBrk="1" latinLnBrk="0" hangingPunct="1">
+              <a:defRPr sz="1800" kern="1200">
+                <a:solidFill>
+                  <a:schemeClr val="tx1"/>
+                </a:solidFill>
+                <a:latin typeface="+mn-lt"/>
+                <a:ea typeface="+mn-ea"/>
+                <a:cs typeface="+mn-cs"/>
+              </a:defRPr>
+            </a:lvl4pPr>
+            <a:lvl5pPr marL="1828800" algn="l" defTabSz="914400" rtl="0" eaLnBrk="1" latinLnBrk="0" hangingPunct="1">
+              <a:defRPr sz="1800" kern="1200">
+                <a:solidFill>
+                  <a:schemeClr val="tx1"/>
+                </a:solidFill>
+                <a:latin typeface="+mn-lt"/>
+                <a:ea typeface="+mn-ea"/>
+                <a:cs typeface="+mn-cs"/>
+              </a:defRPr>
+            </a:lvl5pPr>
+            <a:lvl6pPr marL="2286000" algn="l" defTabSz="914400" rtl="0" eaLnBrk="1" latinLnBrk="0" hangingPunct="1">
+              <a:defRPr sz="1800" kern="1200">
+                <a:solidFill>
+                  <a:schemeClr val="tx1"/>
+                </a:solidFill>
+                <a:latin typeface="+mn-lt"/>
+                <a:ea typeface="+mn-ea"/>
+                <a:cs typeface="+mn-cs"/>
+              </a:defRPr>
+            </a:lvl6pPr>
+            <a:lvl7pPr marL="2743200" algn="l" defTabSz="914400" rtl="0" eaLnBrk="1" latinLnBrk="0" hangingPunct="1">
+              <a:defRPr sz="1800" kern="1200">
+                <a:solidFill>
+                  <a:schemeClr val="tx1"/>
+                </a:solidFill>
+                <a:latin typeface="+mn-lt"/>
+                <a:ea typeface="+mn-ea"/>
+                <a:cs typeface="+mn-cs"/>
+              </a:defRPr>
+            </a:lvl7pPr>
+            <a:lvl8pPr marL="3200400" algn="l" defTabSz="914400" rtl="0" eaLnBrk="1" latinLnBrk="0" hangingPunct="1">
+              <a:defRPr sz="1800" kern="1200">
+                <a:solidFill>
+                  <a:schemeClr val="tx1"/>
+                </a:solidFill>
+                <a:latin typeface="+mn-lt"/>
+                <a:ea typeface="+mn-ea"/>
+                <a:cs typeface="+mn-cs"/>
+              </a:defRPr>
+            </a:lvl8pPr>
+            <a:lvl9pPr marL="3657600" algn="l" defTabSz="914400" rtl="0" eaLnBrk="1" latinLnBrk="0" hangingPunct="1">
+              <a:defRPr sz="1800" kern="1200">
+                <a:solidFill>
+                  <a:schemeClr val="tx1"/>
+                </a:solidFill>
+                <a:latin typeface="+mn-lt"/>
+                <a:ea typeface="+mn-ea"/>
+                <a:cs typeface="+mn-cs"/>
+              </a:defRPr>
+            </a:lvl9pPr>
+          </a:lstStyle>
+          <a:p>
+            <a:pPr algn="ctr"/>
+            <a:r>
+              <a:rPr lang="pt-BR" sz="1450" b="1" kern="0" spc="27" dirty="0">
+                <a:solidFill>
+                  <a:schemeClr val="bg1"/>
+                </a:solidFill>
+                <a:latin typeface="Calibri" panose="020F0502020204030204" pitchFamily="34" charset="0"/>
+                <a:cs typeface="Gotham-Light"/>
+              </a:rPr>
+              <a:t>Execute o comando “</a:t>
+            </a:r>
+            <a:r>
+              <a:rPr lang="pt-BR" sz="1450" b="1" kern="0" spc="27" dirty="0" err="1">
+                <a:solidFill>
+                  <a:schemeClr val="bg1"/>
+                </a:solidFill>
+                <a:latin typeface="Calibri" panose="020F0502020204030204" pitchFamily="34" charset="0"/>
+                <a:cs typeface="Gotham-Light"/>
+              </a:rPr>
+              <a:t>git</a:t>
+            </a:r>
+            <a:r>
+              <a:rPr lang="pt-BR" sz="1450" b="1" kern="0" spc="27" dirty="0">
+                <a:solidFill>
+                  <a:schemeClr val="bg1"/>
+                </a:solidFill>
+                <a:latin typeface="Calibri" panose="020F0502020204030204" pitchFamily="34" charset="0"/>
+                <a:cs typeface="Gotham-Light"/>
+              </a:rPr>
+              <a:t> </a:t>
+            </a:r>
+            <a:r>
+              <a:rPr lang="pt-BR" sz="1450" b="1" kern="0" spc="27" dirty="0" err="1">
+                <a:solidFill>
+                  <a:schemeClr val="bg1"/>
+                </a:solidFill>
+                <a:latin typeface="Calibri" panose="020F0502020204030204" pitchFamily="34" charset="0"/>
+                <a:cs typeface="Gotham-Light"/>
+              </a:rPr>
+              <a:t>add</a:t>
+            </a:r>
+            <a:r>
+              <a:rPr lang="pt-BR" sz="1450" b="1" kern="0" spc="27" dirty="0">
+                <a:solidFill>
+                  <a:schemeClr val="bg1"/>
+                </a:solidFill>
+                <a:latin typeface="Calibri" panose="020F0502020204030204" pitchFamily="34" charset="0"/>
+                <a:cs typeface="Gotham-Light"/>
+              </a:rPr>
+              <a:t> index.html” e execute mais uma vez “</a:t>
+            </a:r>
+            <a:r>
+              <a:rPr lang="pt-BR" sz="1450" b="1" kern="0" spc="27" dirty="0" err="1">
+                <a:solidFill>
+                  <a:schemeClr val="bg1"/>
+                </a:solidFill>
+                <a:latin typeface="Calibri" panose="020F0502020204030204" pitchFamily="34" charset="0"/>
+                <a:cs typeface="Gotham-Light"/>
+              </a:rPr>
+              <a:t>git</a:t>
+            </a:r>
+            <a:r>
+              <a:rPr lang="pt-BR" sz="1450" b="1" kern="0" spc="27" dirty="0">
+                <a:solidFill>
+                  <a:schemeClr val="bg1"/>
+                </a:solidFill>
+                <a:latin typeface="Calibri" panose="020F0502020204030204" pitchFamily="34" charset="0"/>
+                <a:cs typeface="Gotham-Light"/>
+              </a:rPr>
+              <a:t> status”</a:t>
+            </a:r>
+          </a:p>
+        </p:txBody>
+      </p:sp>
+      <p:pic>
+        <p:nvPicPr>
+          <p:cNvPr id="4" name="Imagem 3"/>
+          <p:cNvPicPr>
+            <a:picLocks noChangeAspect="1"/>
+          </p:cNvPicPr>
+          <p:nvPr/>
+        </p:nvPicPr>
+        <p:blipFill>
+          <a:blip r:embed="rId2"/>
+          <a:stretch>
+            <a:fillRect/>
+          </a:stretch>
+        </p:blipFill>
+        <p:spPr>
+          <a:xfrm>
+            <a:off x="1571625" y="2335887"/>
+            <a:ext cx="7678737" cy="4317182"/>
+          </a:xfrm>
+          <a:prstGeom prst="rect">
+            <a:avLst/>
+          </a:prstGeom>
+        </p:spPr>
+      </p:pic>
+    </p:spTree>
+    <p:extLst>
+      <p:ext uri="{BB962C8B-B14F-4D97-AF65-F5344CB8AC3E}">
+        <p14:creationId xmlns:p14="http://schemas.microsoft.com/office/powerpoint/2010/main" val="2857019337"/>
+      </p:ext>
+    </p:extLst>
+  </p:cSld>
+  <p:clrMapOvr>
+    <a:masterClrMapping/>
+  </p:clrMapOvr>
+  <p:transition spd="med"/>
+</p:sld>
+</file>
+
+<file path=ppt/slides/slide13.xml><?xml version="1.0" encoding="utf-8"?>
+<p:sld xmlns:a="http://schemas.openxmlformats.org/drawingml/2006/main" xmlns:r="http://schemas.openxmlformats.org/officeDocument/2006/relationships" xmlns:p="http://schemas.openxmlformats.org/presentationml/2006/main">
+  <p:cSld>
+    <p:spTree>
+      <p:nvGrpSpPr>
+        <p:cNvPr id="1" name=""/>
+        <p:cNvGrpSpPr/>
+        <p:nvPr/>
+      </p:nvGrpSpPr>
+      <p:grpSpPr>
+        <a:xfrm>
+          <a:off x="0" y="0"/>
+          <a:ext cx="0" cy="0"/>
+          <a:chOff x="0" y="0"/>
+          <a:chExt cx="0" cy="0"/>
+        </a:xfrm>
+      </p:grpSpPr>
+      <p:pic>
+        <p:nvPicPr>
+          <p:cNvPr id="5" name="Imagem 4"/>
+          <p:cNvPicPr>
+            <a:picLocks noChangeAspect="1"/>
+          </p:cNvPicPr>
+          <p:nvPr/>
+        </p:nvPicPr>
+        <p:blipFill>
+          <a:blip r:embed="rId2"/>
+          <a:stretch>
+            <a:fillRect/>
+          </a:stretch>
+        </p:blipFill>
+        <p:spPr>
+          <a:xfrm>
+            <a:off x="2107805" y="2209789"/>
+            <a:ext cx="6750050" cy="3795050"/>
+          </a:xfrm>
+          <a:prstGeom prst="rect">
+            <a:avLst/>
+          </a:prstGeom>
+        </p:spPr>
+      </p:pic>
+      <p:sp>
+        <p:nvSpPr>
+          <p:cNvPr id="6" name="CaixaDeTexto 35"/>
+          <p:cNvSpPr txBox="1"/>
+          <p:nvPr/>
+        </p:nvSpPr>
+        <p:spPr>
+          <a:xfrm>
+            <a:off x="835823" y="1417401"/>
+            <a:ext cx="9294014" cy="315471"/>
+          </a:xfrm>
+          <a:prstGeom prst="rect">
+            <a:avLst/>
+          </a:prstGeom>
+          <a:solidFill>
+            <a:srgbClr val="0AB4BA"/>
+          </a:solidFill>
+        </p:spPr>
+        <p:txBody>
+          <a:bodyPr wrap="square" rtlCol="0" anchor="ctr">
+            <a:spAutoFit/>
+          </a:bodyPr>
+          <a:lstStyle>
+            <a:defPPr>
+              <a:defRPr lang="pt-BR"/>
+            </a:defPPr>
+            <a:lvl1pPr marL="0" algn="l" defTabSz="914400" rtl="0" eaLnBrk="1" latinLnBrk="0" hangingPunct="1">
+              <a:defRPr sz="1800" kern="1200">
+                <a:solidFill>
+                  <a:schemeClr val="tx1"/>
+                </a:solidFill>
+                <a:latin typeface="+mn-lt"/>
+                <a:ea typeface="+mn-ea"/>
+                <a:cs typeface="+mn-cs"/>
+              </a:defRPr>
+            </a:lvl1pPr>
+            <a:lvl2pPr marL="457200" algn="l" defTabSz="914400" rtl="0" eaLnBrk="1" latinLnBrk="0" hangingPunct="1">
+              <a:defRPr sz="1800" kern="1200">
+                <a:solidFill>
+                  <a:schemeClr val="tx1"/>
+                </a:solidFill>
+                <a:latin typeface="+mn-lt"/>
+                <a:ea typeface="+mn-ea"/>
+                <a:cs typeface="+mn-cs"/>
+              </a:defRPr>
+            </a:lvl2pPr>
+            <a:lvl3pPr marL="914400" algn="l" defTabSz="914400" rtl="0" eaLnBrk="1" latinLnBrk="0" hangingPunct="1">
+              <a:defRPr sz="1800" kern="1200">
+                <a:solidFill>
+                  <a:schemeClr val="tx1"/>
+                </a:solidFill>
+                <a:latin typeface="+mn-lt"/>
+                <a:ea typeface="+mn-ea"/>
+                <a:cs typeface="+mn-cs"/>
+              </a:defRPr>
+            </a:lvl3pPr>
+            <a:lvl4pPr marL="1371600" algn="l" defTabSz="914400" rtl="0" eaLnBrk="1" latinLnBrk="0" hangingPunct="1">
+              <a:defRPr sz="1800" kern="1200">
+                <a:solidFill>
+                  <a:schemeClr val="tx1"/>
+                </a:solidFill>
+                <a:latin typeface="+mn-lt"/>
+                <a:ea typeface="+mn-ea"/>
+                <a:cs typeface="+mn-cs"/>
+              </a:defRPr>
+            </a:lvl4pPr>
+            <a:lvl5pPr marL="1828800" algn="l" defTabSz="914400" rtl="0" eaLnBrk="1" latinLnBrk="0" hangingPunct="1">
+              <a:defRPr sz="1800" kern="1200">
+                <a:solidFill>
+                  <a:schemeClr val="tx1"/>
+                </a:solidFill>
+                <a:latin typeface="+mn-lt"/>
+                <a:ea typeface="+mn-ea"/>
+                <a:cs typeface="+mn-cs"/>
+              </a:defRPr>
+            </a:lvl5pPr>
+            <a:lvl6pPr marL="2286000" algn="l" defTabSz="914400" rtl="0" eaLnBrk="1" latinLnBrk="0" hangingPunct="1">
+              <a:defRPr sz="1800" kern="1200">
+                <a:solidFill>
+                  <a:schemeClr val="tx1"/>
+                </a:solidFill>
+                <a:latin typeface="+mn-lt"/>
+                <a:ea typeface="+mn-ea"/>
+                <a:cs typeface="+mn-cs"/>
+              </a:defRPr>
+            </a:lvl6pPr>
+            <a:lvl7pPr marL="2743200" algn="l" defTabSz="914400" rtl="0" eaLnBrk="1" latinLnBrk="0" hangingPunct="1">
+              <a:defRPr sz="1800" kern="1200">
+                <a:solidFill>
+                  <a:schemeClr val="tx1"/>
+                </a:solidFill>
+                <a:latin typeface="+mn-lt"/>
+                <a:ea typeface="+mn-ea"/>
+                <a:cs typeface="+mn-cs"/>
+              </a:defRPr>
+            </a:lvl7pPr>
+            <a:lvl8pPr marL="3200400" algn="l" defTabSz="914400" rtl="0" eaLnBrk="1" latinLnBrk="0" hangingPunct="1">
+              <a:defRPr sz="1800" kern="1200">
+                <a:solidFill>
+                  <a:schemeClr val="tx1"/>
+                </a:solidFill>
+                <a:latin typeface="+mn-lt"/>
+                <a:ea typeface="+mn-ea"/>
+                <a:cs typeface="+mn-cs"/>
+              </a:defRPr>
+            </a:lvl8pPr>
+            <a:lvl9pPr marL="3657600" algn="l" defTabSz="914400" rtl="0" eaLnBrk="1" latinLnBrk="0" hangingPunct="1">
+              <a:defRPr sz="1800" kern="1200">
+                <a:solidFill>
+                  <a:schemeClr val="tx1"/>
+                </a:solidFill>
+                <a:latin typeface="+mn-lt"/>
+                <a:ea typeface="+mn-ea"/>
+                <a:cs typeface="+mn-cs"/>
+              </a:defRPr>
+            </a:lvl9pPr>
+          </a:lstStyle>
+          <a:p>
+            <a:pPr algn="ctr"/>
+            <a:r>
+              <a:rPr lang="pt-BR" sz="1450" b="1" kern="0" spc="27" dirty="0">
+                <a:solidFill>
+                  <a:schemeClr val="bg1"/>
+                </a:solidFill>
+                <a:latin typeface="Calibri" panose="020F0502020204030204" pitchFamily="34" charset="0"/>
+                <a:cs typeface="Gotham-Light"/>
+              </a:rPr>
+              <a:t>Crie um arquivo chamado “estilo.css” e um diretório chamado imagens e coloque o logo da </a:t>
+            </a:r>
+            <a:r>
+              <a:rPr lang="pt-BR" sz="1450" b="1" kern="0" spc="27" dirty="0" err="1">
+                <a:solidFill>
+                  <a:schemeClr val="bg1"/>
+                </a:solidFill>
+                <a:latin typeface="Calibri" panose="020F0502020204030204" pitchFamily="34" charset="0"/>
+                <a:cs typeface="Gotham-Light"/>
+              </a:rPr>
+              <a:t>verity</a:t>
+            </a:r>
+            <a:r>
+              <a:rPr lang="pt-BR" sz="1450" b="1" kern="0" spc="27" dirty="0">
+                <a:solidFill>
+                  <a:schemeClr val="bg1"/>
+                </a:solidFill>
+                <a:latin typeface="Calibri" panose="020F0502020204030204" pitchFamily="34" charset="0"/>
+                <a:cs typeface="Gotham-Light"/>
+              </a:rPr>
+              <a:t> dentro dele</a:t>
+            </a:r>
+          </a:p>
+        </p:txBody>
+      </p:sp>
+    </p:spTree>
+    <p:extLst>
+      <p:ext uri="{BB962C8B-B14F-4D97-AF65-F5344CB8AC3E}">
+        <p14:creationId xmlns:p14="http://schemas.microsoft.com/office/powerpoint/2010/main" val="1643239232"/>
+      </p:ext>
+    </p:extLst>
+  </p:cSld>
+  <p:clrMapOvr>
+    <a:masterClrMapping/>
+  </p:clrMapOvr>
+  <p:transition spd="med"/>
+</p:sld>
+</file>
+
+<file path=ppt/slides/slide14.xml><?xml version="1.0" encoding="utf-8"?>
+<p:sld xmlns:a="http://schemas.openxmlformats.org/drawingml/2006/main" xmlns:r="http://schemas.openxmlformats.org/officeDocument/2006/relationships" xmlns:p="http://schemas.openxmlformats.org/presentationml/2006/main">
+  <p:cSld>
+    <p:spTree>
+      <p:nvGrpSpPr>
+        <p:cNvPr id="1" name=""/>
+        <p:cNvGrpSpPr/>
+        <p:nvPr/>
+      </p:nvGrpSpPr>
+      <p:grpSpPr>
+        <a:xfrm>
+          <a:off x="0" y="0"/>
+          <a:ext cx="0" cy="0"/>
+          <a:chOff x="0" y="0"/>
+          <a:chExt cx="0" cy="0"/>
+        </a:xfrm>
+      </p:grpSpPr>
+      <p:sp>
+        <p:nvSpPr>
+          <p:cNvPr id="2" name="CaixaDeTexto 35"/>
+          <p:cNvSpPr txBox="1"/>
+          <p:nvPr/>
+        </p:nvSpPr>
+        <p:spPr>
+          <a:xfrm>
+            <a:off x="107161" y="2088913"/>
+            <a:ext cx="4036213" cy="315471"/>
+          </a:xfrm>
+          <a:prstGeom prst="rect">
+            <a:avLst/>
+          </a:prstGeom>
+          <a:solidFill>
+            <a:srgbClr val="0AB4BA"/>
+          </a:solidFill>
+        </p:spPr>
+        <p:txBody>
+          <a:bodyPr wrap="square" rtlCol="0" anchor="ctr">
+            <a:spAutoFit/>
+          </a:bodyPr>
+          <a:lstStyle>
+            <a:defPPr>
+              <a:defRPr lang="pt-BR"/>
+            </a:defPPr>
+            <a:lvl1pPr marL="0" algn="l" defTabSz="914400" rtl="0" eaLnBrk="1" latinLnBrk="0" hangingPunct="1">
+              <a:defRPr sz="1800" kern="1200">
+                <a:solidFill>
+                  <a:schemeClr val="tx1"/>
+                </a:solidFill>
+                <a:latin typeface="+mn-lt"/>
+                <a:ea typeface="+mn-ea"/>
+                <a:cs typeface="+mn-cs"/>
+              </a:defRPr>
+            </a:lvl1pPr>
+            <a:lvl2pPr marL="457200" algn="l" defTabSz="914400" rtl="0" eaLnBrk="1" latinLnBrk="0" hangingPunct="1">
+              <a:defRPr sz="1800" kern="1200">
+                <a:solidFill>
+                  <a:schemeClr val="tx1"/>
+                </a:solidFill>
+                <a:latin typeface="+mn-lt"/>
+                <a:ea typeface="+mn-ea"/>
+                <a:cs typeface="+mn-cs"/>
+              </a:defRPr>
+            </a:lvl2pPr>
+            <a:lvl3pPr marL="914400" algn="l" defTabSz="914400" rtl="0" eaLnBrk="1" latinLnBrk="0" hangingPunct="1">
+              <a:defRPr sz="1800" kern="1200">
+                <a:solidFill>
+                  <a:schemeClr val="tx1"/>
+                </a:solidFill>
+                <a:latin typeface="+mn-lt"/>
+                <a:ea typeface="+mn-ea"/>
+                <a:cs typeface="+mn-cs"/>
+              </a:defRPr>
+            </a:lvl3pPr>
+            <a:lvl4pPr marL="1371600" algn="l" defTabSz="914400" rtl="0" eaLnBrk="1" latinLnBrk="0" hangingPunct="1">
+              <a:defRPr sz="1800" kern="1200">
+                <a:solidFill>
+                  <a:schemeClr val="tx1"/>
+                </a:solidFill>
+                <a:latin typeface="+mn-lt"/>
+                <a:ea typeface="+mn-ea"/>
+                <a:cs typeface="+mn-cs"/>
+              </a:defRPr>
+            </a:lvl4pPr>
+            <a:lvl5pPr marL="1828800" algn="l" defTabSz="914400" rtl="0" eaLnBrk="1" latinLnBrk="0" hangingPunct="1">
+              <a:defRPr sz="1800" kern="1200">
+                <a:solidFill>
+                  <a:schemeClr val="tx1"/>
+                </a:solidFill>
+                <a:latin typeface="+mn-lt"/>
+                <a:ea typeface="+mn-ea"/>
+                <a:cs typeface="+mn-cs"/>
+              </a:defRPr>
+            </a:lvl5pPr>
+            <a:lvl6pPr marL="2286000" algn="l" defTabSz="914400" rtl="0" eaLnBrk="1" latinLnBrk="0" hangingPunct="1">
+              <a:defRPr sz="1800" kern="1200">
+                <a:solidFill>
+                  <a:schemeClr val="tx1"/>
+                </a:solidFill>
+                <a:latin typeface="+mn-lt"/>
+                <a:ea typeface="+mn-ea"/>
+                <a:cs typeface="+mn-cs"/>
+              </a:defRPr>
+            </a:lvl6pPr>
+            <a:lvl7pPr marL="2743200" algn="l" defTabSz="914400" rtl="0" eaLnBrk="1" latinLnBrk="0" hangingPunct="1">
+              <a:defRPr sz="1800" kern="1200">
+                <a:solidFill>
+                  <a:schemeClr val="tx1"/>
+                </a:solidFill>
+                <a:latin typeface="+mn-lt"/>
+                <a:ea typeface="+mn-ea"/>
+                <a:cs typeface="+mn-cs"/>
+              </a:defRPr>
+            </a:lvl7pPr>
+            <a:lvl8pPr marL="3200400" algn="l" defTabSz="914400" rtl="0" eaLnBrk="1" latinLnBrk="0" hangingPunct="1">
+              <a:defRPr sz="1800" kern="1200">
+                <a:solidFill>
+                  <a:schemeClr val="tx1"/>
+                </a:solidFill>
+                <a:latin typeface="+mn-lt"/>
+                <a:ea typeface="+mn-ea"/>
+                <a:cs typeface="+mn-cs"/>
+              </a:defRPr>
+            </a:lvl8pPr>
+            <a:lvl9pPr marL="3657600" algn="l" defTabSz="914400" rtl="0" eaLnBrk="1" latinLnBrk="0" hangingPunct="1">
+              <a:defRPr sz="1800" kern="1200">
+                <a:solidFill>
+                  <a:schemeClr val="tx1"/>
+                </a:solidFill>
+                <a:latin typeface="+mn-lt"/>
+                <a:ea typeface="+mn-ea"/>
+                <a:cs typeface="+mn-cs"/>
+              </a:defRPr>
+            </a:lvl9pPr>
+          </a:lstStyle>
+          <a:p>
+            <a:pPr algn="ctr"/>
+            <a:r>
+              <a:rPr lang="pt-BR" sz="1450" b="1" kern="0" spc="27" dirty="0">
+                <a:solidFill>
+                  <a:schemeClr val="bg1"/>
+                </a:solidFill>
+                <a:latin typeface="Calibri" panose="020F0502020204030204" pitchFamily="34" charset="0"/>
+                <a:cs typeface="Gotham-Light"/>
+              </a:rPr>
+              <a:t>Execute o comando “</a:t>
+            </a:r>
+            <a:r>
+              <a:rPr lang="pt-BR" sz="1450" b="1" kern="0" spc="27" dirty="0" err="1">
+                <a:solidFill>
+                  <a:schemeClr val="bg1"/>
+                </a:solidFill>
+                <a:latin typeface="Calibri" panose="020F0502020204030204" pitchFamily="34" charset="0"/>
+                <a:cs typeface="Gotham-Light"/>
+              </a:rPr>
+              <a:t>git</a:t>
+            </a:r>
+            <a:r>
+              <a:rPr lang="pt-BR" sz="1450" b="1" kern="0" spc="27" dirty="0">
+                <a:solidFill>
+                  <a:schemeClr val="bg1"/>
+                </a:solidFill>
+                <a:latin typeface="Calibri" panose="020F0502020204030204" pitchFamily="34" charset="0"/>
+                <a:cs typeface="Gotham-Light"/>
+              </a:rPr>
+              <a:t> status”</a:t>
+            </a:r>
+          </a:p>
+        </p:txBody>
+      </p:sp>
+      <p:pic>
+        <p:nvPicPr>
+          <p:cNvPr id="3" name="Imagem 2"/>
+          <p:cNvPicPr>
+            <a:picLocks noChangeAspect="1"/>
+          </p:cNvPicPr>
+          <p:nvPr/>
+        </p:nvPicPr>
+        <p:blipFill>
+          <a:blip r:embed="rId2"/>
+          <a:stretch>
+            <a:fillRect/>
+          </a:stretch>
+        </p:blipFill>
+        <p:spPr>
+          <a:xfrm>
+            <a:off x="4664290" y="1192886"/>
+            <a:ext cx="5629060" cy="3164801"/>
+          </a:xfrm>
+          <a:prstGeom prst="rect">
+            <a:avLst/>
+          </a:prstGeom>
+        </p:spPr>
+      </p:pic>
+      <p:sp>
+        <p:nvSpPr>
+          <p:cNvPr id="4" name="Subtítulo 5"/>
+          <p:cNvSpPr txBox="1">
+            <a:spLocks/>
+          </p:cNvSpPr>
+          <p:nvPr/>
+        </p:nvSpPr>
+        <p:spPr bwMode="auto">
+          <a:xfrm>
+            <a:off x="1655106" y="5395343"/>
+            <a:ext cx="6634104" cy="1248461"/>
+          </a:xfrm>
+          <a:prstGeom prst="rect">
+            <a:avLst/>
+          </a:prstGeom>
+          <a:noFill/>
+          <a:ln>
+            <a:noFill/>
+          </a:ln>
+          <a:extLst>
+            <a:ext uri="{909E8E84-426E-40DD-AFC4-6F175D3DCCD1}">
+              <a14:hiddenFill xmlns:a14="http://schemas.microsoft.com/office/drawing/2010/main">
+                <a:solidFill>
+                  <a:srgbClr val="FFFFFF"/>
+                </a:solidFill>
+              </a14:hiddenFill>
+            </a:ext>
+            <a:ext uri="{91240B29-F687-4F45-9708-019B960494DF}">
+              <a14:hiddenLine xmlns:a14="http://schemas.microsoft.com/office/drawing/2010/main" w="9525">
+                <a:solidFill>
+                  <a:srgbClr val="000000"/>
+                </a:solidFill>
+                <a:miter lim="800000"/>
+                <a:headEnd/>
+                <a:tailEnd/>
+              </a14:hiddenLine>
+            </a:ext>
+          </a:extLst>
+        </p:spPr>
+        <p:txBody>
+          <a:bodyPr wrap="square" anchor="t" anchorCtr="0">
+            <a:noAutofit/>
+          </a:bodyPr>
+          <a:lstStyle>
+            <a:defPPr>
+              <a:defRPr lang="pt-BR"/>
+            </a:defPPr>
+            <a:lvl1pPr marL="0" algn="l" defTabSz="914400" rtl="0" eaLnBrk="1" latinLnBrk="0" hangingPunct="1">
+              <a:defRPr sz="1800" kern="1200">
+                <a:solidFill>
+                  <a:schemeClr val="tx1"/>
+                </a:solidFill>
+                <a:latin typeface="+mn-lt"/>
+                <a:ea typeface="+mn-ea"/>
+                <a:cs typeface="+mn-cs"/>
+              </a:defRPr>
+            </a:lvl1pPr>
+            <a:lvl2pPr marL="457200" algn="l" defTabSz="914400" rtl="0" eaLnBrk="1" latinLnBrk="0" hangingPunct="1">
+              <a:defRPr sz="1800" kern="1200">
+                <a:solidFill>
+                  <a:schemeClr val="tx1"/>
+                </a:solidFill>
+                <a:latin typeface="+mn-lt"/>
+                <a:ea typeface="+mn-ea"/>
+                <a:cs typeface="+mn-cs"/>
+              </a:defRPr>
+            </a:lvl2pPr>
+            <a:lvl3pPr marL="914400" algn="l" defTabSz="914400" rtl="0" eaLnBrk="1" latinLnBrk="0" hangingPunct="1">
+              <a:defRPr sz="1800" kern="1200">
+                <a:solidFill>
+                  <a:schemeClr val="tx1"/>
+                </a:solidFill>
+                <a:latin typeface="+mn-lt"/>
+                <a:ea typeface="+mn-ea"/>
+                <a:cs typeface="+mn-cs"/>
+              </a:defRPr>
+            </a:lvl3pPr>
+            <a:lvl4pPr marL="1371600" algn="l" defTabSz="914400" rtl="0" eaLnBrk="1" latinLnBrk="0" hangingPunct="1">
+              <a:defRPr sz="1800" kern="1200">
+                <a:solidFill>
+                  <a:schemeClr val="tx1"/>
+                </a:solidFill>
+                <a:latin typeface="+mn-lt"/>
+                <a:ea typeface="+mn-ea"/>
+                <a:cs typeface="+mn-cs"/>
+              </a:defRPr>
+            </a:lvl4pPr>
+            <a:lvl5pPr marL="1828800" algn="l" defTabSz="914400" rtl="0" eaLnBrk="1" latinLnBrk="0" hangingPunct="1">
+              <a:defRPr sz="1800" kern="1200">
+                <a:solidFill>
+                  <a:schemeClr val="tx1"/>
+                </a:solidFill>
+                <a:latin typeface="+mn-lt"/>
+                <a:ea typeface="+mn-ea"/>
+                <a:cs typeface="+mn-cs"/>
+              </a:defRPr>
+            </a:lvl5pPr>
+            <a:lvl6pPr marL="2286000" algn="l" defTabSz="914400" rtl="0" eaLnBrk="1" latinLnBrk="0" hangingPunct="1">
+              <a:defRPr sz="1800" kern="1200">
+                <a:solidFill>
+                  <a:schemeClr val="tx1"/>
+                </a:solidFill>
+                <a:latin typeface="+mn-lt"/>
+                <a:ea typeface="+mn-ea"/>
+                <a:cs typeface="+mn-cs"/>
+              </a:defRPr>
+            </a:lvl6pPr>
+            <a:lvl7pPr marL="2743200" algn="l" defTabSz="914400" rtl="0" eaLnBrk="1" latinLnBrk="0" hangingPunct="1">
+              <a:defRPr sz="1800" kern="1200">
+                <a:solidFill>
+                  <a:schemeClr val="tx1"/>
+                </a:solidFill>
+                <a:latin typeface="+mn-lt"/>
+                <a:ea typeface="+mn-ea"/>
+                <a:cs typeface="+mn-cs"/>
+              </a:defRPr>
+            </a:lvl7pPr>
+            <a:lvl8pPr marL="3200400" algn="l" defTabSz="914400" rtl="0" eaLnBrk="1" latinLnBrk="0" hangingPunct="1">
+              <a:defRPr sz="1800" kern="1200">
+                <a:solidFill>
+                  <a:schemeClr val="tx1"/>
+                </a:solidFill>
+                <a:latin typeface="+mn-lt"/>
+                <a:ea typeface="+mn-ea"/>
+                <a:cs typeface="+mn-cs"/>
+              </a:defRPr>
+            </a:lvl8pPr>
+            <a:lvl9pPr marL="3657600" algn="l" defTabSz="914400" rtl="0" eaLnBrk="1" latinLnBrk="0" hangingPunct="1">
+              <a:defRPr sz="1800" kern="1200">
+                <a:solidFill>
+                  <a:schemeClr val="tx1"/>
+                </a:solidFill>
+                <a:latin typeface="+mn-lt"/>
+                <a:ea typeface="+mn-ea"/>
+                <a:cs typeface="+mn-cs"/>
+              </a:defRPr>
+            </a:lvl9pPr>
+          </a:lstStyle>
+          <a:p>
+            <a:pPr marL="258890" indent="-258890" defTabSz="414223">
+              <a:lnSpc>
+                <a:spcPct val="80000"/>
+              </a:lnSpc>
+              <a:spcAft>
+                <a:spcPts val="725"/>
+              </a:spcAft>
+              <a:buClr>
+                <a:srgbClr val="C05200"/>
+              </a:buClr>
+              <a:buFont typeface="Arial" panose="020B0604020202020204" pitchFamily="34" charset="0"/>
+              <a:buChar char="•"/>
+              <a:defRPr/>
+            </a:pPr>
+            <a:r>
+              <a:rPr lang="pt-BR" sz="1631" dirty="0">
+                <a:solidFill>
+                  <a:srgbClr val="000000">
+                    <a:lumMod val="65000"/>
+                    <a:lumOff val="35000"/>
+                  </a:srgbClr>
+                </a:solidFill>
+                <a:latin typeface="Calibri" panose="020F0502020204030204" pitchFamily="34" charset="0"/>
+                <a:ea typeface="Open Sans" panose="020B0606030504020204" pitchFamily="34" charset="0"/>
+                <a:cs typeface="Open Sans" panose="020B0606030504020204" pitchFamily="34" charset="0"/>
+                <a:sym typeface="Calibri"/>
+              </a:rPr>
+              <a:t>Nosso arquivo e nossa pasta ainda não estão sendo rastreados;</a:t>
+            </a:r>
+          </a:p>
+          <a:p>
+            <a:pPr marL="258890" indent="-258890" defTabSz="414223">
+              <a:lnSpc>
+                <a:spcPct val="80000"/>
+              </a:lnSpc>
+              <a:spcAft>
+                <a:spcPts val="725"/>
+              </a:spcAft>
+              <a:buClr>
+                <a:srgbClr val="C05200"/>
+              </a:buClr>
+              <a:buFont typeface="Arial" panose="020B0604020202020204" pitchFamily="34" charset="0"/>
+              <a:buChar char="•"/>
+              <a:defRPr/>
+            </a:pPr>
+            <a:r>
+              <a:rPr lang="pt-BR" sz="1631" dirty="0">
+                <a:solidFill>
+                  <a:srgbClr val="000000">
+                    <a:lumMod val="65000"/>
+                    <a:lumOff val="35000"/>
+                  </a:srgbClr>
+                </a:solidFill>
+                <a:latin typeface="Calibri" panose="020F0502020204030204" pitchFamily="34" charset="0"/>
+                <a:ea typeface="Open Sans" panose="020B0606030504020204" pitchFamily="34" charset="0"/>
+                <a:cs typeface="Open Sans" panose="020B0606030504020204" pitchFamily="34" charset="0"/>
+              </a:rPr>
+              <a:t>Será que teremos que executar um </a:t>
+            </a:r>
+            <a:r>
+              <a:rPr lang="pt-BR" sz="1631" dirty="0" err="1">
+                <a:solidFill>
+                  <a:srgbClr val="000000">
+                    <a:lumMod val="65000"/>
+                    <a:lumOff val="35000"/>
+                  </a:srgbClr>
+                </a:solidFill>
+                <a:latin typeface="Calibri" panose="020F0502020204030204" pitchFamily="34" charset="0"/>
+                <a:ea typeface="Open Sans" panose="020B0606030504020204" pitchFamily="34" charset="0"/>
+                <a:cs typeface="Open Sans" panose="020B0606030504020204" pitchFamily="34" charset="0"/>
+              </a:rPr>
+              <a:t>git</a:t>
+            </a:r>
+            <a:r>
+              <a:rPr lang="pt-BR" sz="1631" dirty="0">
+                <a:solidFill>
+                  <a:srgbClr val="000000">
+                    <a:lumMod val="65000"/>
+                    <a:lumOff val="35000"/>
+                  </a:srgbClr>
+                </a:solidFill>
+                <a:latin typeface="Calibri" panose="020F0502020204030204" pitchFamily="34" charset="0"/>
+                <a:ea typeface="Open Sans" panose="020B0606030504020204" pitchFamily="34" charset="0"/>
+                <a:cs typeface="Open Sans" panose="020B0606030504020204" pitchFamily="34" charset="0"/>
+              </a:rPr>
+              <a:t> </a:t>
+            </a:r>
+            <a:r>
+              <a:rPr lang="pt-BR" sz="1631" dirty="0" err="1">
+                <a:solidFill>
+                  <a:srgbClr val="000000">
+                    <a:lumMod val="65000"/>
+                    <a:lumOff val="35000"/>
+                  </a:srgbClr>
+                </a:solidFill>
+                <a:latin typeface="Calibri" panose="020F0502020204030204" pitchFamily="34" charset="0"/>
+                <a:ea typeface="Open Sans" panose="020B0606030504020204" pitchFamily="34" charset="0"/>
+                <a:cs typeface="Open Sans" panose="020B0606030504020204" pitchFamily="34" charset="0"/>
+              </a:rPr>
+              <a:t>add</a:t>
+            </a:r>
+            <a:r>
+              <a:rPr lang="pt-BR" sz="1631" dirty="0">
+                <a:solidFill>
+                  <a:srgbClr val="000000">
+                    <a:lumMod val="65000"/>
+                    <a:lumOff val="35000"/>
+                  </a:srgbClr>
+                </a:solidFill>
+                <a:latin typeface="Calibri" panose="020F0502020204030204" pitchFamily="34" charset="0"/>
+                <a:ea typeface="Open Sans" panose="020B0606030504020204" pitchFamily="34" charset="0"/>
+                <a:cs typeface="Open Sans" panose="020B0606030504020204" pitchFamily="34" charset="0"/>
+              </a:rPr>
+              <a:t> pra cada um deles?</a:t>
+            </a:r>
+          </a:p>
+          <a:p>
+            <a:pPr marL="258890" indent="-258890" defTabSz="414223">
+              <a:lnSpc>
+                <a:spcPct val="80000"/>
+              </a:lnSpc>
+              <a:spcAft>
+                <a:spcPts val="725"/>
+              </a:spcAft>
+              <a:buClr>
+                <a:srgbClr val="C05200"/>
+              </a:buClr>
+              <a:buFont typeface="Arial" panose="020B0604020202020204" pitchFamily="34" charset="0"/>
+              <a:buChar char="•"/>
+              <a:defRPr/>
+            </a:pPr>
+            <a:endParaRPr lang="pt-BR" sz="1631" dirty="0">
+              <a:solidFill>
+                <a:srgbClr val="000000">
+                  <a:lumMod val="65000"/>
+                  <a:lumOff val="35000"/>
+                </a:srgbClr>
+              </a:solidFill>
+              <a:latin typeface="Calibri" panose="020F0502020204030204" pitchFamily="34" charset="0"/>
+              <a:ea typeface="Open Sans" panose="020B0606030504020204" pitchFamily="34" charset="0"/>
+              <a:cs typeface="Open Sans" panose="020B0606030504020204" pitchFamily="34" charset="0"/>
+              <a:sym typeface="Calibri"/>
+            </a:endParaRPr>
+          </a:p>
+          <a:p>
+            <a:pPr marL="258890" indent="-258890" defTabSz="414223">
+              <a:lnSpc>
+                <a:spcPct val="80000"/>
+              </a:lnSpc>
+              <a:spcAft>
+                <a:spcPts val="725"/>
+              </a:spcAft>
+              <a:buClr>
+                <a:srgbClr val="C05200"/>
+              </a:buClr>
+              <a:buFont typeface="Arial" panose="020B0604020202020204" pitchFamily="34" charset="0"/>
+              <a:buChar char="•"/>
+              <a:defRPr/>
+            </a:pPr>
+            <a:endParaRPr lang="pt-BR" sz="1631" dirty="0">
+              <a:solidFill>
+                <a:srgbClr val="000000">
+                  <a:lumMod val="65000"/>
+                  <a:lumOff val="35000"/>
+                </a:srgbClr>
+              </a:solidFill>
+              <a:latin typeface="Calibri" panose="020F0502020204030204" pitchFamily="34" charset="0"/>
+              <a:ea typeface="Open Sans" panose="020B0606030504020204" pitchFamily="34" charset="0"/>
+              <a:cs typeface="Open Sans" panose="020B0606030504020204" pitchFamily="34" charset="0"/>
+              <a:sym typeface="Calibri"/>
+            </a:endParaRPr>
+          </a:p>
+        </p:txBody>
+      </p:sp>
+    </p:spTree>
+    <p:extLst>
+      <p:ext uri="{BB962C8B-B14F-4D97-AF65-F5344CB8AC3E}">
+        <p14:creationId xmlns:p14="http://schemas.microsoft.com/office/powerpoint/2010/main" val="3912446603"/>
+      </p:ext>
+    </p:extLst>
+  </p:cSld>
+  <p:clrMapOvr>
+    <a:masterClrMapping/>
+  </p:clrMapOvr>
+  <p:transition spd="med"/>
+</p:sld>
+</file>
+
+<file path=ppt/slides/slide15.xml><?xml version="1.0" encoding="utf-8"?>
+<p:sld xmlns:a="http://schemas.openxmlformats.org/drawingml/2006/main" xmlns:r="http://schemas.openxmlformats.org/officeDocument/2006/relationships" xmlns:p="http://schemas.openxmlformats.org/presentationml/2006/main">
+  <p:cSld>
+    <p:spTree>
+      <p:nvGrpSpPr>
+        <p:cNvPr id="1" name=""/>
+        <p:cNvGrpSpPr/>
+        <p:nvPr/>
+      </p:nvGrpSpPr>
+      <p:grpSpPr>
+        <a:xfrm>
+          <a:off x="0" y="0"/>
+          <a:ext cx="0" cy="0"/>
+          <a:chOff x="0" y="0"/>
+          <a:chExt cx="0" cy="0"/>
+        </a:xfrm>
+      </p:grpSpPr>
+      <p:sp>
+        <p:nvSpPr>
+          <p:cNvPr id="3" name="CaixaDeTexto 35"/>
+          <p:cNvSpPr txBox="1"/>
+          <p:nvPr/>
+        </p:nvSpPr>
+        <p:spPr>
+          <a:xfrm>
+            <a:off x="121448" y="1303100"/>
+            <a:ext cx="5579265" cy="315471"/>
+          </a:xfrm>
+          <a:prstGeom prst="rect">
+            <a:avLst/>
+          </a:prstGeom>
+          <a:solidFill>
+            <a:srgbClr val="0AB4BA"/>
+          </a:solidFill>
+        </p:spPr>
+        <p:txBody>
+          <a:bodyPr wrap="square" rtlCol="0" anchor="ctr">
+            <a:spAutoFit/>
+          </a:bodyPr>
+          <a:lstStyle>
+            <a:defPPr>
+              <a:defRPr lang="pt-BR"/>
+            </a:defPPr>
+            <a:lvl1pPr marL="0" algn="l" defTabSz="914400" rtl="0" eaLnBrk="1" latinLnBrk="0" hangingPunct="1">
+              <a:defRPr sz="1800" kern="1200">
+                <a:solidFill>
+                  <a:schemeClr val="tx1"/>
+                </a:solidFill>
+                <a:latin typeface="+mn-lt"/>
+                <a:ea typeface="+mn-ea"/>
+                <a:cs typeface="+mn-cs"/>
+              </a:defRPr>
+            </a:lvl1pPr>
+            <a:lvl2pPr marL="457200" algn="l" defTabSz="914400" rtl="0" eaLnBrk="1" latinLnBrk="0" hangingPunct="1">
+              <a:defRPr sz="1800" kern="1200">
+                <a:solidFill>
+                  <a:schemeClr val="tx1"/>
+                </a:solidFill>
+                <a:latin typeface="+mn-lt"/>
+                <a:ea typeface="+mn-ea"/>
+                <a:cs typeface="+mn-cs"/>
+              </a:defRPr>
+            </a:lvl2pPr>
+            <a:lvl3pPr marL="914400" algn="l" defTabSz="914400" rtl="0" eaLnBrk="1" latinLnBrk="0" hangingPunct="1">
+              <a:defRPr sz="1800" kern="1200">
+                <a:solidFill>
+                  <a:schemeClr val="tx1"/>
+                </a:solidFill>
+                <a:latin typeface="+mn-lt"/>
+                <a:ea typeface="+mn-ea"/>
+                <a:cs typeface="+mn-cs"/>
+              </a:defRPr>
+            </a:lvl3pPr>
+            <a:lvl4pPr marL="1371600" algn="l" defTabSz="914400" rtl="0" eaLnBrk="1" latinLnBrk="0" hangingPunct="1">
+              <a:defRPr sz="1800" kern="1200">
+                <a:solidFill>
+                  <a:schemeClr val="tx1"/>
+                </a:solidFill>
+                <a:latin typeface="+mn-lt"/>
+                <a:ea typeface="+mn-ea"/>
+                <a:cs typeface="+mn-cs"/>
+              </a:defRPr>
+            </a:lvl4pPr>
+            <a:lvl5pPr marL="1828800" algn="l" defTabSz="914400" rtl="0" eaLnBrk="1" latinLnBrk="0" hangingPunct="1">
+              <a:defRPr sz="1800" kern="1200">
+                <a:solidFill>
+                  <a:schemeClr val="tx1"/>
+                </a:solidFill>
+                <a:latin typeface="+mn-lt"/>
+                <a:ea typeface="+mn-ea"/>
+                <a:cs typeface="+mn-cs"/>
+              </a:defRPr>
+            </a:lvl5pPr>
+            <a:lvl6pPr marL="2286000" algn="l" defTabSz="914400" rtl="0" eaLnBrk="1" latinLnBrk="0" hangingPunct="1">
+              <a:defRPr sz="1800" kern="1200">
+                <a:solidFill>
+                  <a:schemeClr val="tx1"/>
+                </a:solidFill>
+                <a:latin typeface="+mn-lt"/>
+                <a:ea typeface="+mn-ea"/>
+                <a:cs typeface="+mn-cs"/>
+              </a:defRPr>
+            </a:lvl6pPr>
+            <a:lvl7pPr marL="2743200" algn="l" defTabSz="914400" rtl="0" eaLnBrk="1" latinLnBrk="0" hangingPunct="1">
+              <a:defRPr sz="1800" kern="1200">
+                <a:solidFill>
+                  <a:schemeClr val="tx1"/>
+                </a:solidFill>
+                <a:latin typeface="+mn-lt"/>
+                <a:ea typeface="+mn-ea"/>
+                <a:cs typeface="+mn-cs"/>
+              </a:defRPr>
+            </a:lvl7pPr>
+            <a:lvl8pPr marL="3200400" algn="l" defTabSz="914400" rtl="0" eaLnBrk="1" latinLnBrk="0" hangingPunct="1">
+              <a:defRPr sz="1800" kern="1200">
+                <a:solidFill>
+                  <a:schemeClr val="tx1"/>
+                </a:solidFill>
+                <a:latin typeface="+mn-lt"/>
+                <a:ea typeface="+mn-ea"/>
+                <a:cs typeface="+mn-cs"/>
+              </a:defRPr>
+            </a:lvl8pPr>
+            <a:lvl9pPr marL="3657600" algn="l" defTabSz="914400" rtl="0" eaLnBrk="1" latinLnBrk="0" hangingPunct="1">
+              <a:defRPr sz="1800" kern="1200">
+                <a:solidFill>
+                  <a:schemeClr val="tx1"/>
+                </a:solidFill>
+                <a:latin typeface="+mn-lt"/>
+                <a:ea typeface="+mn-ea"/>
+                <a:cs typeface="+mn-cs"/>
+              </a:defRPr>
+            </a:lvl9pPr>
+          </a:lstStyle>
+          <a:p>
+            <a:pPr algn="ctr"/>
+            <a:r>
+              <a:rPr lang="pt-BR" sz="1450" b="1" kern="0" spc="27" dirty="0">
+                <a:solidFill>
+                  <a:schemeClr val="bg1"/>
+                </a:solidFill>
+                <a:latin typeface="Calibri" panose="020F0502020204030204" pitchFamily="34" charset="0"/>
+                <a:cs typeface="Gotham-Light"/>
+              </a:rPr>
+              <a:t>Utilize o comando </a:t>
+            </a:r>
+            <a:r>
+              <a:rPr lang="pt-BR" sz="1450" b="1" kern="0" spc="27" dirty="0" err="1">
+                <a:solidFill>
+                  <a:schemeClr val="bg1"/>
+                </a:solidFill>
+                <a:latin typeface="Calibri" panose="020F0502020204030204" pitchFamily="34" charset="0"/>
+                <a:cs typeface="Gotham-Light"/>
+              </a:rPr>
+              <a:t>git</a:t>
+            </a:r>
+            <a:r>
+              <a:rPr lang="pt-BR" sz="1450" b="1" kern="0" spc="27" dirty="0">
+                <a:solidFill>
+                  <a:schemeClr val="bg1"/>
+                </a:solidFill>
+                <a:latin typeface="Calibri" panose="020F0502020204030204" pitchFamily="34" charset="0"/>
+                <a:cs typeface="Gotham-Light"/>
+              </a:rPr>
+              <a:t> </a:t>
+            </a:r>
+            <a:r>
+              <a:rPr lang="pt-BR" sz="1450" b="1" kern="0" spc="27" dirty="0" err="1">
+                <a:solidFill>
+                  <a:schemeClr val="bg1"/>
+                </a:solidFill>
+                <a:latin typeface="Calibri" panose="020F0502020204030204" pitchFamily="34" charset="0"/>
+                <a:cs typeface="Gotham-Light"/>
+              </a:rPr>
+              <a:t>add</a:t>
+            </a:r>
+            <a:r>
+              <a:rPr lang="pt-BR" sz="1450" b="1" kern="0" spc="27" dirty="0">
+                <a:solidFill>
+                  <a:schemeClr val="bg1"/>
+                </a:solidFill>
+                <a:latin typeface="Calibri" panose="020F0502020204030204" pitchFamily="34" charset="0"/>
+                <a:cs typeface="Gotham-Light"/>
+              </a:rPr>
+              <a:t> . e execute mais uma vez “</a:t>
+            </a:r>
+            <a:r>
+              <a:rPr lang="pt-BR" sz="1450" b="1" kern="0" spc="27" dirty="0" err="1">
+                <a:solidFill>
+                  <a:schemeClr val="bg1"/>
+                </a:solidFill>
+                <a:latin typeface="Calibri" panose="020F0502020204030204" pitchFamily="34" charset="0"/>
+                <a:cs typeface="Gotham-Light"/>
+              </a:rPr>
+              <a:t>git</a:t>
+            </a:r>
+            <a:r>
+              <a:rPr lang="pt-BR" sz="1450" b="1" kern="0" spc="27" dirty="0">
+                <a:solidFill>
+                  <a:schemeClr val="bg1"/>
+                </a:solidFill>
+                <a:latin typeface="Calibri" panose="020F0502020204030204" pitchFamily="34" charset="0"/>
+                <a:cs typeface="Gotham-Light"/>
+              </a:rPr>
+              <a:t> status”</a:t>
+            </a:r>
+          </a:p>
+        </p:txBody>
+      </p:sp>
+      <p:pic>
+        <p:nvPicPr>
+          <p:cNvPr id="4" name="Imagem 3"/>
+          <p:cNvPicPr>
+            <a:picLocks noChangeAspect="1"/>
+          </p:cNvPicPr>
+          <p:nvPr/>
+        </p:nvPicPr>
+        <p:blipFill>
+          <a:blip r:embed="rId2"/>
+          <a:stretch>
+            <a:fillRect/>
+          </a:stretch>
+        </p:blipFill>
+        <p:spPr>
+          <a:xfrm>
+            <a:off x="3043237" y="1778674"/>
+            <a:ext cx="5929313" cy="3333611"/>
+          </a:xfrm>
+          <a:prstGeom prst="rect">
+            <a:avLst/>
+          </a:prstGeom>
+        </p:spPr>
+      </p:pic>
+      <p:sp>
+        <p:nvSpPr>
+          <p:cNvPr id="5" name="Subtítulo 5"/>
+          <p:cNvSpPr txBox="1">
+            <a:spLocks/>
+          </p:cNvSpPr>
+          <p:nvPr/>
+        </p:nvSpPr>
+        <p:spPr bwMode="auto">
+          <a:xfrm>
+            <a:off x="1655106" y="5395343"/>
+            <a:ext cx="6634104" cy="1248461"/>
+          </a:xfrm>
+          <a:prstGeom prst="rect">
+            <a:avLst/>
+          </a:prstGeom>
+          <a:noFill/>
+          <a:ln>
+            <a:noFill/>
+          </a:ln>
+          <a:extLst>
+            <a:ext uri="{909E8E84-426E-40DD-AFC4-6F175D3DCCD1}">
+              <a14:hiddenFill xmlns:a14="http://schemas.microsoft.com/office/drawing/2010/main">
+                <a:solidFill>
+                  <a:srgbClr val="FFFFFF"/>
+                </a:solidFill>
+              </a14:hiddenFill>
+            </a:ext>
+            <a:ext uri="{91240B29-F687-4F45-9708-019B960494DF}">
+              <a14:hiddenLine xmlns:a14="http://schemas.microsoft.com/office/drawing/2010/main" w="9525">
+                <a:solidFill>
+                  <a:srgbClr val="000000"/>
+                </a:solidFill>
+                <a:miter lim="800000"/>
+                <a:headEnd/>
+                <a:tailEnd/>
+              </a14:hiddenLine>
+            </a:ext>
+          </a:extLst>
+        </p:spPr>
+        <p:txBody>
+          <a:bodyPr wrap="square" anchor="t" anchorCtr="0">
+            <a:noAutofit/>
+          </a:bodyPr>
+          <a:lstStyle>
+            <a:defPPr>
+              <a:defRPr lang="pt-BR"/>
+            </a:defPPr>
+            <a:lvl1pPr marL="0" algn="l" defTabSz="914400" rtl="0" eaLnBrk="1" latinLnBrk="0" hangingPunct="1">
+              <a:defRPr sz="1800" kern="1200">
+                <a:solidFill>
+                  <a:schemeClr val="tx1"/>
+                </a:solidFill>
+                <a:latin typeface="+mn-lt"/>
+                <a:ea typeface="+mn-ea"/>
+                <a:cs typeface="+mn-cs"/>
+              </a:defRPr>
+            </a:lvl1pPr>
+            <a:lvl2pPr marL="457200" algn="l" defTabSz="914400" rtl="0" eaLnBrk="1" latinLnBrk="0" hangingPunct="1">
+              <a:defRPr sz="1800" kern="1200">
+                <a:solidFill>
+                  <a:schemeClr val="tx1"/>
+                </a:solidFill>
+                <a:latin typeface="+mn-lt"/>
+                <a:ea typeface="+mn-ea"/>
+                <a:cs typeface="+mn-cs"/>
+              </a:defRPr>
+            </a:lvl2pPr>
+            <a:lvl3pPr marL="914400" algn="l" defTabSz="914400" rtl="0" eaLnBrk="1" latinLnBrk="0" hangingPunct="1">
+              <a:defRPr sz="1800" kern="1200">
+                <a:solidFill>
+                  <a:schemeClr val="tx1"/>
+                </a:solidFill>
+                <a:latin typeface="+mn-lt"/>
+                <a:ea typeface="+mn-ea"/>
+                <a:cs typeface="+mn-cs"/>
+              </a:defRPr>
+            </a:lvl3pPr>
+            <a:lvl4pPr marL="1371600" algn="l" defTabSz="914400" rtl="0" eaLnBrk="1" latinLnBrk="0" hangingPunct="1">
+              <a:defRPr sz="1800" kern="1200">
+                <a:solidFill>
+                  <a:schemeClr val="tx1"/>
+                </a:solidFill>
+                <a:latin typeface="+mn-lt"/>
+                <a:ea typeface="+mn-ea"/>
+                <a:cs typeface="+mn-cs"/>
+              </a:defRPr>
+            </a:lvl4pPr>
+            <a:lvl5pPr marL="1828800" algn="l" defTabSz="914400" rtl="0" eaLnBrk="1" latinLnBrk="0" hangingPunct="1">
+              <a:defRPr sz="1800" kern="1200">
+                <a:solidFill>
+                  <a:schemeClr val="tx1"/>
+                </a:solidFill>
+                <a:latin typeface="+mn-lt"/>
+                <a:ea typeface="+mn-ea"/>
+                <a:cs typeface="+mn-cs"/>
+              </a:defRPr>
+            </a:lvl5pPr>
+            <a:lvl6pPr marL="2286000" algn="l" defTabSz="914400" rtl="0" eaLnBrk="1" latinLnBrk="0" hangingPunct="1">
+              <a:defRPr sz="1800" kern="1200">
+                <a:solidFill>
+                  <a:schemeClr val="tx1"/>
+                </a:solidFill>
+                <a:latin typeface="+mn-lt"/>
+                <a:ea typeface="+mn-ea"/>
+                <a:cs typeface="+mn-cs"/>
+              </a:defRPr>
+            </a:lvl6pPr>
+            <a:lvl7pPr marL="2743200" algn="l" defTabSz="914400" rtl="0" eaLnBrk="1" latinLnBrk="0" hangingPunct="1">
+              <a:defRPr sz="1800" kern="1200">
+                <a:solidFill>
+                  <a:schemeClr val="tx1"/>
+                </a:solidFill>
+                <a:latin typeface="+mn-lt"/>
+                <a:ea typeface="+mn-ea"/>
+                <a:cs typeface="+mn-cs"/>
+              </a:defRPr>
+            </a:lvl7pPr>
+            <a:lvl8pPr marL="3200400" algn="l" defTabSz="914400" rtl="0" eaLnBrk="1" latinLnBrk="0" hangingPunct="1">
+              <a:defRPr sz="1800" kern="1200">
+                <a:solidFill>
+                  <a:schemeClr val="tx1"/>
+                </a:solidFill>
+                <a:latin typeface="+mn-lt"/>
+                <a:ea typeface="+mn-ea"/>
+                <a:cs typeface="+mn-cs"/>
+              </a:defRPr>
+            </a:lvl8pPr>
+            <a:lvl9pPr marL="3657600" algn="l" defTabSz="914400" rtl="0" eaLnBrk="1" latinLnBrk="0" hangingPunct="1">
+              <a:defRPr sz="1800" kern="1200">
+                <a:solidFill>
+                  <a:schemeClr val="tx1"/>
+                </a:solidFill>
+                <a:latin typeface="+mn-lt"/>
+                <a:ea typeface="+mn-ea"/>
+                <a:cs typeface="+mn-cs"/>
+              </a:defRPr>
+            </a:lvl9pPr>
+          </a:lstStyle>
+          <a:p>
+            <a:pPr marL="258890" indent="-258890" defTabSz="414223">
+              <a:lnSpc>
+                <a:spcPct val="80000"/>
+              </a:lnSpc>
+              <a:spcAft>
+                <a:spcPts val="725"/>
+              </a:spcAft>
+              <a:buClr>
+                <a:srgbClr val="C05200"/>
+              </a:buClr>
+              <a:buFont typeface="Arial" panose="020B0604020202020204" pitchFamily="34" charset="0"/>
+              <a:buChar char="•"/>
+              <a:defRPr/>
+            </a:pPr>
+            <a:r>
+              <a:rPr lang="pt-BR" sz="1631" dirty="0">
+                <a:solidFill>
+                  <a:srgbClr val="000000">
+                    <a:lumMod val="65000"/>
+                    <a:lumOff val="35000"/>
+                  </a:srgbClr>
+                </a:solidFill>
+                <a:latin typeface="Calibri" panose="020F0502020204030204" pitchFamily="34" charset="0"/>
+                <a:ea typeface="Open Sans" panose="020B0606030504020204" pitchFamily="34" charset="0"/>
+                <a:cs typeface="Open Sans" panose="020B0606030504020204" pitchFamily="34" charset="0"/>
+              </a:rPr>
+              <a:t>O ponto do comando anterior representa todos os arquivos não rastreados do diretório atual e também dos subdiretórios</a:t>
+            </a:r>
+            <a:r>
+              <a:rPr lang="pt-BR" sz="1631" dirty="0">
+                <a:solidFill>
+                  <a:srgbClr val="000000">
+                    <a:lumMod val="65000"/>
+                    <a:lumOff val="35000"/>
+                  </a:srgbClr>
+                </a:solidFill>
+                <a:latin typeface="Calibri" panose="020F0502020204030204" pitchFamily="34" charset="0"/>
+                <a:ea typeface="Open Sans" panose="020B0606030504020204" pitchFamily="34" charset="0"/>
+                <a:cs typeface="Open Sans" panose="020B0606030504020204" pitchFamily="34" charset="0"/>
+                <a:sym typeface="Calibri"/>
+              </a:rPr>
+              <a:t>;</a:t>
+            </a:r>
+          </a:p>
+          <a:p>
+            <a:pPr marL="258890" indent="-258890" defTabSz="414223">
+              <a:lnSpc>
+                <a:spcPct val="80000"/>
+              </a:lnSpc>
+              <a:spcAft>
+                <a:spcPts val="725"/>
+              </a:spcAft>
+              <a:buClr>
+                <a:srgbClr val="C05200"/>
+              </a:buClr>
+              <a:buFont typeface="Arial" panose="020B0604020202020204" pitchFamily="34" charset="0"/>
+              <a:buChar char="•"/>
+              <a:defRPr/>
+            </a:pPr>
+            <a:endParaRPr lang="pt-BR" sz="1631" dirty="0">
+              <a:solidFill>
+                <a:srgbClr val="000000">
+                  <a:lumMod val="65000"/>
+                  <a:lumOff val="35000"/>
+                </a:srgbClr>
+              </a:solidFill>
+              <a:latin typeface="Calibri" panose="020F0502020204030204" pitchFamily="34" charset="0"/>
+              <a:ea typeface="Open Sans" panose="020B0606030504020204" pitchFamily="34" charset="0"/>
+              <a:cs typeface="Open Sans" panose="020B0606030504020204" pitchFamily="34" charset="0"/>
+              <a:sym typeface="Calibri"/>
+            </a:endParaRPr>
+          </a:p>
+        </p:txBody>
+      </p:sp>
+    </p:spTree>
+    <p:extLst>
+      <p:ext uri="{BB962C8B-B14F-4D97-AF65-F5344CB8AC3E}">
+        <p14:creationId xmlns:p14="http://schemas.microsoft.com/office/powerpoint/2010/main" val="630962479"/>
+      </p:ext>
+    </p:extLst>
+  </p:cSld>
+  <p:clrMapOvr>
+    <a:masterClrMapping/>
+  </p:clrMapOvr>
+  <p:transition spd="med"/>
+</p:sld>
+</file>
+
+<file path=ppt/slides/slide16.xml><?xml version="1.0" encoding="utf-8"?>
+<p:sld xmlns:a="http://schemas.openxmlformats.org/drawingml/2006/main" xmlns:r="http://schemas.openxmlformats.org/officeDocument/2006/relationships" xmlns:p="http://schemas.openxmlformats.org/presentationml/2006/main">
+  <p:cSld>
+    <p:spTree>
+      <p:nvGrpSpPr>
+        <p:cNvPr id="1" name=""/>
+        <p:cNvGrpSpPr/>
+        <p:nvPr/>
+      </p:nvGrpSpPr>
+      <p:grpSpPr>
+        <a:xfrm>
+          <a:off x="0" y="0"/>
+          <a:ext cx="0" cy="0"/>
+          <a:chOff x="0" y="0"/>
+          <a:chExt cx="0" cy="0"/>
+        </a:xfrm>
+      </p:grpSpPr>
+      <p:sp>
+        <p:nvSpPr>
+          <p:cNvPr id="3" name="CaixaDeTexto 35"/>
+          <p:cNvSpPr txBox="1"/>
+          <p:nvPr/>
+        </p:nvSpPr>
+        <p:spPr>
+          <a:xfrm>
+            <a:off x="335761" y="1417401"/>
+            <a:ext cx="4036213" cy="315471"/>
+          </a:xfrm>
+          <a:prstGeom prst="rect">
+            <a:avLst/>
+          </a:prstGeom>
+          <a:solidFill>
+            <a:srgbClr val="0AB4BA"/>
+          </a:solidFill>
+        </p:spPr>
+        <p:txBody>
+          <a:bodyPr wrap="square" rtlCol="0" anchor="ctr">
+            <a:spAutoFit/>
+          </a:bodyPr>
+          <a:lstStyle>
+            <a:defPPr>
+              <a:defRPr lang="pt-BR"/>
+            </a:defPPr>
+            <a:lvl1pPr marL="0" algn="l" defTabSz="914400" rtl="0" eaLnBrk="1" latinLnBrk="0" hangingPunct="1">
+              <a:defRPr sz="1800" kern="1200">
+                <a:solidFill>
+                  <a:schemeClr val="tx1"/>
+                </a:solidFill>
+                <a:latin typeface="+mn-lt"/>
+                <a:ea typeface="+mn-ea"/>
+                <a:cs typeface="+mn-cs"/>
+              </a:defRPr>
+            </a:lvl1pPr>
+            <a:lvl2pPr marL="457200" algn="l" defTabSz="914400" rtl="0" eaLnBrk="1" latinLnBrk="0" hangingPunct="1">
+              <a:defRPr sz="1800" kern="1200">
+                <a:solidFill>
+                  <a:schemeClr val="tx1"/>
+                </a:solidFill>
+                <a:latin typeface="+mn-lt"/>
+                <a:ea typeface="+mn-ea"/>
+                <a:cs typeface="+mn-cs"/>
+              </a:defRPr>
+            </a:lvl2pPr>
+            <a:lvl3pPr marL="914400" algn="l" defTabSz="914400" rtl="0" eaLnBrk="1" latinLnBrk="0" hangingPunct="1">
+              <a:defRPr sz="1800" kern="1200">
+                <a:solidFill>
+                  <a:schemeClr val="tx1"/>
+                </a:solidFill>
+                <a:latin typeface="+mn-lt"/>
+                <a:ea typeface="+mn-ea"/>
+                <a:cs typeface="+mn-cs"/>
+              </a:defRPr>
+            </a:lvl3pPr>
+            <a:lvl4pPr marL="1371600" algn="l" defTabSz="914400" rtl="0" eaLnBrk="1" latinLnBrk="0" hangingPunct="1">
+              <a:defRPr sz="1800" kern="1200">
+                <a:solidFill>
+                  <a:schemeClr val="tx1"/>
+                </a:solidFill>
+                <a:latin typeface="+mn-lt"/>
+                <a:ea typeface="+mn-ea"/>
+                <a:cs typeface="+mn-cs"/>
+              </a:defRPr>
+            </a:lvl4pPr>
+            <a:lvl5pPr marL="1828800" algn="l" defTabSz="914400" rtl="0" eaLnBrk="1" latinLnBrk="0" hangingPunct="1">
+              <a:defRPr sz="1800" kern="1200">
+                <a:solidFill>
+                  <a:schemeClr val="tx1"/>
+                </a:solidFill>
+                <a:latin typeface="+mn-lt"/>
+                <a:ea typeface="+mn-ea"/>
+                <a:cs typeface="+mn-cs"/>
+              </a:defRPr>
+            </a:lvl5pPr>
+            <a:lvl6pPr marL="2286000" algn="l" defTabSz="914400" rtl="0" eaLnBrk="1" latinLnBrk="0" hangingPunct="1">
+              <a:defRPr sz="1800" kern="1200">
+                <a:solidFill>
+                  <a:schemeClr val="tx1"/>
+                </a:solidFill>
+                <a:latin typeface="+mn-lt"/>
+                <a:ea typeface="+mn-ea"/>
+                <a:cs typeface="+mn-cs"/>
+              </a:defRPr>
+            </a:lvl6pPr>
+            <a:lvl7pPr marL="2743200" algn="l" defTabSz="914400" rtl="0" eaLnBrk="1" latinLnBrk="0" hangingPunct="1">
+              <a:defRPr sz="1800" kern="1200">
+                <a:solidFill>
+                  <a:schemeClr val="tx1"/>
+                </a:solidFill>
+                <a:latin typeface="+mn-lt"/>
+                <a:ea typeface="+mn-ea"/>
+                <a:cs typeface="+mn-cs"/>
+              </a:defRPr>
+            </a:lvl7pPr>
+            <a:lvl8pPr marL="3200400" algn="l" defTabSz="914400" rtl="0" eaLnBrk="1" latinLnBrk="0" hangingPunct="1">
+              <a:defRPr sz="1800" kern="1200">
+                <a:solidFill>
+                  <a:schemeClr val="tx1"/>
+                </a:solidFill>
+                <a:latin typeface="+mn-lt"/>
+                <a:ea typeface="+mn-ea"/>
+                <a:cs typeface="+mn-cs"/>
+              </a:defRPr>
+            </a:lvl8pPr>
+            <a:lvl9pPr marL="3657600" algn="l" defTabSz="914400" rtl="0" eaLnBrk="1" latinLnBrk="0" hangingPunct="1">
+              <a:defRPr sz="1800" kern="1200">
+                <a:solidFill>
+                  <a:schemeClr val="tx1"/>
+                </a:solidFill>
+                <a:latin typeface="+mn-lt"/>
+                <a:ea typeface="+mn-ea"/>
+                <a:cs typeface="+mn-cs"/>
+              </a:defRPr>
+            </a:lvl9pPr>
+          </a:lstStyle>
+          <a:p>
+            <a:pPr algn="ctr"/>
+            <a:r>
+              <a:rPr lang="pt-BR" sz="1450" b="1" kern="0" spc="27" dirty="0">
+                <a:solidFill>
+                  <a:schemeClr val="bg1"/>
+                </a:solidFill>
+                <a:latin typeface="Calibri" panose="020F0502020204030204" pitchFamily="34" charset="0"/>
+                <a:cs typeface="Gotham-Light"/>
+              </a:rPr>
+              <a:t>A área de </a:t>
+            </a:r>
+            <a:r>
+              <a:rPr lang="pt-BR" sz="1450" b="1" kern="0" spc="27" dirty="0" err="1">
+                <a:solidFill>
+                  <a:schemeClr val="bg1"/>
+                </a:solidFill>
+                <a:latin typeface="Calibri" panose="020F0502020204030204" pitchFamily="34" charset="0"/>
+                <a:cs typeface="Gotham-Light"/>
+              </a:rPr>
+              <a:t>stage</a:t>
+            </a:r>
+            <a:endParaRPr lang="pt-BR" sz="1450" b="1" kern="0" spc="27" dirty="0">
+              <a:solidFill>
+                <a:schemeClr val="bg1"/>
+              </a:solidFill>
+              <a:latin typeface="Calibri" panose="020F0502020204030204" pitchFamily="34" charset="0"/>
+              <a:cs typeface="Gotham-Light"/>
+            </a:endParaRPr>
+          </a:p>
+        </p:txBody>
+      </p:sp>
+      <p:pic>
+        <p:nvPicPr>
+          <p:cNvPr id="4" name="Imagem 3"/>
+          <p:cNvPicPr>
+            <a:picLocks noChangeAspect="1"/>
+          </p:cNvPicPr>
+          <p:nvPr/>
+        </p:nvPicPr>
+        <p:blipFill>
+          <a:blip r:embed="rId2"/>
+          <a:stretch>
+            <a:fillRect/>
+          </a:stretch>
+        </p:blipFill>
+        <p:spPr>
+          <a:xfrm>
+            <a:off x="2957514" y="2122636"/>
+            <a:ext cx="3993380" cy="2463652"/>
+          </a:xfrm>
+          <a:prstGeom prst="rect">
+            <a:avLst/>
+          </a:prstGeom>
+        </p:spPr>
+      </p:pic>
+      <p:sp>
+        <p:nvSpPr>
+          <p:cNvPr id="5" name="Subtítulo 5"/>
+          <p:cNvSpPr txBox="1">
+            <a:spLocks/>
+          </p:cNvSpPr>
+          <p:nvPr/>
+        </p:nvSpPr>
+        <p:spPr bwMode="auto">
+          <a:xfrm>
+            <a:off x="1655106" y="5395343"/>
+            <a:ext cx="6634104" cy="1248461"/>
+          </a:xfrm>
+          <a:prstGeom prst="rect">
+            <a:avLst/>
+          </a:prstGeom>
+          <a:noFill/>
+          <a:ln>
+            <a:noFill/>
+          </a:ln>
+          <a:extLst>
+            <a:ext uri="{909E8E84-426E-40DD-AFC4-6F175D3DCCD1}">
+              <a14:hiddenFill xmlns:a14="http://schemas.microsoft.com/office/drawing/2010/main">
+                <a:solidFill>
+                  <a:srgbClr val="FFFFFF"/>
+                </a:solidFill>
+              </a14:hiddenFill>
+            </a:ext>
+            <a:ext uri="{91240B29-F687-4F45-9708-019B960494DF}">
+              <a14:hiddenLine xmlns:a14="http://schemas.microsoft.com/office/drawing/2010/main" w="9525">
+                <a:solidFill>
+                  <a:srgbClr val="000000"/>
+                </a:solidFill>
+                <a:miter lim="800000"/>
+                <a:headEnd/>
+                <a:tailEnd/>
+              </a14:hiddenLine>
+            </a:ext>
+          </a:extLst>
+        </p:spPr>
+        <p:txBody>
+          <a:bodyPr wrap="square" anchor="t" anchorCtr="0">
+            <a:noAutofit/>
+          </a:bodyPr>
+          <a:lstStyle>
+            <a:defPPr>
+              <a:defRPr lang="pt-BR"/>
+            </a:defPPr>
+            <a:lvl1pPr marL="0" algn="l" defTabSz="914400" rtl="0" eaLnBrk="1" latinLnBrk="0" hangingPunct="1">
+              <a:defRPr sz="1800" kern="1200">
+                <a:solidFill>
+                  <a:schemeClr val="tx1"/>
+                </a:solidFill>
+                <a:latin typeface="+mn-lt"/>
+                <a:ea typeface="+mn-ea"/>
+                <a:cs typeface="+mn-cs"/>
+              </a:defRPr>
+            </a:lvl1pPr>
+            <a:lvl2pPr marL="457200" algn="l" defTabSz="914400" rtl="0" eaLnBrk="1" latinLnBrk="0" hangingPunct="1">
+              <a:defRPr sz="1800" kern="1200">
+                <a:solidFill>
+                  <a:schemeClr val="tx1"/>
+                </a:solidFill>
+                <a:latin typeface="+mn-lt"/>
+                <a:ea typeface="+mn-ea"/>
+                <a:cs typeface="+mn-cs"/>
+              </a:defRPr>
+            </a:lvl2pPr>
+            <a:lvl3pPr marL="914400" algn="l" defTabSz="914400" rtl="0" eaLnBrk="1" latinLnBrk="0" hangingPunct="1">
+              <a:defRPr sz="1800" kern="1200">
+                <a:solidFill>
+                  <a:schemeClr val="tx1"/>
+                </a:solidFill>
+                <a:latin typeface="+mn-lt"/>
+                <a:ea typeface="+mn-ea"/>
+                <a:cs typeface="+mn-cs"/>
+              </a:defRPr>
+            </a:lvl3pPr>
+            <a:lvl4pPr marL="1371600" algn="l" defTabSz="914400" rtl="0" eaLnBrk="1" latinLnBrk="0" hangingPunct="1">
+              <a:defRPr sz="1800" kern="1200">
+                <a:solidFill>
+                  <a:schemeClr val="tx1"/>
+                </a:solidFill>
+                <a:latin typeface="+mn-lt"/>
+                <a:ea typeface="+mn-ea"/>
+                <a:cs typeface="+mn-cs"/>
+              </a:defRPr>
+            </a:lvl4pPr>
+            <a:lvl5pPr marL="1828800" algn="l" defTabSz="914400" rtl="0" eaLnBrk="1" latinLnBrk="0" hangingPunct="1">
+              <a:defRPr sz="1800" kern="1200">
+                <a:solidFill>
+                  <a:schemeClr val="tx1"/>
+                </a:solidFill>
+                <a:latin typeface="+mn-lt"/>
+                <a:ea typeface="+mn-ea"/>
+                <a:cs typeface="+mn-cs"/>
+              </a:defRPr>
+            </a:lvl5pPr>
+            <a:lvl6pPr marL="2286000" algn="l" defTabSz="914400" rtl="0" eaLnBrk="1" latinLnBrk="0" hangingPunct="1">
+              <a:defRPr sz="1800" kern="1200">
+                <a:solidFill>
+                  <a:schemeClr val="tx1"/>
+                </a:solidFill>
+                <a:latin typeface="+mn-lt"/>
+                <a:ea typeface="+mn-ea"/>
+                <a:cs typeface="+mn-cs"/>
+              </a:defRPr>
+            </a:lvl6pPr>
+            <a:lvl7pPr marL="2743200" algn="l" defTabSz="914400" rtl="0" eaLnBrk="1" latinLnBrk="0" hangingPunct="1">
+              <a:defRPr sz="1800" kern="1200">
+                <a:solidFill>
+                  <a:schemeClr val="tx1"/>
+                </a:solidFill>
+                <a:latin typeface="+mn-lt"/>
+                <a:ea typeface="+mn-ea"/>
+                <a:cs typeface="+mn-cs"/>
+              </a:defRPr>
+            </a:lvl7pPr>
+            <a:lvl8pPr marL="3200400" algn="l" defTabSz="914400" rtl="0" eaLnBrk="1" latinLnBrk="0" hangingPunct="1">
+              <a:defRPr sz="1800" kern="1200">
+                <a:solidFill>
+                  <a:schemeClr val="tx1"/>
+                </a:solidFill>
+                <a:latin typeface="+mn-lt"/>
+                <a:ea typeface="+mn-ea"/>
+                <a:cs typeface="+mn-cs"/>
+              </a:defRPr>
+            </a:lvl8pPr>
+            <a:lvl9pPr marL="3657600" algn="l" defTabSz="914400" rtl="0" eaLnBrk="1" latinLnBrk="0" hangingPunct="1">
+              <a:defRPr sz="1800" kern="1200">
+                <a:solidFill>
+                  <a:schemeClr val="tx1"/>
+                </a:solidFill>
+                <a:latin typeface="+mn-lt"/>
+                <a:ea typeface="+mn-ea"/>
+                <a:cs typeface="+mn-cs"/>
+              </a:defRPr>
+            </a:lvl9pPr>
+          </a:lstStyle>
+          <a:p>
+            <a:pPr marL="258890" indent="-258890" defTabSz="414223">
+              <a:lnSpc>
+                <a:spcPct val="80000"/>
+              </a:lnSpc>
+              <a:spcAft>
+                <a:spcPts val="725"/>
+              </a:spcAft>
+              <a:buClr>
+                <a:srgbClr val="C05200"/>
+              </a:buClr>
+              <a:buFont typeface="Arial" panose="020B0604020202020204" pitchFamily="34" charset="0"/>
+              <a:buChar char="•"/>
+              <a:defRPr/>
+            </a:pPr>
+            <a:r>
+              <a:rPr lang="pt-BR" sz="1631" dirty="0">
+                <a:solidFill>
+                  <a:srgbClr val="000000">
+                    <a:lumMod val="65000"/>
+                    <a:lumOff val="35000"/>
+                  </a:srgbClr>
+                </a:solidFill>
+                <a:latin typeface="Calibri" panose="020F0502020204030204" pitchFamily="34" charset="0"/>
+                <a:ea typeface="Open Sans" panose="020B0606030504020204" pitchFamily="34" charset="0"/>
+                <a:cs typeface="Open Sans" panose="020B0606030504020204" pitchFamily="34" charset="0"/>
+                <a:sym typeface="Calibri"/>
+              </a:rPr>
+              <a:t>Quando executamos o </a:t>
+            </a:r>
+            <a:r>
+              <a:rPr lang="pt-BR" sz="1631" dirty="0" err="1">
+                <a:solidFill>
+                  <a:srgbClr val="000000">
+                    <a:lumMod val="65000"/>
+                    <a:lumOff val="35000"/>
+                  </a:srgbClr>
+                </a:solidFill>
+                <a:latin typeface="Calibri" panose="020F0502020204030204" pitchFamily="34" charset="0"/>
+                <a:ea typeface="Open Sans" panose="020B0606030504020204" pitchFamily="34" charset="0"/>
+                <a:cs typeface="Open Sans" panose="020B0606030504020204" pitchFamily="34" charset="0"/>
+                <a:sym typeface="Calibri"/>
+              </a:rPr>
+              <a:t>git</a:t>
+            </a:r>
+            <a:r>
+              <a:rPr lang="pt-BR" sz="1631" dirty="0">
+                <a:solidFill>
+                  <a:srgbClr val="000000">
+                    <a:lumMod val="65000"/>
+                    <a:lumOff val="35000"/>
+                  </a:srgbClr>
+                </a:solidFill>
+                <a:latin typeface="Calibri" panose="020F0502020204030204" pitchFamily="34" charset="0"/>
+                <a:ea typeface="Open Sans" panose="020B0606030504020204" pitchFamily="34" charset="0"/>
+                <a:cs typeface="Open Sans" panose="020B0606030504020204" pitchFamily="34" charset="0"/>
+                <a:sym typeface="Calibri"/>
+              </a:rPr>
+              <a:t> </a:t>
+            </a:r>
+            <a:r>
+              <a:rPr lang="pt-BR" sz="1631" dirty="0" err="1">
+                <a:solidFill>
+                  <a:srgbClr val="000000">
+                    <a:lumMod val="65000"/>
+                    <a:lumOff val="35000"/>
+                  </a:srgbClr>
+                </a:solidFill>
+                <a:latin typeface="Calibri" panose="020F0502020204030204" pitchFamily="34" charset="0"/>
+                <a:ea typeface="Open Sans" panose="020B0606030504020204" pitchFamily="34" charset="0"/>
+                <a:cs typeface="Open Sans" panose="020B0606030504020204" pitchFamily="34" charset="0"/>
+                <a:sym typeface="Calibri"/>
+              </a:rPr>
+              <a:t>add</a:t>
+            </a:r>
+            <a:r>
+              <a:rPr lang="pt-BR" sz="1631" dirty="0">
+                <a:solidFill>
+                  <a:srgbClr val="000000">
+                    <a:lumMod val="65000"/>
+                    <a:lumOff val="35000"/>
+                  </a:srgbClr>
+                </a:solidFill>
+                <a:latin typeface="Calibri" panose="020F0502020204030204" pitchFamily="34" charset="0"/>
+                <a:ea typeface="Open Sans" panose="020B0606030504020204" pitchFamily="34" charset="0"/>
+                <a:cs typeface="Open Sans" panose="020B0606030504020204" pitchFamily="34" charset="0"/>
+                <a:sym typeface="Calibri"/>
+              </a:rPr>
+              <a:t>, o </a:t>
+            </a:r>
+            <a:r>
+              <a:rPr lang="pt-BR" sz="1631" dirty="0" err="1">
+                <a:solidFill>
+                  <a:srgbClr val="000000">
+                    <a:lumMod val="65000"/>
+                    <a:lumOff val="35000"/>
+                  </a:srgbClr>
+                </a:solidFill>
+                <a:latin typeface="Calibri" panose="020F0502020204030204" pitchFamily="34" charset="0"/>
+                <a:ea typeface="Open Sans" panose="020B0606030504020204" pitchFamily="34" charset="0"/>
+                <a:cs typeface="Open Sans" panose="020B0606030504020204" pitchFamily="34" charset="0"/>
+                <a:sym typeface="Calibri"/>
+              </a:rPr>
+              <a:t>git</a:t>
+            </a:r>
+            <a:r>
+              <a:rPr lang="pt-BR" sz="1631" dirty="0">
+                <a:solidFill>
+                  <a:srgbClr val="000000">
+                    <a:lumMod val="65000"/>
+                    <a:lumOff val="35000"/>
+                  </a:srgbClr>
+                </a:solidFill>
+                <a:latin typeface="Calibri" panose="020F0502020204030204" pitchFamily="34" charset="0"/>
+                <a:ea typeface="Open Sans" panose="020B0606030504020204" pitchFamily="34" charset="0"/>
+                <a:cs typeface="Open Sans" panose="020B0606030504020204" pitchFamily="34" charset="0"/>
+                <a:sym typeface="Calibri"/>
+              </a:rPr>
+              <a:t> adiciona os arquivos na área de </a:t>
+            </a:r>
+            <a:r>
+              <a:rPr lang="pt-BR" sz="1631" dirty="0" err="1">
+                <a:solidFill>
+                  <a:srgbClr val="000000">
+                    <a:lumMod val="65000"/>
+                    <a:lumOff val="35000"/>
+                  </a:srgbClr>
+                </a:solidFill>
+                <a:latin typeface="Calibri" panose="020F0502020204030204" pitchFamily="34" charset="0"/>
+                <a:ea typeface="Open Sans" panose="020B0606030504020204" pitchFamily="34" charset="0"/>
+                <a:cs typeface="Open Sans" panose="020B0606030504020204" pitchFamily="34" charset="0"/>
+                <a:sym typeface="Calibri"/>
+              </a:rPr>
+              <a:t>stage</a:t>
+            </a:r>
+            <a:r>
+              <a:rPr lang="pt-BR" sz="1631" dirty="0">
+                <a:solidFill>
+                  <a:srgbClr val="000000">
+                    <a:lumMod val="65000"/>
+                    <a:lumOff val="35000"/>
+                  </a:srgbClr>
+                </a:solidFill>
+                <a:latin typeface="Calibri" panose="020F0502020204030204" pitchFamily="34" charset="0"/>
+                <a:ea typeface="Open Sans" panose="020B0606030504020204" pitchFamily="34" charset="0"/>
+                <a:cs typeface="Open Sans" panose="020B0606030504020204" pitchFamily="34" charset="0"/>
+                <a:sym typeface="Calibri"/>
+              </a:rPr>
+              <a:t>;</a:t>
+            </a:r>
+          </a:p>
+          <a:p>
+            <a:pPr marL="258890" indent="-258890" defTabSz="414223">
+              <a:lnSpc>
+                <a:spcPct val="80000"/>
+              </a:lnSpc>
+              <a:spcAft>
+                <a:spcPts val="725"/>
+              </a:spcAft>
+              <a:buClr>
+                <a:srgbClr val="C05200"/>
+              </a:buClr>
+              <a:buFont typeface="Arial" panose="020B0604020202020204" pitchFamily="34" charset="0"/>
+              <a:buChar char="•"/>
+              <a:defRPr/>
+            </a:pPr>
+            <a:r>
+              <a:rPr lang="pt-BR" sz="1631" dirty="0">
+                <a:solidFill>
+                  <a:srgbClr val="000000">
+                    <a:lumMod val="65000"/>
+                    <a:lumOff val="35000"/>
+                  </a:srgbClr>
+                </a:solidFill>
+                <a:latin typeface="Calibri" panose="020F0502020204030204" pitchFamily="34" charset="0"/>
+                <a:ea typeface="Open Sans" panose="020B0606030504020204" pitchFamily="34" charset="0"/>
+                <a:cs typeface="Open Sans" panose="020B0606030504020204" pitchFamily="34" charset="0"/>
+              </a:rPr>
+              <a:t>Nessa área, todas as mudanças passam a ser rastreadas</a:t>
+            </a:r>
+          </a:p>
+          <a:p>
+            <a:pPr marL="258890" indent="-258890" defTabSz="414223">
+              <a:lnSpc>
+                <a:spcPct val="80000"/>
+              </a:lnSpc>
+              <a:spcAft>
+                <a:spcPts val="725"/>
+              </a:spcAft>
+              <a:buClr>
+                <a:srgbClr val="C05200"/>
+              </a:buClr>
+              <a:buFont typeface="Arial" panose="020B0604020202020204" pitchFamily="34" charset="0"/>
+              <a:buChar char="•"/>
+              <a:defRPr/>
+            </a:pPr>
+            <a:endParaRPr lang="pt-BR" sz="1631" dirty="0">
+              <a:solidFill>
+                <a:srgbClr val="000000">
+                  <a:lumMod val="65000"/>
+                  <a:lumOff val="35000"/>
+                </a:srgbClr>
+              </a:solidFill>
+              <a:latin typeface="Calibri" panose="020F0502020204030204" pitchFamily="34" charset="0"/>
+              <a:ea typeface="Open Sans" panose="020B0606030504020204" pitchFamily="34" charset="0"/>
+              <a:cs typeface="Open Sans" panose="020B0606030504020204" pitchFamily="34" charset="0"/>
+              <a:sym typeface="Calibri"/>
+            </a:endParaRPr>
+          </a:p>
+          <a:p>
+            <a:pPr marL="258890" indent="-258890" defTabSz="414223">
+              <a:lnSpc>
+                <a:spcPct val="80000"/>
+              </a:lnSpc>
+              <a:spcAft>
+                <a:spcPts val="725"/>
+              </a:spcAft>
+              <a:buClr>
+                <a:srgbClr val="C05200"/>
+              </a:buClr>
+              <a:buFont typeface="Arial" panose="020B0604020202020204" pitchFamily="34" charset="0"/>
+              <a:buChar char="•"/>
+              <a:defRPr/>
+            </a:pPr>
+            <a:endParaRPr lang="pt-BR" sz="1631" dirty="0">
+              <a:solidFill>
+                <a:srgbClr val="000000">
+                  <a:lumMod val="65000"/>
+                  <a:lumOff val="35000"/>
+                </a:srgbClr>
+              </a:solidFill>
+              <a:latin typeface="Calibri" panose="020F0502020204030204" pitchFamily="34" charset="0"/>
+              <a:ea typeface="Open Sans" panose="020B0606030504020204" pitchFamily="34" charset="0"/>
+              <a:cs typeface="Open Sans" panose="020B0606030504020204" pitchFamily="34" charset="0"/>
+              <a:sym typeface="Calibri"/>
+            </a:endParaRPr>
+          </a:p>
+        </p:txBody>
+      </p:sp>
+    </p:spTree>
+    <p:extLst>
+      <p:ext uri="{BB962C8B-B14F-4D97-AF65-F5344CB8AC3E}">
+        <p14:creationId xmlns:p14="http://schemas.microsoft.com/office/powerpoint/2010/main" val="1233336161"/>
+      </p:ext>
+    </p:extLst>
+  </p:cSld>
+  <p:clrMapOvr>
+    <a:masterClrMapping/>
+  </p:clrMapOvr>
+  <p:transition spd="med"/>
+</p:sld>
+</file>
+
+<file path=ppt/slides/slide17.xml><?xml version="1.0" encoding="utf-8"?>
+<p:sld xmlns:a="http://schemas.openxmlformats.org/drawingml/2006/main" xmlns:r="http://schemas.openxmlformats.org/officeDocument/2006/relationships" xmlns:p="http://schemas.openxmlformats.org/presentationml/2006/main">
+  <p:cSld>
+    <p:spTree>
+      <p:nvGrpSpPr>
+        <p:cNvPr id="1" name=""/>
+        <p:cNvGrpSpPr/>
+        <p:nvPr/>
+      </p:nvGrpSpPr>
+      <p:grpSpPr>
+        <a:xfrm>
+          <a:off x="0" y="0"/>
+          <a:ext cx="0" cy="0"/>
+          <a:chOff x="0" y="0"/>
+          <a:chExt cx="0" cy="0"/>
+        </a:xfrm>
+      </p:grpSpPr>
+      <p:sp>
+        <p:nvSpPr>
+          <p:cNvPr id="2" name="CaixaDeTexto 35"/>
+          <p:cNvSpPr txBox="1"/>
+          <p:nvPr/>
+        </p:nvSpPr>
+        <p:spPr>
+          <a:xfrm>
+            <a:off x="192886" y="2481346"/>
+            <a:ext cx="4036213" cy="315471"/>
+          </a:xfrm>
+          <a:prstGeom prst="rect">
+            <a:avLst/>
+          </a:prstGeom>
+          <a:solidFill>
+            <a:srgbClr val="0AB4BA"/>
+          </a:solidFill>
+        </p:spPr>
+        <p:txBody>
+          <a:bodyPr wrap="square" rtlCol="0" anchor="ctr">
+            <a:spAutoFit/>
+          </a:bodyPr>
+          <a:lstStyle>
+            <a:defPPr>
+              <a:defRPr lang="pt-BR"/>
+            </a:defPPr>
+            <a:lvl1pPr marL="0" algn="l" defTabSz="914400" rtl="0" eaLnBrk="1" latinLnBrk="0" hangingPunct="1">
+              <a:defRPr sz="1800" kern="1200">
+                <a:solidFill>
+                  <a:schemeClr val="tx1"/>
+                </a:solidFill>
+                <a:latin typeface="+mn-lt"/>
+                <a:ea typeface="+mn-ea"/>
+                <a:cs typeface="+mn-cs"/>
+              </a:defRPr>
+            </a:lvl1pPr>
+            <a:lvl2pPr marL="457200" algn="l" defTabSz="914400" rtl="0" eaLnBrk="1" latinLnBrk="0" hangingPunct="1">
+              <a:defRPr sz="1800" kern="1200">
+                <a:solidFill>
+                  <a:schemeClr val="tx1"/>
+                </a:solidFill>
+                <a:latin typeface="+mn-lt"/>
+                <a:ea typeface="+mn-ea"/>
+                <a:cs typeface="+mn-cs"/>
+              </a:defRPr>
+            </a:lvl2pPr>
+            <a:lvl3pPr marL="914400" algn="l" defTabSz="914400" rtl="0" eaLnBrk="1" latinLnBrk="0" hangingPunct="1">
+              <a:defRPr sz="1800" kern="1200">
+                <a:solidFill>
+                  <a:schemeClr val="tx1"/>
+                </a:solidFill>
+                <a:latin typeface="+mn-lt"/>
+                <a:ea typeface="+mn-ea"/>
+                <a:cs typeface="+mn-cs"/>
+              </a:defRPr>
+            </a:lvl3pPr>
+            <a:lvl4pPr marL="1371600" algn="l" defTabSz="914400" rtl="0" eaLnBrk="1" latinLnBrk="0" hangingPunct="1">
+              <a:defRPr sz="1800" kern="1200">
+                <a:solidFill>
+                  <a:schemeClr val="tx1"/>
+                </a:solidFill>
+                <a:latin typeface="+mn-lt"/>
+                <a:ea typeface="+mn-ea"/>
+                <a:cs typeface="+mn-cs"/>
+              </a:defRPr>
+            </a:lvl4pPr>
+            <a:lvl5pPr marL="1828800" algn="l" defTabSz="914400" rtl="0" eaLnBrk="1" latinLnBrk="0" hangingPunct="1">
+              <a:defRPr sz="1800" kern="1200">
+                <a:solidFill>
+                  <a:schemeClr val="tx1"/>
+                </a:solidFill>
+                <a:latin typeface="+mn-lt"/>
+                <a:ea typeface="+mn-ea"/>
+                <a:cs typeface="+mn-cs"/>
+              </a:defRPr>
+            </a:lvl5pPr>
+            <a:lvl6pPr marL="2286000" algn="l" defTabSz="914400" rtl="0" eaLnBrk="1" latinLnBrk="0" hangingPunct="1">
+              <a:defRPr sz="1800" kern="1200">
+                <a:solidFill>
+                  <a:schemeClr val="tx1"/>
+                </a:solidFill>
+                <a:latin typeface="+mn-lt"/>
+                <a:ea typeface="+mn-ea"/>
+                <a:cs typeface="+mn-cs"/>
+              </a:defRPr>
+            </a:lvl6pPr>
+            <a:lvl7pPr marL="2743200" algn="l" defTabSz="914400" rtl="0" eaLnBrk="1" latinLnBrk="0" hangingPunct="1">
+              <a:defRPr sz="1800" kern="1200">
+                <a:solidFill>
+                  <a:schemeClr val="tx1"/>
+                </a:solidFill>
+                <a:latin typeface="+mn-lt"/>
+                <a:ea typeface="+mn-ea"/>
+                <a:cs typeface="+mn-cs"/>
+              </a:defRPr>
+            </a:lvl7pPr>
+            <a:lvl8pPr marL="3200400" algn="l" defTabSz="914400" rtl="0" eaLnBrk="1" latinLnBrk="0" hangingPunct="1">
+              <a:defRPr sz="1800" kern="1200">
+                <a:solidFill>
+                  <a:schemeClr val="tx1"/>
+                </a:solidFill>
+                <a:latin typeface="+mn-lt"/>
+                <a:ea typeface="+mn-ea"/>
+                <a:cs typeface="+mn-cs"/>
+              </a:defRPr>
+            </a:lvl8pPr>
+            <a:lvl9pPr marL="3657600" algn="l" defTabSz="914400" rtl="0" eaLnBrk="1" latinLnBrk="0" hangingPunct="1">
+              <a:defRPr sz="1800" kern="1200">
+                <a:solidFill>
+                  <a:schemeClr val="tx1"/>
+                </a:solidFill>
+                <a:latin typeface="+mn-lt"/>
+                <a:ea typeface="+mn-ea"/>
+                <a:cs typeface="+mn-cs"/>
+              </a:defRPr>
+            </a:lvl9pPr>
+          </a:lstStyle>
+          <a:p>
+            <a:pPr algn="ctr"/>
+            <a:r>
+              <a:rPr lang="pt-BR" sz="1450" b="1" kern="0" spc="27" dirty="0">
+                <a:solidFill>
+                  <a:schemeClr val="bg1"/>
+                </a:solidFill>
+                <a:latin typeface="Calibri" panose="020F0502020204030204" pitchFamily="34" charset="0"/>
+                <a:cs typeface="Gotham-Light"/>
+              </a:rPr>
+              <a:t>Alterando arquivos já adicionados no </a:t>
+            </a:r>
+            <a:r>
+              <a:rPr lang="pt-BR" sz="1450" b="1" kern="0" spc="27" dirty="0" err="1">
+                <a:solidFill>
+                  <a:schemeClr val="bg1"/>
+                </a:solidFill>
+                <a:latin typeface="Calibri" panose="020F0502020204030204" pitchFamily="34" charset="0"/>
+                <a:cs typeface="Gotham-Light"/>
+              </a:rPr>
+              <a:t>stage</a:t>
+            </a:r>
+            <a:endParaRPr lang="pt-BR" sz="1450" b="1" kern="0" spc="27" dirty="0">
+              <a:solidFill>
+                <a:schemeClr val="bg1"/>
+              </a:solidFill>
+              <a:latin typeface="Calibri" panose="020F0502020204030204" pitchFamily="34" charset="0"/>
+              <a:cs typeface="Gotham-Light"/>
+            </a:endParaRPr>
+          </a:p>
+        </p:txBody>
+      </p:sp>
+      <p:pic>
+        <p:nvPicPr>
+          <p:cNvPr id="3" name="Imagem 2"/>
+          <p:cNvPicPr>
+            <a:picLocks noChangeAspect="1"/>
+          </p:cNvPicPr>
+          <p:nvPr/>
+        </p:nvPicPr>
+        <p:blipFill>
+          <a:blip r:embed="rId2"/>
+          <a:stretch>
+            <a:fillRect/>
+          </a:stretch>
+        </p:blipFill>
+        <p:spPr>
+          <a:xfrm>
+            <a:off x="4843462" y="1135163"/>
+            <a:ext cx="5349875" cy="3007836"/>
+          </a:xfrm>
+          <a:prstGeom prst="rect">
+            <a:avLst/>
+          </a:prstGeom>
+        </p:spPr>
+      </p:pic>
+      <p:sp>
+        <p:nvSpPr>
+          <p:cNvPr id="4" name="CaixaDeTexto 35"/>
+          <p:cNvSpPr txBox="1"/>
+          <p:nvPr/>
+        </p:nvSpPr>
+        <p:spPr>
+          <a:xfrm>
+            <a:off x="192886" y="5604973"/>
+            <a:ext cx="4036213" cy="315471"/>
+          </a:xfrm>
+          <a:prstGeom prst="rect">
+            <a:avLst/>
+          </a:prstGeom>
+          <a:solidFill>
+            <a:srgbClr val="0AB4BA"/>
+          </a:solidFill>
+        </p:spPr>
+        <p:txBody>
+          <a:bodyPr wrap="square" rtlCol="0" anchor="ctr">
+            <a:spAutoFit/>
+          </a:bodyPr>
+          <a:lstStyle>
+            <a:defPPr>
+              <a:defRPr lang="pt-BR"/>
+            </a:defPPr>
+            <a:lvl1pPr marL="0" algn="l" defTabSz="914400" rtl="0" eaLnBrk="1" latinLnBrk="0" hangingPunct="1">
+              <a:defRPr sz="1800" kern="1200">
+                <a:solidFill>
+                  <a:schemeClr val="tx1"/>
+                </a:solidFill>
+                <a:latin typeface="+mn-lt"/>
+                <a:ea typeface="+mn-ea"/>
+                <a:cs typeface="+mn-cs"/>
+              </a:defRPr>
+            </a:lvl1pPr>
+            <a:lvl2pPr marL="457200" algn="l" defTabSz="914400" rtl="0" eaLnBrk="1" latinLnBrk="0" hangingPunct="1">
+              <a:defRPr sz="1800" kern="1200">
+                <a:solidFill>
+                  <a:schemeClr val="tx1"/>
+                </a:solidFill>
+                <a:latin typeface="+mn-lt"/>
+                <a:ea typeface="+mn-ea"/>
+                <a:cs typeface="+mn-cs"/>
+              </a:defRPr>
+            </a:lvl2pPr>
+            <a:lvl3pPr marL="914400" algn="l" defTabSz="914400" rtl="0" eaLnBrk="1" latinLnBrk="0" hangingPunct="1">
+              <a:defRPr sz="1800" kern="1200">
+                <a:solidFill>
+                  <a:schemeClr val="tx1"/>
+                </a:solidFill>
+                <a:latin typeface="+mn-lt"/>
+                <a:ea typeface="+mn-ea"/>
+                <a:cs typeface="+mn-cs"/>
+              </a:defRPr>
+            </a:lvl3pPr>
+            <a:lvl4pPr marL="1371600" algn="l" defTabSz="914400" rtl="0" eaLnBrk="1" latinLnBrk="0" hangingPunct="1">
+              <a:defRPr sz="1800" kern="1200">
+                <a:solidFill>
+                  <a:schemeClr val="tx1"/>
+                </a:solidFill>
+                <a:latin typeface="+mn-lt"/>
+                <a:ea typeface="+mn-ea"/>
+                <a:cs typeface="+mn-cs"/>
+              </a:defRPr>
+            </a:lvl4pPr>
+            <a:lvl5pPr marL="1828800" algn="l" defTabSz="914400" rtl="0" eaLnBrk="1" latinLnBrk="0" hangingPunct="1">
+              <a:defRPr sz="1800" kern="1200">
+                <a:solidFill>
+                  <a:schemeClr val="tx1"/>
+                </a:solidFill>
+                <a:latin typeface="+mn-lt"/>
+                <a:ea typeface="+mn-ea"/>
+                <a:cs typeface="+mn-cs"/>
+              </a:defRPr>
+            </a:lvl5pPr>
+            <a:lvl6pPr marL="2286000" algn="l" defTabSz="914400" rtl="0" eaLnBrk="1" latinLnBrk="0" hangingPunct="1">
+              <a:defRPr sz="1800" kern="1200">
+                <a:solidFill>
+                  <a:schemeClr val="tx1"/>
+                </a:solidFill>
+                <a:latin typeface="+mn-lt"/>
+                <a:ea typeface="+mn-ea"/>
+                <a:cs typeface="+mn-cs"/>
+              </a:defRPr>
+            </a:lvl6pPr>
+            <a:lvl7pPr marL="2743200" algn="l" defTabSz="914400" rtl="0" eaLnBrk="1" latinLnBrk="0" hangingPunct="1">
+              <a:defRPr sz="1800" kern="1200">
+                <a:solidFill>
+                  <a:schemeClr val="tx1"/>
+                </a:solidFill>
+                <a:latin typeface="+mn-lt"/>
+                <a:ea typeface="+mn-ea"/>
+                <a:cs typeface="+mn-cs"/>
+              </a:defRPr>
+            </a:lvl7pPr>
+            <a:lvl8pPr marL="3200400" algn="l" defTabSz="914400" rtl="0" eaLnBrk="1" latinLnBrk="0" hangingPunct="1">
+              <a:defRPr sz="1800" kern="1200">
+                <a:solidFill>
+                  <a:schemeClr val="tx1"/>
+                </a:solidFill>
+                <a:latin typeface="+mn-lt"/>
+                <a:ea typeface="+mn-ea"/>
+                <a:cs typeface="+mn-cs"/>
+              </a:defRPr>
+            </a:lvl8pPr>
+            <a:lvl9pPr marL="3657600" algn="l" defTabSz="914400" rtl="0" eaLnBrk="1" latinLnBrk="0" hangingPunct="1">
+              <a:defRPr sz="1800" kern="1200">
+                <a:solidFill>
+                  <a:schemeClr val="tx1"/>
+                </a:solidFill>
+                <a:latin typeface="+mn-lt"/>
+                <a:ea typeface="+mn-ea"/>
+                <a:cs typeface="+mn-cs"/>
+              </a:defRPr>
+            </a:lvl9pPr>
+          </a:lstStyle>
+          <a:p>
+            <a:pPr algn="ctr"/>
+            <a:r>
+              <a:rPr lang="pt-BR" sz="1450" b="1" kern="0" spc="27" dirty="0">
+                <a:solidFill>
+                  <a:schemeClr val="bg1"/>
+                </a:solidFill>
+                <a:latin typeface="Calibri" panose="020F0502020204030204" pitchFamily="34" charset="0"/>
+                <a:cs typeface="Gotham-Light"/>
+              </a:rPr>
+              <a:t>Vamos executar o </a:t>
+            </a:r>
+            <a:r>
+              <a:rPr lang="pt-BR" sz="1450" b="1" kern="0" spc="27" dirty="0" err="1">
+                <a:solidFill>
+                  <a:schemeClr val="bg1"/>
+                </a:solidFill>
+                <a:latin typeface="Calibri" panose="020F0502020204030204" pitchFamily="34" charset="0"/>
+                <a:cs typeface="Gotham-Light"/>
+              </a:rPr>
+              <a:t>git</a:t>
+            </a:r>
+            <a:r>
+              <a:rPr lang="pt-BR" sz="1450" b="1" kern="0" spc="27" dirty="0">
+                <a:solidFill>
+                  <a:schemeClr val="bg1"/>
+                </a:solidFill>
+                <a:latin typeface="Calibri" panose="020F0502020204030204" pitchFamily="34" charset="0"/>
+                <a:cs typeface="Gotham-Light"/>
+              </a:rPr>
+              <a:t> status</a:t>
+            </a:r>
+          </a:p>
+        </p:txBody>
+      </p:sp>
+      <p:pic>
+        <p:nvPicPr>
+          <p:cNvPr id="5" name="Imagem 4"/>
+          <p:cNvPicPr>
+            <a:picLocks noChangeAspect="1"/>
+          </p:cNvPicPr>
+          <p:nvPr/>
+        </p:nvPicPr>
+        <p:blipFill>
+          <a:blip r:embed="rId3"/>
+          <a:stretch>
+            <a:fillRect/>
+          </a:stretch>
+        </p:blipFill>
+        <p:spPr>
+          <a:xfrm>
+            <a:off x="4843461" y="4362346"/>
+            <a:ext cx="5349875" cy="2800726"/>
+          </a:xfrm>
+          <a:prstGeom prst="rect">
+            <a:avLst/>
+          </a:prstGeom>
+        </p:spPr>
+      </p:pic>
+    </p:spTree>
+    <p:extLst>
+      <p:ext uri="{BB962C8B-B14F-4D97-AF65-F5344CB8AC3E}">
+        <p14:creationId xmlns:p14="http://schemas.microsoft.com/office/powerpoint/2010/main" val="1751712549"/>
+      </p:ext>
+    </p:extLst>
+  </p:cSld>
+  <p:clrMapOvr>
+    <a:masterClrMapping/>
+  </p:clrMapOvr>
+  <p:transition spd="med"/>
+</p:sld>
+</file>
+
 <file path=ppt/slides/slide2.xml><?xml version="1.0" encoding="utf-8"?>
 <p:sld xmlns:a="http://schemas.openxmlformats.org/drawingml/2006/main" xmlns:r="http://schemas.openxmlformats.org/officeDocument/2006/relationships" xmlns:p="http://schemas.openxmlformats.org/presentationml/2006/main">
   <p:cSld>
@@ -4418,7 +7839,6 @@
               <a:rPr lang="pt-BR" dirty="0"/>
               <a:t>https://git-scm.com/</a:t>
             </a:r>
-            <a:endParaRPr lang="pt-BR" dirty="0"/>
           </a:p>
         </p:txBody>
       </p:sp>
@@ -4450,6 +7870,792 @@
     <p:extLst>
       <p:ext uri="{BB962C8B-B14F-4D97-AF65-F5344CB8AC3E}">
         <p14:creationId xmlns:p14="http://schemas.microsoft.com/office/powerpoint/2010/main" val="2026954738"/>
+      </p:ext>
+    </p:extLst>
+  </p:cSld>
+  <p:clrMapOvr>
+    <a:masterClrMapping/>
+  </p:clrMapOvr>
+  <p:transition spd="med"/>
+</p:sld>
+</file>
+
+<file path=ppt/slides/slide8.xml><?xml version="1.0" encoding="utf-8"?>
+<p:sld xmlns:a="http://schemas.openxmlformats.org/drawingml/2006/main" xmlns:r="http://schemas.openxmlformats.org/officeDocument/2006/relationships" xmlns:p="http://schemas.openxmlformats.org/presentationml/2006/main">
+  <p:cSld>
+    <p:spTree>
+      <p:nvGrpSpPr>
+        <p:cNvPr id="1" name=""/>
+        <p:cNvGrpSpPr/>
+        <p:nvPr/>
+      </p:nvGrpSpPr>
+      <p:grpSpPr>
+        <a:xfrm>
+          <a:off x="0" y="0"/>
+          <a:ext cx="0" cy="0"/>
+          <a:chOff x="0" y="0"/>
+          <a:chExt cx="0" cy="0"/>
+        </a:xfrm>
+      </p:grpSpPr>
+      <p:sp>
+        <p:nvSpPr>
+          <p:cNvPr id="5" name="CaixaDeTexto 35"/>
+          <p:cNvSpPr txBox="1"/>
+          <p:nvPr/>
+        </p:nvSpPr>
+        <p:spPr>
+          <a:xfrm>
+            <a:off x="807250" y="2024620"/>
+            <a:ext cx="3078950" cy="315471"/>
+          </a:xfrm>
+          <a:prstGeom prst="rect">
+            <a:avLst/>
+          </a:prstGeom>
+          <a:solidFill>
+            <a:srgbClr val="0AB4BA"/>
+          </a:solidFill>
+        </p:spPr>
+        <p:txBody>
+          <a:bodyPr wrap="square" rtlCol="0" anchor="ctr">
+            <a:spAutoFit/>
+          </a:bodyPr>
+          <a:lstStyle>
+            <a:defPPr>
+              <a:defRPr lang="pt-BR"/>
+            </a:defPPr>
+            <a:lvl1pPr marL="0" algn="l" defTabSz="914400" rtl="0" eaLnBrk="1" latinLnBrk="0" hangingPunct="1">
+              <a:defRPr sz="1800" kern="1200">
+                <a:solidFill>
+                  <a:schemeClr val="tx1"/>
+                </a:solidFill>
+                <a:latin typeface="+mn-lt"/>
+                <a:ea typeface="+mn-ea"/>
+                <a:cs typeface="+mn-cs"/>
+              </a:defRPr>
+            </a:lvl1pPr>
+            <a:lvl2pPr marL="457200" algn="l" defTabSz="914400" rtl="0" eaLnBrk="1" latinLnBrk="0" hangingPunct="1">
+              <a:defRPr sz="1800" kern="1200">
+                <a:solidFill>
+                  <a:schemeClr val="tx1"/>
+                </a:solidFill>
+                <a:latin typeface="+mn-lt"/>
+                <a:ea typeface="+mn-ea"/>
+                <a:cs typeface="+mn-cs"/>
+              </a:defRPr>
+            </a:lvl2pPr>
+            <a:lvl3pPr marL="914400" algn="l" defTabSz="914400" rtl="0" eaLnBrk="1" latinLnBrk="0" hangingPunct="1">
+              <a:defRPr sz="1800" kern="1200">
+                <a:solidFill>
+                  <a:schemeClr val="tx1"/>
+                </a:solidFill>
+                <a:latin typeface="+mn-lt"/>
+                <a:ea typeface="+mn-ea"/>
+                <a:cs typeface="+mn-cs"/>
+              </a:defRPr>
+            </a:lvl3pPr>
+            <a:lvl4pPr marL="1371600" algn="l" defTabSz="914400" rtl="0" eaLnBrk="1" latinLnBrk="0" hangingPunct="1">
+              <a:defRPr sz="1800" kern="1200">
+                <a:solidFill>
+                  <a:schemeClr val="tx1"/>
+                </a:solidFill>
+                <a:latin typeface="+mn-lt"/>
+                <a:ea typeface="+mn-ea"/>
+                <a:cs typeface="+mn-cs"/>
+              </a:defRPr>
+            </a:lvl4pPr>
+            <a:lvl5pPr marL="1828800" algn="l" defTabSz="914400" rtl="0" eaLnBrk="1" latinLnBrk="0" hangingPunct="1">
+              <a:defRPr sz="1800" kern="1200">
+                <a:solidFill>
+                  <a:schemeClr val="tx1"/>
+                </a:solidFill>
+                <a:latin typeface="+mn-lt"/>
+                <a:ea typeface="+mn-ea"/>
+                <a:cs typeface="+mn-cs"/>
+              </a:defRPr>
+            </a:lvl5pPr>
+            <a:lvl6pPr marL="2286000" algn="l" defTabSz="914400" rtl="0" eaLnBrk="1" latinLnBrk="0" hangingPunct="1">
+              <a:defRPr sz="1800" kern="1200">
+                <a:solidFill>
+                  <a:schemeClr val="tx1"/>
+                </a:solidFill>
+                <a:latin typeface="+mn-lt"/>
+                <a:ea typeface="+mn-ea"/>
+                <a:cs typeface="+mn-cs"/>
+              </a:defRPr>
+            </a:lvl6pPr>
+            <a:lvl7pPr marL="2743200" algn="l" defTabSz="914400" rtl="0" eaLnBrk="1" latinLnBrk="0" hangingPunct="1">
+              <a:defRPr sz="1800" kern="1200">
+                <a:solidFill>
+                  <a:schemeClr val="tx1"/>
+                </a:solidFill>
+                <a:latin typeface="+mn-lt"/>
+                <a:ea typeface="+mn-ea"/>
+                <a:cs typeface="+mn-cs"/>
+              </a:defRPr>
+            </a:lvl7pPr>
+            <a:lvl8pPr marL="3200400" algn="l" defTabSz="914400" rtl="0" eaLnBrk="1" latinLnBrk="0" hangingPunct="1">
+              <a:defRPr sz="1800" kern="1200">
+                <a:solidFill>
+                  <a:schemeClr val="tx1"/>
+                </a:solidFill>
+                <a:latin typeface="+mn-lt"/>
+                <a:ea typeface="+mn-ea"/>
+                <a:cs typeface="+mn-cs"/>
+              </a:defRPr>
+            </a:lvl8pPr>
+            <a:lvl9pPr marL="3657600" algn="l" defTabSz="914400" rtl="0" eaLnBrk="1" latinLnBrk="0" hangingPunct="1">
+              <a:defRPr sz="1800" kern="1200">
+                <a:solidFill>
+                  <a:schemeClr val="tx1"/>
+                </a:solidFill>
+                <a:latin typeface="+mn-lt"/>
+                <a:ea typeface="+mn-ea"/>
+                <a:cs typeface="+mn-cs"/>
+              </a:defRPr>
+            </a:lvl9pPr>
+          </a:lstStyle>
+          <a:p>
+            <a:pPr algn="ctr"/>
+            <a:r>
+              <a:rPr lang="pt-BR" sz="1450" b="1" kern="0" spc="27" dirty="0">
+                <a:solidFill>
+                  <a:schemeClr val="bg1"/>
+                </a:solidFill>
+                <a:latin typeface="Calibri" panose="020F0502020204030204" pitchFamily="34" charset="0"/>
+                <a:cs typeface="Gotham-Light"/>
+              </a:rPr>
+              <a:t>Crie uma pasta chamada moveis</a:t>
+            </a:r>
+          </a:p>
+        </p:txBody>
+      </p:sp>
+      <p:sp>
+        <p:nvSpPr>
+          <p:cNvPr id="7" name="CaixaDeTexto 35"/>
+          <p:cNvSpPr txBox="1"/>
+          <p:nvPr/>
+        </p:nvSpPr>
+        <p:spPr>
+          <a:xfrm>
+            <a:off x="807250" y="5437301"/>
+            <a:ext cx="3078950" cy="538609"/>
+          </a:xfrm>
+          <a:prstGeom prst="rect">
+            <a:avLst/>
+          </a:prstGeom>
+          <a:solidFill>
+            <a:srgbClr val="0AB4BA"/>
+          </a:solidFill>
+        </p:spPr>
+        <p:txBody>
+          <a:bodyPr wrap="square" rtlCol="0" anchor="ctr">
+            <a:spAutoFit/>
+          </a:bodyPr>
+          <a:lstStyle>
+            <a:defPPr>
+              <a:defRPr lang="pt-BR"/>
+            </a:defPPr>
+            <a:lvl1pPr marL="0" algn="l" defTabSz="914400" rtl="0" eaLnBrk="1" latinLnBrk="0" hangingPunct="1">
+              <a:defRPr sz="1800" kern="1200">
+                <a:solidFill>
+                  <a:schemeClr val="tx1"/>
+                </a:solidFill>
+                <a:latin typeface="+mn-lt"/>
+                <a:ea typeface="+mn-ea"/>
+                <a:cs typeface="+mn-cs"/>
+              </a:defRPr>
+            </a:lvl1pPr>
+            <a:lvl2pPr marL="457200" algn="l" defTabSz="914400" rtl="0" eaLnBrk="1" latinLnBrk="0" hangingPunct="1">
+              <a:defRPr sz="1800" kern="1200">
+                <a:solidFill>
+                  <a:schemeClr val="tx1"/>
+                </a:solidFill>
+                <a:latin typeface="+mn-lt"/>
+                <a:ea typeface="+mn-ea"/>
+                <a:cs typeface="+mn-cs"/>
+              </a:defRPr>
+            </a:lvl2pPr>
+            <a:lvl3pPr marL="914400" algn="l" defTabSz="914400" rtl="0" eaLnBrk="1" latinLnBrk="0" hangingPunct="1">
+              <a:defRPr sz="1800" kern="1200">
+                <a:solidFill>
+                  <a:schemeClr val="tx1"/>
+                </a:solidFill>
+                <a:latin typeface="+mn-lt"/>
+                <a:ea typeface="+mn-ea"/>
+                <a:cs typeface="+mn-cs"/>
+              </a:defRPr>
+            </a:lvl3pPr>
+            <a:lvl4pPr marL="1371600" algn="l" defTabSz="914400" rtl="0" eaLnBrk="1" latinLnBrk="0" hangingPunct="1">
+              <a:defRPr sz="1800" kern="1200">
+                <a:solidFill>
+                  <a:schemeClr val="tx1"/>
+                </a:solidFill>
+                <a:latin typeface="+mn-lt"/>
+                <a:ea typeface="+mn-ea"/>
+                <a:cs typeface="+mn-cs"/>
+              </a:defRPr>
+            </a:lvl4pPr>
+            <a:lvl5pPr marL="1828800" algn="l" defTabSz="914400" rtl="0" eaLnBrk="1" latinLnBrk="0" hangingPunct="1">
+              <a:defRPr sz="1800" kern="1200">
+                <a:solidFill>
+                  <a:schemeClr val="tx1"/>
+                </a:solidFill>
+                <a:latin typeface="+mn-lt"/>
+                <a:ea typeface="+mn-ea"/>
+                <a:cs typeface="+mn-cs"/>
+              </a:defRPr>
+            </a:lvl5pPr>
+            <a:lvl6pPr marL="2286000" algn="l" defTabSz="914400" rtl="0" eaLnBrk="1" latinLnBrk="0" hangingPunct="1">
+              <a:defRPr sz="1800" kern="1200">
+                <a:solidFill>
+                  <a:schemeClr val="tx1"/>
+                </a:solidFill>
+                <a:latin typeface="+mn-lt"/>
+                <a:ea typeface="+mn-ea"/>
+                <a:cs typeface="+mn-cs"/>
+              </a:defRPr>
+            </a:lvl6pPr>
+            <a:lvl7pPr marL="2743200" algn="l" defTabSz="914400" rtl="0" eaLnBrk="1" latinLnBrk="0" hangingPunct="1">
+              <a:defRPr sz="1800" kern="1200">
+                <a:solidFill>
+                  <a:schemeClr val="tx1"/>
+                </a:solidFill>
+                <a:latin typeface="+mn-lt"/>
+                <a:ea typeface="+mn-ea"/>
+                <a:cs typeface="+mn-cs"/>
+              </a:defRPr>
+            </a:lvl7pPr>
+            <a:lvl8pPr marL="3200400" algn="l" defTabSz="914400" rtl="0" eaLnBrk="1" latinLnBrk="0" hangingPunct="1">
+              <a:defRPr sz="1800" kern="1200">
+                <a:solidFill>
+                  <a:schemeClr val="tx1"/>
+                </a:solidFill>
+                <a:latin typeface="+mn-lt"/>
+                <a:ea typeface="+mn-ea"/>
+                <a:cs typeface="+mn-cs"/>
+              </a:defRPr>
+            </a:lvl8pPr>
+            <a:lvl9pPr marL="3657600" algn="l" defTabSz="914400" rtl="0" eaLnBrk="1" latinLnBrk="0" hangingPunct="1">
+              <a:defRPr sz="1800" kern="1200">
+                <a:solidFill>
+                  <a:schemeClr val="tx1"/>
+                </a:solidFill>
+                <a:latin typeface="+mn-lt"/>
+                <a:ea typeface="+mn-ea"/>
+                <a:cs typeface="+mn-cs"/>
+              </a:defRPr>
+            </a:lvl9pPr>
+          </a:lstStyle>
+          <a:p>
+            <a:pPr algn="ctr"/>
+            <a:r>
+              <a:rPr lang="pt-BR" sz="1450" b="1" kern="0" spc="27" dirty="0">
+                <a:solidFill>
+                  <a:schemeClr val="bg1"/>
+                </a:solidFill>
+                <a:latin typeface="Calibri" panose="020F0502020204030204" pitchFamily="34" charset="0"/>
+                <a:cs typeface="Gotham-Light"/>
+              </a:rPr>
+              <a:t>Crie um arquivo chamado index.html</a:t>
+            </a:r>
+          </a:p>
+        </p:txBody>
+      </p:sp>
+      <p:pic>
+        <p:nvPicPr>
+          <p:cNvPr id="9" name="Imagem 8"/>
+          <p:cNvPicPr>
+            <a:picLocks noChangeAspect="1"/>
+          </p:cNvPicPr>
+          <p:nvPr/>
+        </p:nvPicPr>
+        <p:blipFill>
+          <a:blip r:embed="rId2"/>
+          <a:stretch>
+            <a:fillRect/>
+          </a:stretch>
+        </p:blipFill>
+        <p:spPr>
+          <a:xfrm>
+            <a:off x="4642654" y="1164312"/>
+            <a:ext cx="4790452" cy="2693314"/>
+          </a:xfrm>
+          <a:prstGeom prst="rect">
+            <a:avLst/>
+          </a:prstGeom>
+        </p:spPr>
+      </p:pic>
+      <p:pic>
+        <p:nvPicPr>
+          <p:cNvPr id="10" name="Imagem 9"/>
+          <p:cNvPicPr>
+            <a:picLocks noChangeAspect="1"/>
+          </p:cNvPicPr>
+          <p:nvPr/>
+        </p:nvPicPr>
+        <p:blipFill>
+          <a:blip r:embed="rId3"/>
+          <a:stretch>
+            <a:fillRect/>
+          </a:stretch>
+        </p:blipFill>
+        <p:spPr>
+          <a:xfrm>
+            <a:off x="4461120" y="4043363"/>
+            <a:ext cx="5387428" cy="3028949"/>
+          </a:xfrm>
+          <a:prstGeom prst="rect">
+            <a:avLst/>
+          </a:prstGeom>
+        </p:spPr>
+      </p:pic>
+    </p:spTree>
+    <p:extLst>
+      <p:ext uri="{BB962C8B-B14F-4D97-AF65-F5344CB8AC3E}">
+        <p14:creationId xmlns:p14="http://schemas.microsoft.com/office/powerpoint/2010/main" val="33623391"/>
+      </p:ext>
+    </p:extLst>
+  </p:cSld>
+  <p:clrMapOvr>
+    <a:masterClrMapping/>
+  </p:clrMapOvr>
+  <p:transition spd="med"/>
+</p:sld>
+</file>
+
+<file path=ppt/slides/slide9.xml><?xml version="1.0" encoding="utf-8"?>
+<p:sld xmlns:a="http://schemas.openxmlformats.org/drawingml/2006/main" xmlns:r="http://schemas.openxmlformats.org/officeDocument/2006/relationships" xmlns:p="http://schemas.openxmlformats.org/presentationml/2006/main">
+  <p:cSld>
+    <p:spTree>
+      <p:nvGrpSpPr>
+        <p:cNvPr id="1" name=""/>
+        <p:cNvGrpSpPr/>
+        <p:nvPr/>
+      </p:nvGrpSpPr>
+      <p:grpSpPr>
+        <a:xfrm>
+          <a:off x="0" y="0"/>
+          <a:ext cx="0" cy="0"/>
+          <a:chOff x="0" y="0"/>
+          <a:chExt cx="0" cy="0"/>
+        </a:xfrm>
+      </p:grpSpPr>
+      <p:sp>
+        <p:nvSpPr>
+          <p:cNvPr id="2" name="CaixaDeTexto 35"/>
+          <p:cNvSpPr txBox="1"/>
+          <p:nvPr/>
+        </p:nvSpPr>
+        <p:spPr>
+          <a:xfrm>
+            <a:off x="507211" y="2423052"/>
+            <a:ext cx="4036213" cy="315471"/>
+          </a:xfrm>
+          <a:prstGeom prst="rect">
+            <a:avLst/>
+          </a:prstGeom>
+          <a:solidFill>
+            <a:srgbClr val="0AB4BA"/>
+          </a:solidFill>
+        </p:spPr>
+        <p:txBody>
+          <a:bodyPr wrap="square" rtlCol="0" anchor="ctr">
+            <a:spAutoFit/>
+          </a:bodyPr>
+          <a:lstStyle>
+            <a:defPPr>
+              <a:defRPr lang="pt-BR"/>
+            </a:defPPr>
+            <a:lvl1pPr marL="0" algn="l" defTabSz="914400" rtl="0" eaLnBrk="1" latinLnBrk="0" hangingPunct="1">
+              <a:defRPr sz="1800" kern="1200">
+                <a:solidFill>
+                  <a:schemeClr val="tx1"/>
+                </a:solidFill>
+                <a:latin typeface="+mn-lt"/>
+                <a:ea typeface="+mn-ea"/>
+                <a:cs typeface="+mn-cs"/>
+              </a:defRPr>
+            </a:lvl1pPr>
+            <a:lvl2pPr marL="457200" algn="l" defTabSz="914400" rtl="0" eaLnBrk="1" latinLnBrk="0" hangingPunct="1">
+              <a:defRPr sz="1800" kern="1200">
+                <a:solidFill>
+                  <a:schemeClr val="tx1"/>
+                </a:solidFill>
+                <a:latin typeface="+mn-lt"/>
+                <a:ea typeface="+mn-ea"/>
+                <a:cs typeface="+mn-cs"/>
+              </a:defRPr>
+            </a:lvl2pPr>
+            <a:lvl3pPr marL="914400" algn="l" defTabSz="914400" rtl="0" eaLnBrk="1" latinLnBrk="0" hangingPunct="1">
+              <a:defRPr sz="1800" kern="1200">
+                <a:solidFill>
+                  <a:schemeClr val="tx1"/>
+                </a:solidFill>
+                <a:latin typeface="+mn-lt"/>
+                <a:ea typeface="+mn-ea"/>
+                <a:cs typeface="+mn-cs"/>
+              </a:defRPr>
+            </a:lvl3pPr>
+            <a:lvl4pPr marL="1371600" algn="l" defTabSz="914400" rtl="0" eaLnBrk="1" latinLnBrk="0" hangingPunct="1">
+              <a:defRPr sz="1800" kern="1200">
+                <a:solidFill>
+                  <a:schemeClr val="tx1"/>
+                </a:solidFill>
+                <a:latin typeface="+mn-lt"/>
+                <a:ea typeface="+mn-ea"/>
+                <a:cs typeface="+mn-cs"/>
+              </a:defRPr>
+            </a:lvl4pPr>
+            <a:lvl5pPr marL="1828800" algn="l" defTabSz="914400" rtl="0" eaLnBrk="1" latinLnBrk="0" hangingPunct="1">
+              <a:defRPr sz="1800" kern="1200">
+                <a:solidFill>
+                  <a:schemeClr val="tx1"/>
+                </a:solidFill>
+                <a:latin typeface="+mn-lt"/>
+                <a:ea typeface="+mn-ea"/>
+                <a:cs typeface="+mn-cs"/>
+              </a:defRPr>
+            </a:lvl5pPr>
+            <a:lvl6pPr marL="2286000" algn="l" defTabSz="914400" rtl="0" eaLnBrk="1" latinLnBrk="0" hangingPunct="1">
+              <a:defRPr sz="1800" kern="1200">
+                <a:solidFill>
+                  <a:schemeClr val="tx1"/>
+                </a:solidFill>
+                <a:latin typeface="+mn-lt"/>
+                <a:ea typeface="+mn-ea"/>
+                <a:cs typeface="+mn-cs"/>
+              </a:defRPr>
+            </a:lvl6pPr>
+            <a:lvl7pPr marL="2743200" algn="l" defTabSz="914400" rtl="0" eaLnBrk="1" latinLnBrk="0" hangingPunct="1">
+              <a:defRPr sz="1800" kern="1200">
+                <a:solidFill>
+                  <a:schemeClr val="tx1"/>
+                </a:solidFill>
+                <a:latin typeface="+mn-lt"/>
+                <a:ea typeface="+mn-ea"/>
+                <a:cs typeface="+mn-cs"/>
+              </a:defRPr>
+            </a:lvl7pPr>
+            <a:lvl8pPr marL="3200400" algn="l" defTabSz="914400" rtl="0" eaLnBrk="1" latinLnBrk="0" hangingPunct="1">
+              <a:defRPr sz="1800" kern="1200">
+                <a:solidFill>
+                  <a:schemeClr val="tx1"/>
+                </a:solidFill>
+                <a:latin typeface="+mn-lt"/>
+                <a:ea typeface="+mn-ea"/>
+                <a:cs typeface="+mn-cs"/>
+              </a:defRPr>
+            </a:lvl8pPr>
+            <a:lvl9pPr marL="3657600" algn="l" defTabSz="914400" rtl="0" eaLnBrk="1" latinLnBrk="0" hangingPunct="1">
+              <a:defRPr sz="1800" kern="1200">
+                <a:solidFill>
+                  <a:schemeClr val="tx1"/>
+                </a:solidFill>
+                <a:latin typeface="+mn-lt"/>
+                <a:ea typeface="+mn-ea"/>
+                <a:cs typeface="+mn-cs"/>
+              </a:defRPr>
+            </a:lvl9pPr>
+          </a:lstStyle>
+          <a:p>
+            <a:pPr algn="ctr"/>
+            <a:r>
+              <a:rPr lang="pt-BR" sz="1450" b="1" kern="0" spc="27" dirty="0">
+                <a:solidFill>
+                  <a:schemeClr val="bg1"/>
+                </a:solidFill>
+                <a:latin typeface="Calibri" panose="020F0502020204030204" pitchFamily="34" charset="0"/>
+                <a:cs typeface="Gotham-Light"/>
+              </a:rPr>
+              <a:t>Botão direito e clique em ‘</a:t>
+            </a:r>
+            <a:r>
+              <a:rPr lang="pt-BR" sz="1450" b="1" kern="0" spc="27" dirty="0" err="1">
+                <a:solidFill>
+                  <a:schemeClr val="bg1"/>
+                </a:solidFill>
+                <a:latin typeface="Calibri" panose="020F0502020204030204" pitchFamily="34" charset="0"/>
+                <a:cs typeface="Gotham-Light"/>
+              </a:rPr>
+              <a:t>Git</a:t>
+            </a:r>
+            <a:r>
+              <a:rPr lang="pt-BR" sz="1450" b="1" kern="0" spc="27" dirty="0">
+                <a:solidFill>
+                  <a:schemeClr val="bg1"/>
+                </a:solidFill>
+                <a:latin typeface="Calibri" panose="020F0502020204030204" pitchFamily="34" charset="0"/>
+                <a:cs typeface="Gotham-Light"/>
+              </a:rPr>
+              <a:t> </a:t>
+            </a:r>
+            <a:r>
+              <a:rPr lang="pt-BR" sz="1450" b="1" kern="0" spc="27" dirty="0" err="1">
+                <a:solidFill>
+                  <a:schemeClr val="bg1"/>
+                </a:solidFill>
+                <a:latin typeface="Calibri" panose="020F0502020204030204" pitchFamily="34" charset="0"/>
+                <a:cs typeface="Gotham-Light"/>
+              </a:rPr>
+              <a:t>Bash</a:t>
+            </a:r>
+            <a:r>
+              <a:rPr lang="pt-BR" sz="1450" b="1" kern="0" spc="27" dirty="0">
+                <a:solidFill>
+                  <a:schemeClr val="bg1"/>
+                </a:solidFill>
+                <a:latin typeface="Calibri" panose="020F0502020204030204" pitchFamily="34" charset="0"/>
+                <a:cs typeface="Gotham-Light"/>
+              </a:rPr>
+              <a:t> </a:t>
+            </a:r>
+            <a:r>
+              <a:rPr lang="pt-BR" sz="1450" b="1" kern="0" spc="27" dirty="0" err="1">
+                <a:solidFill>
+                  <a:schemeClr val="bg1"/>
+                </a:solidFill>
+                <a:latin typeface="Calibri" panose="020F0502020204030204" pitchFamily="34" charset="0"/>
+                <a:cs typeface="Gotham-Light"/>
+              </a:rPr>
+              <a:t>here</a:t>
+            </a:r>
+            <a:r>
+              <a:rPr lang="pt-BR" sz="1450" b="1" kern="0" spc="27" dirty="0">
+                <a:solidFill>
+                  <a:schemeClr val="bg1"/>
+                </a:solidFill>
+                <a:latin typeface="Calibri" panose="020F0502020204030204" pitchFamily="34" charset="0"/>
+                <a:cs typeface="Gotham-Light"/>
+              </a:rPr>
+              <a:t>”</a:t>
+            </a:r>
+          </a:p>
+        </p:txBody>
+      </p:sp>
+      <p:sp>
+        <p:nvSpPr>
+          <p:cNvPr id="5" name="CaixaDeTexto 35"/>
+          <p:cNvSpPr txBox="1"/>
+          <p:nvPr/>
+        </p:nvSpPr>
+        <p:spPr>
+          <a:xfrm>
+            <a:off x="507211" y="5918727"/>
+            <a:ext cx="4036213" cy="315471"/>
+          </a:xfrm>
+          <a:prstGeom prst="rect">
+            <a:avLst/>
+          </a:prstGeom>
+          <a:solidFill>
+            <a:srgbClr val="0AB4BA"/>
+          </a:solidFill>
+        </p:spPr>
+        <p:txBody>
+          <a:bodyPr wrap="square" rtlCol="0" anchor="ctr">
+            <a:spAutoFit/>
+          </a:bodyPr>
+          <a:lstStyle>
+            <a:defPPr>
+              <a:defRPr lang="pt-BR"/>
+            </a:defPPr>
+            <a:lvl1pPr marL="0" algn="l" defTabSz="914400" rtl="0" eaLnBrk="1" latinLnBrk="0" hangingPunct="1">
+              <a:defRPr sz="1800" kern="1200">
+                <a:solidFill>
+                  <a:schemeClr val="tx1"/>
+                </a:solidFill>
+                <a:latin typeface="+mn-lt"/>
+                <a:ea typeface="+mn-ea"/>
+                <a:cs typeface="+mn-cs"/>
+              </a:defRPr>
+            </a:lvl1pPr>
+            <a:lvl2pPr marL="457200" algn="l" defTabSz="914400" rtl="0" eaLnBrk="1" latinLnBrk="0" hangingPunct="1">
+              <a:defRPr sz="1800" kern="1200">
+                <a:solidFill>
+                  <a:schemeClr val="tx1"/>
+                </a:solidFill>
+                <a:latin typeface="+mn-lt"/>
+                <a:ea typeface="+mn-ea"/>
+                <a:cs typeface="+mn-cs"/>
+              </a:defRPr>
+            </a:lvl2pPr>
+            <a:lvl3pPr marL="914400" algn="l" defTabSz="914400" rtl="0" eaLnBrk="1" latinLnBrk="0" hangingPunct="1">
+              <a:defRPr sz="1800" kern="1200">
+                <a:solidFill>
+                  <a:schemeClr val="tx1"/>
+                </a:solidFill>
+                <a:latin typeface="+mn-lt"/>
+                <a:ea typeface="+mn-ea"/>
+                <a:cs typeface="+mn-cs"/>
+              </a:defRPr>
+            </a:lvl3pPr>
+            <a:lvl4pPr marL="1371600" algn="l" defTabSz="914400" rtl="0" eaLnBrk="1" latinLnBrk="0" hangingPunct="1">
+              <a:defRPr sz="1800" kern="1200">
+                <a:solidFill>
+                  <a:schemeClr val="tx1"/>
+                </a:solidFill>
+                <a:latin typeface="+mn-lt"/>
+                <a:ea typeface="+mn-ea"/>
+                <a:cs typeface="+mn-cs"/>
+              </a:defRPr>
+            </a:lvl4pPr>
+            <a:lvl5pPr marL="1828800" algn="l" defTabSz="914400" rtl="0" eaLnBrk="1" latinLnBrk="0" hangingPunct="1">
+              <a:defRPr sz="1800" kern="1200">
+                <a:solidFill>
+                  <a:schemeClr val="tx1"/>
+                </a:solidFill>
+                <a:latin typeface="+mn-lt"/>
+                <a:ea typeface="+mn-ea"/>
+                <a:cs typeface="+mn-cs"/>
+              </a:defRPr>
+            </a:lvl5pPr>
+            <a:lvl6pPr marL="2286000" algn="l" defTabSz="914400" rtl="0" eaLnBrk="1" latinLnBrk="0" hangingPunct="1">
+              <a:defRPr sz="1800" kern="1200">
+                <a:solidFill>
+                  <a:schemeClr val="tx1"/>
+                </a:solidFill>
+                <a:latin typeface="+mn-lt"/>
+                <a:ea typeface="+mn-ea"/>
+                <a:cs typeface="+mn-cs"/>
+              </a:defRPr>
+            </a:lvl6pPr>
+            <a:lvl7pPr marL="2743200" algn="l" defTabSz="914400" rtl="0" eaLnBrk="1" latinLnBrk="0" hangingPunct="1">
+              <a:defRPr sz="1800" kern="1200">
+                <a:solidFill>
+                  <a:schemeClr val="tx1"/>
+                </a:solidFill>
+                <a:latin typeface="+mn-lt"/>
+                <a:ea typeface="+mn-ea"/>
+                <a:cs typeface="+mn-cs"/>
+              </a:defRPr>
+            </a:lvl7pPr>
+            <a:lvl8pPr marL="3200400" algn="l" defTabSz="914400" rtl="0" eaLnBrk="1" latinLnBrk="0" hangingPunct="1">
+              <a:defRPr sz="1800" kern="1200">
+                <a:solidFill>
+                  <a:schemeClr val="tx1"/>
+                </a:solidFill>
+                <a:latin typeface="+mn-lt"/>
+                <a:ea typeface="+mn-ea"/>
+                <a:cs typeface="+mn-cs"/>
+              </a:defRPr>
+            </a:lvl8pPr>
+            <a:lvl9pPr marL="3657600" algn="l" defTabSz="914400" rtl="0" eaLnBrk="1" latinLnBrk="0" hangingPunct="1">
+              <a:defRPr sz="1800" kern="1200">
+                <a:solidFill>
+                  <a:schemeClr val="tx1"/>
+                </a:solidFill>
+                <a:latin typeface="+mn-lt"/>
+                <a:ea typeface="+mn-ea"/>
+                <a:cs typeface="+mn-cs"/>
+              </a:defRPr>
+            </a:lvl9pPr>
+          </a:lstStyle>
+          <a:p>
+            <a:pPr algn="ctr"/>
+            <a:r>
+              <a:rPr lang="pt-BR" sz="1450" b="1" kern="0" spc="27" dirty="0">
+                <a:solidFill>
+                  <a:schemeClr val="bg1"/>
+                </a:solidFill>
+                <a:latin typeface="Calibri" panose="020F0502020204030204" pitchFamily="34" charset="0"/>
+                <a:cs typeface="Gotham-Light"/>
+              </a:rPr>
+              <a:t>Crie um repositório com o comando “</a:t>
+            </a:r>
+            <a:r>
+              <a:rPr lang="pt-BR" sz="1450" b="1" kern="0" spc="27" dirty="0" err="1">
+                <a:solidFill>
+                  <a:schemeClr val="bg1"/>
+                </a:solidFill>
+                <a:latin typeface="Calibri" panose="020F0502020204030204" pitchFamily="34" charset="0"/>
+                <a:cs typeface="Gotham-Light"/>
+              </a:rPr>
+              <a:t>git</a:t>
+            </a:r>
+            <a:r>
+              <a:rPr lang="pt-BR" sz="1450" b="1" kern="0" spc="27" dirty="0">
+                <a:solidFill>
+                  <a:schemeClr val="bg1"/>
+                </a:solidFill>
+                <a:latin typeface="Calibri" panose="020F0502020204030204" pitchFamily="34" charset="0"/>
+                <a:cs typeface="Gotham-Light"/>
+              </a:rPr>
+              <a:t> </a:t>
+            </a:r>
+            <a:r>
+              <a:rPr lang="pt-BR" sz="1450" b="1" kern="0" spc="27" dirty="0" err="1">
+                <a:solidFill>
+                  <a:schemeClr val="bg1"/>
+                </a:solidFill>
+                <a:latin typeface="Calibri" panose="020F0502020204030204" pitchFamily="34" charset="0"/>
+                <a:cs typeface="Gotham-Light"/>
+              </a:rPr>
+              <a:t>init</a:t>
+            </a:r>
+            <a:r>
+              <a:rPr lang="pt-BR" sz="1450" b="1" kern="0" spc="27" dirty="0">
+                <a:solidFill>
+                  <a:schemeClr val="bg1"/>
+                </a:solidFill>
+                <a:latin typeface="Calibri" panose="020F0502020204030204" pitchFamily="34" charset="0"/>
+                <a:cs typeface="Gotham-Light"/>
+              </a:rPr>
+              <a:t>”</a:t>
+            </a:r>
+          </a:p>
+        </p:txBody>
+      </p:sp>
+      <p:pic>
+        <p:nvPicPr>
+          <p:cNvPr id="7" name="Imagem 6"/>
+          <p:cNvPicPr>
+            <a:picLocks noChangeAspect="1"/>
+          </p:cNvPicPr>
+          <p:nvPr/>
+        </p:nvPicPr>
+        <p:blipFill>
+          <a:blip r:embed="rId2"/>
+          <a:stretch>
+            <a:fillRect/>
+          </a:stretch>
+        </p:blipFill>
+        <p:spPr>
+          <a:xfrm>
+            <a:off x="4914900" y="1207174"/>
+            <a:ext cx="4906962" cy="2758819"/>
+          </a:xfrm>
+          <a:prstGeom prst="rect">
+            <a:avLst/>
+          </a:prstGeom>
+        </p:spPr>
+      </p:pic>
+      <p:pic>
+        <p:nvPicPr>
+          <p:cNvPr id="8" name="Imagem 7"/>
+          <p:cNvPicPr>
+            <a:picLocks noChangeAspect="1"/>
+          </p:cNvPicPr>
+          <p:nvPr/>
+        </p:nvPicPr>
+        <p:blipFill>
+          <a:blip r:embed="rId3"/>
+          <a:stretch>
+            <a:fillRect/>
+          </a:stretch>
+        </p:blipFill>
+        <p:spPr>
+          <a:xfrm>
+            <a:off x="4914900" y="4308893"/>
+            <a:ext cx="4906962" cy="2706270"/>
+          </a:xfrm>
+          <a:prstGeom prst="rect">
+            <a:avLst/>
+          </a:prstGeom>
+        </p:spPr>
+      </p:pic>
+    </p:spTree>
+    <p:extLst>
+      <p:ext uri="{BB962C8B-B14F-4D97-AF65-F5344CB8AC3E}">
+        <p14:creationId xmlns:p14="http://schemas.microsoft.com/office/powerpoint/2010/main" val="4122163856"/>
       </p:ext>
     </p:extLst>
   </p:cSld>

</xml_diff>